<commit_message>
docs: atualiza relatorio do projeto e slides da apresentacao
</commit_message>
<xml_diff>
--- a/docs/Slides - Apresentação PI1.pptx
+++ b/docs/Slides - Apresentação PI1.pptx
@@ -1035,7 +1035,7 @@
           </a:pPr>
           <a:r>
             <a:rPr lang="pt-BR" dirty="0"/>
-            <a:t>Automatização Parcial.</a:t>
+            <a:t>Automatização do Processo.</a:t>
           </a:r>
           <a:endParaRPr lang="en-US" dirty="0"/>
         </a:p>
@@ -1912,7 +1912,7 @@
           </a:pPr>
           <a:r>
             <a:rPr lang="pt-BR" sz="1600" kern="1200" dirty="0"/>
-            <a:t>Automatização Parcial.</a:t>
+            <a:t>Automatização do Processo.</a:t>
           </a:r>
           <a:endParaRPr lang="en-US" sz="1600" kern="1200" dirty="0"/>
         </a:p>
@@ -4311,7 +4311,7 @@
           <a:p>
             <a:fld id="{ED74B0C6-F1B3-49A6-B6FA-AAABC6A0B53E}" type="datetimeFigureOut">
               <a:rPr lang="pt-BR" smtClean="0"/>
-              <a:t>26/06/2024</a:t>
+              <a:t>27/06/2024</a:t>
             </a:fld>
             <a:endParaRPr lang="pt-BR"/>
           </a:p>
@@ -4725,7 +4725,7 @@
           <a:p>
             <a:fld id="{5E89BB6B-61EA-4BA7-BCEE-0A9A8BC7E751}" type="datetimeFigureOut">
               <a:rPr lang="pt-BR" smtClean="0"/>
-              <a:t>26/06/2024</a:t>
+              <a:t>27/06/2024</a:t>
             </a:fld>
             <a:endParaRPr lang="pt-BR"/>
           </a:p>
@@ -4923,7 +4923,7 @@
           <a:p>
             <a:fld id="{5E89BB6B-61EA-4BA7-BCEE-0A9A8BC7E751}" type="datetimeFigureOut">
               <a:rPr lang="pt-BR" smtClean="0"/>
-              <a:t>26/06/2024</a:t>
+              <a:t>27/06/2024</a:t>
             </a:fld>
             <a:endParaRPr lang="pt-BR"/>
           </a:p>
@@ -5131,7 +5131,7 @@
           <a:p>
             <a:fld id="{5E89BB6B-61EA-4BA7-BCEE-0A9A8BC7E751}" type="datetimeFigureOut">
               <a:rPr lang="pt-BR" smtClean="0"/>
-              <a:t>26/06/2024</a:t>
+              <a:t>27/06/2024</a:t>
             </a:fld>
             <a:endParaRPr lang="pt-BR"/>
           </a:p>
@@ -5329,7 +5329,7 @@
           <a:p>
             <a:fld id="{5E89BB6B-61EA-4BA7-BCEE-0A9A8BC7E751}" type="datetimeFigureOut">
               <a:rPr lang="pt-BR" smtClean="0"/>
-              <a:t>26/06/2024</a:t>
+              <a:t>27/06/2024</a:t>
             </a:fld>
             <a:endParaRPr lang="pt-BR"/>
           </a:p>
@@ -5604,7 +5604,7 @@
           <a:p>
             <a:fld id="{5E89BB6B-61EA-4BA7-BCEE-0A9A8BC7E751}" type="datetimeFigureOut">
               <a:rPr lang="pt-BR" smtClean="0"/>
-              <a:t>26/06/2024</a:t>
+              <a:t>27/06/2024</a:t>
             </a:fld>
             <a:endParaRPr lang="pt-BR"/>
           </a:p>
@@ -5869,7 +5869,7 @@
           <a:p>
             <a:fld id="{5E89BB6B-61EA-4BA7-BCEE-0A9A8BC7E751}" type="datetimeFigureOut">
               <a:rPr lang="pt-BR" smtClean="0"/>
-              <a:t>26/06/2024</a:t>
+              <a:t>27/06/2024</a:t>
             </a:fld>
             <a:endParaRPr lang="pt-BR"/>
           </a:p>
@@ -6281,7 +6281,7 @@
           <a:p>
             <a:fld id="{5E89BB6B-61EA-4BA7-BCEE-0A9A8BC7E751}" type="datetimeFigureOut">
               <a:rPr lang="pt-BR" smtClean="0"/>
-              <a:t>26/06/2024</a:t>
+              <a:t>27/06/2024</a:t>
             </a:fld>
             <a:endParaRPr lang="pt-BR"/>
           </a:p>
@@ -6422,7 +6422,7 @@
           <a:p>
             <a:fld id="{5E89BB6B-61EA-4BA7-BCEE-0A9A8BC7E751}" type="datetimeFigureOut">
               <a:rPr lang="pt-BR" smtClean="0"/>
-              <a:t>26/06/2024</a:t>
+              <a:t>27/06/2024</a:t>
             </a:fld>
             <a:endParaRPr lang="pt-BR"/>
           </a:p>
@@ -6535,7 +6535,7 @@
           <a:p>
             <a:fld id="{5E89BB6B-61EA-4BA7-BCEE-0A9A8BC7E751}" type="datetimeFigureOut">
               <a:rPr lang="pt-BR" smtClean="0"/>
-              <a:t>26/06/2024</a:t>
+              <a:t>27/06/2024</a:t>
             </a:fld>
             <a:endParaRPr lang="pt-BR"/>
           </a:p>
@@ -6846,7 +6846,7 @@
           <a:p>
             <a:fld id="{5E89BB6B-61EA-4BA7-BCEE-0A9A8BC7E751}" type="datetimeFigureOut">
               <a:rPr lang="pt-BR" smtClean="0"/>
-              <a:t>26/06/2024</a:t>
+              <a:t>27/06/2024</a:t>
             </a:fld>
             <a:endParaRPr lang="pt-BR"/>
           </a:p>
@@ -7134,7 +7134,7 @@
           <a:p>
             <a:fld id="{5E89BB6B-61EA-4BA7-BCEE-0A9A8BC7E751}" type="datetimeFigureOut">
               <a:rPr lang="pt-BR" smtClean="0"/>
-              <a:t>26/06/2024</a:t>
+              <a:t>27/06/2024</a:t>
             </a:fld>
             <a:endParaRPr lang="pt-BR"/>
           </a:p>
@@ -7375,7 +7375,7 @@
           <a:p>
             <a:fld id="{5E89BB6B-61EA-4BA7-BCEE-0A9A8BC7E751}" type="datetimeFigureOut">
               <a:rPr lang="pt-BR" smtClean="0"/>
-              <a:t>26/06/2024</a:t>
+              <a:t>27/06/2024</a:t>
             </a:fld>
             <a:endParaRPr lang="pt-BR"/>
           </a:p>
@@ -13529,7 +13529,7 @@
         </p:spPr>
         <p:txBody>
           <a:bodyPr>
-            <a:normAutofit fontScale="92500"/>
+            <a:normAutofit/>
           </a:bodyPr>
           <a:lstStyle/>
           <a:p>
@@ -13561,7 +13561,7 @@
                 <a:ea typeface="Calibri" panose="020F0502020204030204" pitchFamily="34" charset="0"/>
                 <a:cs typeface="Times New Roman" panose="02020603050405020304" pitchFamily="18" charset="0"/>
               </a:rPr>
-              <a:t>Automatizar parcialmente o processo de justificativas de faltas e reposição de aulas na Fatec Itapira.</a:t>
+              <a:t>Automatizar o processo de justificativas de faltas e reposição de aulas na Fatec Itapira.</a:t>
             </a:r>
           </a:p>
           <a:p>
@@ -14838,7 +14838,7 @@
             <p:ph idx="1"/>
             <p:extLst>
               <p:ext uri="{D42A27DB-BD31-4B8C-83A1-F6EECF244321}">
-                <p14:modId xmlns:p14="http://schemas.microsoft.com/office/powerpoint/2010/main" val="887761872"/>
+                <p14:modId xmlns:p14="http://schemas.microsoft.com/office/powerpoint/2010/main" val="2650807201"/>
               </p:ext>
             </p:extLst>
           </p:nvPr>

</xml_diff>

<commit_message>
docs: realiza ajustes finais no relatorio e slides para a entrega
</commit_message>
<xml_diff>
--- a/docs/Slides - Apresentação PI1.pptx
+++ b/docs/Slides - Apresentação PI1.pptx
@@ -5,7 +5,7 @@
     <p:sldMasterId id="2147483677" r:id="rId1"/>
   </p:sldMasterIdLst>
   <p:notesMasterIdLst>
-    <p:notesMasterId r:id="rId15"/>
+    <p:notesMasterId r:id="rId18"/>
   </p:notesMasterIdLst>
   <p:sldIdLst>
     <p:sldId id="256" r:id="rId2"/>
@@ -14,13 +14,16 @@
     <p:sldId id="259" r:id="rId5"/>
     <p:sldId id="275" r:id="rId6"/>
     <p:sldId id="276" r:id="rId7"/>
-    <p:sldId id="263" r:id="rId8"/>
-    <p:sldId id="280" r:id="rId9"/>
-    <p:sldId id="260" r:id="rId10"/>
-    <p:sldId id="277" r:id="rId11"/>
-    <p:sldId id="267" r:id="rId12"/>
-    <p:sldId id="268" r:id="rId13"/>
-    <p:sldId id="278" r:id="rId14"/>
+    <p:sldId id="270" r:id="rId8"/>
+    <p:sldId id="271" r:id="rId9"/>
+    <p:sldId id="272" r:id="rId10"/>
+    <p:sldId id="263" r:id="rId11"/>
+    <p:sldId id="280" r:id="rId12"/>
+    <p:sldId id="260" r:id="rId13"/>
+    <p:sldId id="277" r:id="rId14"/>
+    <p:sldId id="267" r:id="rId15"/>
+    <p:sldId id="268" r:id="rId16"/>
+    <p:sldId id="278" r:id="rId17"/>
   </p:sldIdLst>
   <p:sldSz cx="12192000" cy="6858000"/>
   <p:notesSz cx="6858000" cy="9144000"/>
@@ -1035,7 +1038,7 @@
           </a:pPr>
           <a:r>
             <a:rPr lang="pt-BR" dirty="0"/>
-            <a:t>Automatização do Processo.</a:t>
+            <a:t>Automatização parcial do processo.</a:t>
           </a:r>
           <a:endParaRPr lang="en-US" dirty="0"/>
         </a:p>
@@ -1912,7 +1915,7 @@
           </a:pPr>
           <a:r>
             <a:rPr lang="pt-BR" sz="1600" kern="1200" dirty="0"/>
-            <a:t>Automatização do Processo.</a:t>
+            <a:t>Automatização parcial do processo.</a:t>
           </a:r>
           <a:endParaRPr lang="en-US" sz="1600" kern="1200" dirty="0"/>
         </a:p>
@@ -4578,6 +4581,258 @@
 </p:notesMaster>
 </file>
 
+<file path=ppt/notesSlides/notesSlide1.xml><?xml version="1.0" encoding="utf-8"?>
+<p:notes xmlns:a="http://schemas.openxmlformats.org/drawingml/2006/main" xmlns:r="http://schemas.openxmlformats.org/officeDocument/2006/relationships" xmlns:p="http://schemas.openxmlformats.org/presentationml/2006/main">
+  <p:cSld>
+    <p:spTree>
+      <p:nvGrpSpPr>
+        <p:cNvPr id="1" name=""/>
+        <p:cNvGrpSpPr/>
+        <p:nvPr/>
+      </p:nvGrpSpPr>
+      <p:grpSpPr>
+        <a:xfrm>
+          <a:off x="0" y="0"/>
+          <a:ext cx="0" cy="0"/>
+          <a:chOff x="0" y="0"/>
+          <a:chExt cx="0" cy="0"/>
+        </a:xfrm>
+      </p:grpSpPr>
+      <p:sp>
+        <p:nvSpPr>
+          <p:cNvPr id="2" name="Espaço Reservado para Imagem de Slide 1"/>
+          <p:cNvSpPr>
+            <a:spLocks noGrp="1" noRot="1" noChangeAspect="1"/>
+          </p:cNvSpPr>
+          <p:nvPr>
+            <p:ph type="sldImg"/>
+          </p:nvPr>
+        </p:nvSpPr>
+        <p:spPr/>
+      </p:sp>
+      <p:sp>
+        <p:nvSpPr>
+          <p:cNvPr id="3" name="Espaço Reservado para Anotações 2"/>
+          <p:cNvSpPr>
+            <a:spLocks noGrp="1"/>
+          </p:cNvSpPr>
+          <p:nvPr>
+            <p:ph type="body" idx="1"/>
+          </p:nvPr>
+        </p:nvSpPr>
+        <p:spPr/>
+        <p:txBody>
+          <a:bodyPr/>
+          <a:lstStyle/>
+          <a:p>
+            <a:endParaRPr lang="pt-BR" dirty="0"/>
+          </a:p>
+        </p:txBody>
+      </p:sp>
+      <p:sp>
+        <p:nvSpPr>
+          <p:cNvPr id="4" name="Espaço Reservado para Número de Slide 3"/>
+          <p:cNvSpPr>
+            <a:spLocks noGrp="1"/>
+          </p:cNvSpPr>
+          <p:nvPr>
+            <p:ph type="sldNum" sz="quarter" idx="5"/>
+          </p:nvPr>
+        </p:nvSpPr>
+        <p:spPr/>
+        <p:txBody>
+          <a:bodyPr/>
+          <a:lstStyle/>
+          <a:p>
+            <a:fld id="{82C8520C-F6BB-476A-845C-4C4D0AACF9E8}" type="slidenum">
+              <a:rPr lang="pt-BR" smtClean="0"/>
+              <a:t>7</a:t>
+            </a:fld>
+            <a:endParaRPr lang="pt-BR"/>
+          </a:p>
+        </p:txBody>
+      </p:sp>
+    </p:spTree>
+    <p:extLst>
+      <p:ext uri="{BB962C8B-B14F-4D97-AF65-F5344CB8AC3E}">
+        <p14:creationId xmlns:p14="http://schemas.microsoft.com/office/powerpoint/2010/main" val="3406573200"/>
+      </p:ext>
+    </p:extLst>
+  </p:cSld>
+  <p:clrMapOvr>
+    <a:masterClrMapping/>
+  </p:clrMapOvr>
+</p:notes>
+</file>
+
+<file path=ppt/notesSlides/notesSlide2.xml><?xml version="1.0" encoding="utf-8"?>
+<p:notes xmlns:a="http://schemas.openxmlformats.org/drawingml/2006/main" xmlns:r="http://schemas.openxmlformats.org/officeDocument/2006/relationships" xmlns:p="http://schemas.openxmlformats.org/presentationml/2006/main">
+  <p:cSld>
+    <p:spTree>
+      <p:nvGrpSpPr>
+        <p:cNvPr id="1" name=""/>
+        <p:cNvGrpSpPr/>
+        <p:nvPr/>
+      </p:nvGrpSpPr>
+      <p:grpSpPr>
+        <a:xfrm>
+          <a:off x="0" y="0"/>
+          <a:ext cx="0" cy="0"/>
+          <a:chOff x="0" y="0"/>
+          <a:chExt cx="0" cy="0"/>
+        </a:xfrm>
+      </p:grpSpPr>
+      <p:sp>
+        <p:nvSpPr>
+          <p:cNvPr id="2" name="Espaço Reservado para Imagem de Slide 1"/>
+          <p:cNvSpPr>
+            <a:spLocks noGrp="1" noRot="1" noChangeAspect="1"/>
+          </p:cNvSpPr>
+          <p:nvPr>
+            <p:ph type="sldImg"/>
+          </p:nvPr>
+        </p:nvSpPr>
+        <p:spPr/>
+      </p:sp>
+      <p:sp>
+        <p:nvSpPr>
+          <p:cNvPr id="3" name="Espaço Reservado para Anotações 2"/>
+          <p:cNvSpPr>
+            <a:spLocks noGrp="1"/>
+          </p:cNvSpPr>
+          <p:nvPr>
+            <p:ph type="body" idx="1"/>
+          </p:nvPr>
+        </p:nvSpPr>
+        <p:spPr/>
+        <p:txBody>
+          <a:bodyPr/>
+          <a:lstStyle/>
+          <a:p>
+            <a:endParaRPr lang="pt-BR" dirty="0"/>
+          </a:p>
+        </p:txBody>
+      </p:sp>
+      <p:sp>
+        <p:nvSpPr>
+          <p:cNvPr id="4" name="Espaço Reservado para Número de Slide 3"/>
+          <p:cNvSpPr>
+            <a:spLocks noGrp="1"/>
+          </p:cNvSpPr>
+          <p:nvPr>
+            <p:ph type="sldNum" sz="quarter" idx="5"/>
+          </p:nvPr>
+        </p:nvSpPr>
+        <p:spPr/>
+        <p:txBody>
+          <a:bodyPr/>
+          <a:lstStyle/>
+          <a:p>
+            <a:fld id="{82C8520C-F6BB-476A-845C-4C4D0AACF9E8}" type="slidenum">
+              <a:rPr lang="pt-BR" smtClean="0"/>
+              <a:t>8</a:t>
+            </a:fld>
+            <a:endParaRPr lang="pt-BR"/>
+          </a:p>
+        </p:txBody>
+      </p:sp>
+    </p:spTree>
+    <p:extLst>
+      <p:ext uri="{BB962C8B-B14F-4D97-AF65-F5344CB8AC3E}">
+        <p14:creationId xmlns:p14="http://schemas.microsoft.com/office/powerpoint/2010/main" val="3090310403"/>
+      </p:ext>
+    </p:extLst>
+  </p:cSld>
+  <p:clrMapOvr>
+    <a:masterClrMapping/>
+  </p:clrMapOvr>
+</p:notes>
+</file>
+
+<file path=ppt/notesSlides/notesSlide3.xml><?xml version="1.0" encoding="utf-8"?>
+<p:notes xmlns:a="http://schemas.openxmlformats.org/drawingml/2006/main" xmlns:r="http://schemas.openxmlformats.org/officeDocument/2006/relationships" xmlns:p="http://schemas.openxmlformats.org/presentationml/2006/main">
+  <p:cSld>
+    <p:spTree>
+      <p:nvGrpSpPr>
+        <p:cNvPr id="1" name=""/>
+        <p:cNvGrpSpPr/>
+        <p:nvPr/>
+      </p:nvGrpSpPr>
+      <p:grpSpPr>
+        <a:xfrm>
+          <a:off x="0" y="0"/>
+          <a:ext cx="0" cy="0"/>
+          <a:chOff x="0" y="0"/>
+          <a:chExt cx="0" cy="0"/>
+        </a:xfrm>
+      </p:grpSpPr>
+      <p:sp>
+        <p:nvSpPr>
+          <p:cNvPr id="2" name="Espaço Reservado para Imagem de Slide 1"/>
+          <p:cNvSpPr>
+            <a:spLocks noGrp="1" noRot="1" noChangeAspect="1"/>
+          </p:cNvSpPr>
+          <p:nvPr>
+            <p:ph type="sldImg"/>
+          </p:nvPr>
+        </p:nvSpPr>
+        <p:spPr/>
+      </p:sp>
+      <p:sp>
+        <p:nvSpPr>
+          <p:cNvPr id="3" name="Espaço Reservado para Anotações 2"/>
+          <p:cNvSpPr>
+            <a:spLocks noGrp="1"/>
+          </p:cNvSpPr>
+          <p:nvPr>
+            <p:ph type="body" idx="1"/>
+          </p:nvPr>
+        </p:nvSpPr>
+        <p:spPr/>
+        <p:txBody>
+          <a:bodyPr/>
+          <a:lstStyle/>
+          <a:p>
+            <a:endParaRPr lang="pt-BR" dirty="0"/>
+          </a:p>
+        </p:txBody>
+      </p:sp>
+      <p:sp>
+        <p:nvSpPr>
+          <p:cNvPr id="4" name="Espaço Reservado para Número de Slide 3"/>
+          <p:cNvSpPr>
+            <a:spLocks noGrp="1"/>
+          </p:cNvSpPr>
+          <p:nvPr>
+            <p:ph type="sldNum" sz="quarter" idx="5"/>
+          </p:nvPr>
+        </p:nvSpPr>
+        <p:spPr/>
+        <p:txBody>
+          <a:bodyPr/>
+          <a:lstStyle/>
+          <a:p>
+            <a:fld id="{82C8520C-F6BB-476A-845C-4C4D0AACF9E8}" type="slidenum">
+              <a:rPr lang="pt-BR" smtClean="0"/>
+              <a:t>9</a:t>
+            </a:fld>
+            <a:endParaRPr lang="pt-BR"/>
+          </a:p>
+        </p:txBody>
+      </p:sp>
+    </p:spTree>
+    <p:extLst>
+      <p:ext uri="{BB962C8B-B14F-4D97-AF65-F5344CB8AC3E}">
+        <p14:creationId xmlns:p14="http://schemas.microsoft.com/office/powerpoint/2010/main" val="811827927"/>
+      </p:ext>
+    </p:extLst>
+  </p:cSld>
+  <p:clrMapOvr>
+    <a:masterClrMapping/>
+  </p:clrMapOvr>
+</p:notes>
+</file>
+
 <file path=ppt/slideLayouts/slideLayout1.xml><?xml version="1.0" encoding="utf-8"?>
 <p:sldLayout xmlns:a="http://schemas.openxmlformats.org/drawingml/2006/main" xmlns:r="http://schemas.openxmlformats.org/officeDocument/2006/relationships" xmlns:p="http://schemas.openxmlformats.org/presentationml/2006/main" type="title" preserve="1">
   <p:cSld name="Slide de Título">
@@ -9278,6 +9533,1854 @@
 <file path=ppt/slides/slide10.xml><?xml version="1.0" encoding="utf-8"?>
 <p:sld xmlns:a="http://schemas.openxmlformats.org/drawingml/2006/main" xmlns:r="http://schemas.openxmlformats.org/officeDocument/2006/relationships" xmlns:p="http://schemas.openxmlformats.org/presentationml/2006/main">
   <p:cSld>
+    <p:spTree>
+      <p:nvGrpSpPr>
+        <p:cNvPr id="1" name=""/>
+        <p:cNvGrpSpPr/>
+        <p:nvPr/>
+      </p:nvGrpSpPr>
+      <p:grpSpPr>
+        <a:xfrm>
+          <a:off x="0" y="0"/>
+          <a:ext cx="0" cy="0"/>
+          <a:chOff x="0" y="0"/>
+          <a:chExt cx="0" cy="0"/>
+        </a:xfrm>
+      </p:grpSpPr>
+      <p:sp>
+        <p:nvSpPr>
+          <p:cNvPr id="2" name="Título 1">
+            <a:extLst>
+              <a:ext uri="{FF2B5EF4-FFF2-40B4-BE49-F238E27FC236}">
+                <a16:creationId xmlns:a16="http://schemas.microsoft.com/office/drawing/2014/main" id="{8526413E-CC99-95EF-0BB7-BB595C1845DF}"/>
+              </a:ext>
+            </a:extLst>
+          </p:cNvPr>
+          <p:cNvSpPr>
+            <a:spLocks noGrp="1"/>
+          </p:cNvSpPr>
+          <p:nvPr>
+            <p:ph type="title"/>
+          </p:nvPr>
+        </p:nvSpPr>
+        <p:spPr>
+          <a:xfrm>
+            <a:off x="1027205" y="-165407"/>
+            <a:ext cx="10515600" cy="1325563"/>
+          </a:xfrm>
+        </p:spPr>
+        <p:txBody>
+          <a:bodyPr>
+            <a:normAutofit/>
+          </a:bodyPr>
+          <a:lstStyle/>
+          <a:p>
+            <a:pPr algn="ctr"/>
+            <a:r>
+              <a:rPr lang="pt-BR" sz="3600" b="1" dirty="0">
+                <a:solidFill>
+                  <a:srgbClr val="A50000"/>
+                </a:solidFill>
+                <a:effectLst/>
+                <a:latin typeface="Calibri" panose="020F0502020204030204" pitchFamily="34" charset="0"/>
+                <a:ea typeface="Calibri" panose="020F0502020204030204" pitchFamily="34" charset="0"/>
+                <a:cs typeface="Times New Roman" panose="02020603050405020304" pitchFamily="18" charset="0"/>
+              </a:rPr>
+              <a:t>Design da Interface - Figma</a:t>
+            </a:r>
+            <a:endParaRPr lang="pt-BR" sz="3600" b="1" dirty="0">
+              <a:solidFill>
+                <a:srgbClr val="A50000"/>
+              </a:solidFill>
+            </a:endParaRPr>
+          </a:p>
+        </p:txBody>
+      </p:sp>
+      <p:pic>
+        <p:nvPicPr>
+          <p:cNvPr id="7" name="Imagem 6">
+            <a:extLst>
+              <a:ext uri="{FF2B5EF4-FFF2-40B4-BE49-F238E27FC236}">
+                <a16:creationId xmlns:a16="http://schemas.microsoft.com/office/drawing/2014/main" id="{993AC1D4-110B-9FB7-C0D7-6279F2924D4A}"/>
+              </a:ext>
+            </a:extLst>
+          </p:cNvPr>
+          <p:cNvPicPr>
+            <a:picLocks noChangeAspect="1"/>
+          </p:cNvPicPr>
+          <p:nvPr/>
+        </p:nvPicPr>
+        <p:blipFill rotWithShape="1">
+          <a:blip r:embed="rId2"/>
+          <a:srcRect l="1643" t="1422" r="1083" b="3424"/>
+          <a:stretch/>
+        </p:blipFill>
+        <p:spPr>
+          <a:xfrm>
+            <a:off x="6750358" y="985520"/>
+            <a:ext cx="4680000" cy="2609486"/>
+          </a:xfrm>
+          <a:prstGeom prst="rect">
+            <a:avLst/>
+          </a:prstGeom>
+          <a:ln w="12700">
+            <a:solidFill>
+              <a:schemeClr val="tx1"/>
+            </a:solidFill>
+          </a:ln>
+        </p:spPr>
+      </p:pic>
+      <p:pic>
+        <p:nvPicPr>
+          <p:cNvPr id="5" name="Imagem 4">
+            <a:extLst>
+              <a:ext uri="{FF2B5EF4-FFF2-40B4-BE49-F238E27FC236}">
+                <a16:creationId xmlns:a16="http://schemas.microsoft.com/office/drawing/2014/main" id="{7FF613F8-5FDE-7191-2EE9-F5E4A8F38DB0}"/>
+              </a:ext>
+            </a:extLst>
+          </p:cNvPr>
+          <p:cNvPicPr>
+            <a:picLocks noChangeAspect="1"/>
+          </p:cNvPicPr>
+          <p:nvPr/>
+        </p:nvPicPr>
+        <p:blipFill>
+          <a:blip r:embed="rId3"/>
+          <a:stretch>
+            <a:fillRect/>
+          </a:stretch>
+        </p:blipFill>
+        <p:spPr>
+          <a:xfrm>
+            <a:off x="899158" y="3975602"/>
+            <a:ext cx="4680000" cy="2626068"/>
+          </a:xfrm>
+          <a:prstGeom prst="rect">
+            <a:avLst/>
+          </a:prstGeom>
+          <a:noFill/>
+          <a:ln w="12700">
+            <a:solidFill>
+              <a:schemeClr val="tx1"/>
+            </a:solidFill>
+          </a:ln>
+        </p:spPr>
+      </p:pic>
+      <p:pic>
+        <p:nvPicPr>
+          <p:cNvPr id="6" name="Imagem 5">
+            <a:extLst>
+              <a:ext uri="{FF2B5EF4-FFF2-40B4-BE49-F238E27FC236}">
+                <a16:creationId xmlns:a16="http://schemas.microsoft.com/office/drawing/2014/main" id="{1599C508-FA34-C4AD-1DB8-5D8F247DEF86}"/>
+              </a:ext>
+            </a:extLst>
+          </p:cNvPr>
+          <p:cNvPicPr>
+            <a:picLocks noChangeAspect="1"/>
+          </p:cNvPicPr>
+          <p:nvPr/>
+        </p:nvPicPr>
+        <p:blipFill rotWithShape="1">
+          <a:blip r:embed="rId4"/>
+          <a:srcRect l="1801" t="1623" r="1957" b="1838"/>
+          <a:stretch/>
+        </p:blipFill>
+        <p:spPr>
+          <a:xfrm>
+            <a:off x="899158" y="985520"/>
+            <a:ext cx="4680000" cy="2647421"/>
+          </a:xfrm>
+          <a:prstGeom prst="rect">
+            <a:avLst/>
+          </a:prstGeom>
+          <a:ln w="19050">
+            <a:solidFill>
+              <a:schemeClr val="tx1"/>
+            </a:solidFill>
+          </a:ln>
+        </p:spPr>
+      </p:pic>
+      <p:pic>
+        <p:nvPicPr>
+          <p:cNvPr id="11" name="Imagem 10">
+            <a:extLst>
+              <a:ext uri="{FF2B5EF4-FFF2-40B4-BE49-F238E27FC236}">
+                <a16:creationId xmlns:a16="http://schemas.microsoft.com/office/drawing/2014/main" id="{64EAD1C1-A3C3-2A61-4491-46ACD9523790}"/>
+              </a:ext>
+            </a:extLst>
+          </p:cNvPr>
+          <p:cNvPicPr>
+            <a:picLocks noChangeAspect="1"/>
+          </p:cNvPicPr>
+          <p:nvPr/>
+        </p:nvPicPr>
+        <p:blipFill>
+          <a:blip r:embed="rId5"/>
+          <a:stretch>
+            <a:fillRect/>
+          </a:stretch>
+        </p:blipFill>
+        <p:spPr>
+          <a:xfrm>
+            <a:off x="6750358" y="3878158"/>
+            <a:ext cx="4680000" cy="2723512"/>
+          </a:xfrm>
+          <a:prstGeom prst="rect">
+            <a:avLst/>
+          </a:prstGeom>
+          <a:ln w="12700">
+            <a:solidFill>
+              <a:schemeClr val="tx1"/>
+            </a:solidFill>
+          </a:ln>
+        </p:spPr>
+      </p:pic>
+    </p:spTree>
+    <p:extLst>
+      <p:ext uri="{BB962C8B-B14F-4D97-AF65-F5344CB8AC3E}">
+        <p14:creationId xmlns:p14="http://schemas.microsoft.com/office/powerpoint/2010/main" val="2440801674"/>
+      </p:ext>
+    </p:extLst>
+  </p:cSld>
+  <p:clrMapOvr>
+    <a:masterClrMapping/>
+  </p:clrMapOvr>
+</p:sld>
+</file>
+
+<file path=ppt/slides/slide11.xml><?xml version="1.0" encoding="utf-8"?>
+<p:sld xmlns:a="http://schemas.openxmlformats.org/drawingml/2006/main" xmlns:r="http://schemas.openxmlformats.org/officeDocument/2006/relationships" xmlns:p="http://schemas.openxmlformats.org/presentationml/2006/main">
+  <p:cSld>
+    <p:spTree>
+      <p:nvGrpSpPr>
+        <p:cNvPr id="1" name=""/>
+        <p:cNvGrpSpPr/>
+        <p:nvPr/>
+      </p:nvGrpSpPr>
+      <p:grpSpPr>
+        <a:xfrm>
+          <a:off x="0" y="0"/>
+          <a:ext cx="0" cy="0"/>
+          <a:chOff x="0" y="0"/>
+          <a:chExt cx="0" cy="0"/>
+        </a:xfrm>
+      </p:grpSpPr>
+      <p:sp>
+        <p:nvSpPr>
+          <p:cNvPr id="2" name="Título 1">
+            <a:extLst>
+              <a:ext uri="{FF2B5EF4-FFF2-40B4-BE49-F238E27FC236}">
+                <a16:creationId xmlns:a16="http://schemas.microsoft.com/office/drawing/2014/main" id="{C200E95A-ADEB-1167-FF6A-C5B7A47F60EC}"/>
+              </a:ext>
+            </a:extLst>
+          </p:cNvPr>
+          <p:cNvSpPr txBox="1">
+            <a:spLocks/>
+          </p:cNvSpPr>
+          <p:nvPr/>
+        </p:nvSpPr>
+        <p:spPr>
+          <a:xfrm>
+            <a:off x="2970445" y="230116"/>
+            <a:ext cx="6251110" cy="1093416"/>
+          </a:xfrm>
+          <a:prstGeom prst="rect">
+            <a:avLst/>
+          </a:prstGeom>
+        </p:spPr>
+        <p:txBody>
+          <a:bodyPr anchor="b">
+            <a:normAutofit/>
+          </a:bodyPr>
+          <a:lstStyle>
+            <a:lvl1pPr algn="l" defTabSz="914400" rtl="0" eaLnBrk="1" latinLnBrk="0" hangingPunct="1">
+              <a:lnSpc>
+                <a:spcPct val="90000"/>
+              </a:lnSpc>
+              <a:spcBef>
+                <a:spcPct val="0"/>
+              </a:spcBef>
+              <a:buNone/>
+              <a:defRPr sz="4400" kern="1200">
+                <a:solidFill>
+                  <a:schemeClr val="tx1"/>
+                </a:solidFill>
+                <a:latin typeface="+mj-lt"/>
+                <a:ea typeface="+mj-ea"/>
+                <a:cs typeface="+mj-cs"/>
+              </a:defRPr>
+            </a:lvl1pPr>
+          </a:lstStyle>
+          <a:p>
+            <a:pPr algn="ctr">
+              <a:spcAft>
+                <a:spcPts val="800"/>
+              </a:spcAft>
+            </a:pPr>
+            <a:r>
+              <a:rPr lang="pt-BR" sz="5400" b="1" dirty="0">
+                <a:latin typeface="+mn-lt"/>
+              </a:rPr>
+              <a:t>Implementação</a:t>
+            </a:r>
+          </a:p>
+        </p:txBody>
+      </p:sp>
+      <p:sp>
+        <p:nvSpPr>
+          <p:cNvPr id="5" name="Retângulo 4">
+            <a:extLst>
+              <a:ext uri="{FF2B5EF4-FFF2-40B4-BE49-F238E27FC236}">
+                <a16:creationId xmlns:a16="http://schemas.microsoft.com/office/drawing/2014/main" id="{AB3E3207-79FD-8BA6-2C3C-C688AC8BC4CE}"/>
+              </a:ext>
+            </a:extLst>
+          </p:cNvPr>
+          <p:cNvSpPr/>
+          <p:nvPr/>
+        </p:nvSpPr>
+        <p:spPr>
+          <a:xfrm>
+            <a:off x="3473088" y="2076308"/>
+            <a:ext cx="1780162" cy="773349"/>
+          </a:xfrm>
+          <a:prstGeom prst="rect">
+            <a:avLst/>
+          </a:prstGeom>
+          <a:noFill/>
+          <a:ln w="57150">
+            <a:solidFill>
+              <a:srgbClr val="A50000"/>
+            </a:solidFill>
+          </a:ln>
+        </p:spPr>
+        <p:style>
+          <a:lnRef idx="2">
+            <a:schemeClr val="accent1">
+              <a:shade val="15000"/>
+            </a:schemeClr>
+          </a:lnRef>
+          <a:fillRef idx="1">
+            <a:schemeClr val="accent1"/>
+          </a:fillRef>
+          <a:effectRef idx="0">
+            <a:schemeClr val="accent1"/>
+          </a:effectRef>
+          <a:fontRef idx="minor">
+            <a:schemeClr val="lt1"/>
+          </a:fontRef>
+        </p:style>
+        <p:txBody>
+          <a:bodyPr rtlCol="0" anchor="ctr"/>
+          <a:lstStyle/>
+          <a:p>
+            <a:pPr algn="ctr"/>
+            <a:r>
+              <a:rPr lang="pt-BR" sz="2800" b="1" dirty="0">
+                <a:solidFill>
+                  <a:srgbClr val="A50000"/>
+                </a:solidFill>
+              </a:rPr>
+              <a:t>Sprint 1</a:t>
+            </a:r>
+          </a:p>
+        </p:txBody>
+      </p:sp>
+      <p:sp>
+        <p:nvSpPr>
+          <p:cNvPr id="6" name="CaixaDeTexto 5">
+            <a:extLst>
+              <a:ext uri="{FF2B5EF4-FFF2-40B4-BE49-F238E27FC236}">
+                <a16:creationId xmlns:a16="http://schemas.microsoft.com/office/drawing/2014/main" id="{1CECF080-DE46-E448-7E7F-D5E9BFA797AE}"/>
+              </a:ext>
+            </a:extLst>
+          </p:cNvPr>
+          <p:cNvSpPr txBox="1"/>
+          <p:nvPr/>
+        </p:nvSpPr>
+        <p:spPr>
+          <a:xfrm>
+            <a:off x="2979409" y="2988151"/>
+            <a:ext cx="2767519" cy="707886"/>
+          </a:xfrm>
+          <a:prstGeom prst="rect">
+            <a:avLst/>
+          </a:prstGeom>
+          <a:noFill/>
+        </p:spPr>
+        <p:txBody>
+          <a:bodyPr wrap="square" rtlCol="0">
+            <a:spAutoFit/>
+          </a:bodyPr>
+          <a:lstStyle/>
+          <a:p>
+            <a:pPr marL="0" indent="0" algn="ctr" rtl="0" eaLnBrk="1" latinLnBrk="0" hangingPunct="1">
+              <a:spcBef>
+                <a:spcPts val="250"/>
+              </a:spcBef>
+              <a:spcAft>
+                <a:spcPts val="250"/>
+              </a:spcAft>
+              <a:buNone/>
+            </a:pPr>
+            <a:r>
+              <a:rPr lang="pt-BR" sz="2000" kern="100" dirty="0">
+                <a:solidFill>
+                  <a:schemeClr val="tx1">
+                    <a:lumMod val="65000"/>
+                    <a:lumOff val="35000"/>
+                  </a:schemeClr>
+                </a:solidFill>
+                <a:effectLst/>
+                <a:ea typeface="Calibri" panose="020F0502020204030204" pitchFamily="34" charset="0"/>
+                <a:cs typeface="Helvetica" panose="020B0604020202020204" pitchFamily="34" charset="0"/>
+              </a:rPr>
+              <a:t>Formulário de </a:t>
+            </a:r>
+            <a:br>
+              <a:rPr lang="pt-BR" sz="2000" kern="100" dirty="0">
+                <a:solidFill>
+                  <a:schemeClr val="tx1">
+                    <a:lumMod val="65000"/>
+                    <a:lumOff val="35000"/>
+                  </a:schemeClr>
+                </a:solidFill>
+                <a:effectLst/>
+                <a:ea typeface="Calibri" panose="020F0502020204030204" pitchFamily="34" charset="0"/>
+                <a:cs typeface="Helvetica" panose="020B0604020202020204" pitchFamily="34" charset="0"/>
+              </a:rPr>
+            </a:br>
+            <a:r>
+              <a:rPr lang="pt-BR" sz="2000" kern="100" dirty="0">
+                <a:solidFill>
+                  <a:schemeClr val="tx1">
+                    <a:lumMod val="65000"/>
+                    <a:lumOff val="35000"/>
+                  </a:schemeClr>
+                </a:solidFill>
+                <a:effectLst/>
+                <a:ea typeface="Calibri" panose="020F0502020204030204" pitchFamily="34" charset="0"/>
+                <a:cs typeface="Helvetica" panose="020B0604020202020204" pitchFamily="34" charset="0"/>
+              </a:rPr>
+              <a:t>justificativa de faltas.</a:t>
+            </a:r>
+          </a:p>
+        </p:txBody>
+      </p:sp>
+      <p:sp>
+        <p:nvSpPr>
+          <p:cNvPr id="9" name="Retângulo 8">
+            <a:extLst>
+              <a:ext uri="{FF2B5EF4-FFF2-40B4-BE49-F238E27FC236}">
+                <a16:creationId xmlns:a16="http://schemas.microsoft.com/office/drawing/2014/main" id="{860A6339-B913-4734-66AF-B1E4E6F3C29A}"/>
+              </a:ext>
+            </a:extLst>
+          </p:cNvPr>
+          <p:cNvSpPr/>
+          <p:nvPr/>
+        </p:nvSpPr>
+        <p:spPr>
+          <a:xfrm>
+            <a:off x="6854973" y="2076308"/>
+            <a:ext cx="1780162" cy="773349"/>
+          </a:xfrm>
+          <a:prstGeom prst="rect">
+            <a:avLst/>
+          </a:prstGeom>
+          <a:noFill/>
+          <a:ln w="57150">
+            <a:solidFill>
+              <a:srgbClr val="A50000"/>
+            </a:solidFill>
+          </a:ln>
+        </p:spPr>
+        <p:style>
+          <a:lnRef idx="2">
+            <a:schemeClr val="accent1">
+              <a:shade val="15000"/>
+            </a:schemeClr>
+          </a:lnRef>
+          <a:fillRef idx="1">
+            <a:schemeClr val="accent1"/>
+          </a:fillRef>
+          <a:effectRef idx="0">
+            <a:schemeClr val="accent1"/>
+          </a:effectRef>
+          <a:fontRef idx="minor">
+            <a:schemeClr val="lt1"/>
+          </a:fontRef>
+        </p:style>
+        <p:txBody>
+          <a:bodyPr rtlCol="0" anchor="ctr"/>
+          <a:lstStyle/>
+          <a:p>
+            <a:pPr algn="ctr"/>
+            <a:r>
+              <a:rPr lang="pt-BR" sz="2800" b="1" dirty="0">
+                <a:solidFill>
+                  <a:srgbClr val="A50000"/>
+                </a:solidFill>
+              </a:rPr>
+              <a:t>Sprint 2</a:t>
+            </a:r>
+          </a:p>
+        </p:txBody>
+      </p:sp>
+      <p:sp>
+        <p:nvSpPr>
+          <p:cNvPr id="10" name="CaixaDeTexto 9">
+            <a:extLst>
+              <a:ext uri="{FF2B5EF4-FFF2-40B4-BE49-F238E27FC236}">
+                <a16:creationId xmlns:a16="http://schemas.microsoft.com/office/drawing/2014/main" id="{59B880C7-055C-25BA-4F7A-845743B697EE}"/>
+              </a:ext>
+            </a:extLst>
+          </p:cNvPr>
+          <p:cNvSpPr txBox="1"/>
+          <p:nvPr/>
+        </p:nvSpPr>
+        <p:spPr>
+          <a:xfrm>
+            <a:off x="5889685" y="2988151"/>
+            <a:ext cx="3754876" cy="707886"/>
+          </a:xfrm>
+          <a:prstGeom prst="rect">
+            <a:avLst/>
+          </a:prstGeom>
+          <a:noFill/>
+        </p:spPr>
+        <p:txBody>
+          <a:bodyPr wrap="square" rtlCol="0">
+            <a:spAutoFit/>
+          </a:bodyPr>
+          <a:lstStyle/>
+          <a:p>
+            <a:pPr marL="0" indent="0" algn="ctr" rtl="0" eaLnBrk="1" latinLnBrk="0" hangingPunct="1">
+              <a:spcBef>
+                <a:spcPts val="250"/>
+              </a:spcBef>
+              <a:spcAft>
+                <a:spcPts val="250"/>
+              </a:spcAft>
+              <a:buNone/>
+            </a:pPr>
+            <a:r>
+              <a:rPr lang="pt-BR" sz="2000" kern="100" dirty="0">
+                <a:solidFill>
+                  <a:schemeClr val="tx1">
+                    <a:lumMod val="65000"/>
+                    <a:lumOff val="35000"/>
+                  </a:schemeClr>
+                </a:solidFill>
+                <a:effectLst/>
+                <a:ea typeface="Calibri" panose="020F0502020204030204" pitchFamily="34" charset="0"/>
+                <a:cs typeface="Helvetica" panose="020B0604020202020204" pitchFamily="34" charset="0"/>
+              </a:rPr>
+              <a:t>Formulário de plano </a:t>
+            </a:r>
+            <a:br>
+              <a:rPr lang="pt-BR" sz="2000" kern="100" dirty="0">
+                <a:solidFill>
+                  <a:schemeClr val="tx1">
+                    <a:lumMod val="65000"/>
+                    <a:lumOff val="35000"/>
+                  </a:schemeClr>
+                </a:solidFill>
+                <a:effectLst/>
+                <a:ea typeface="Calibri" panose="020F0502020204030204" pitchFamily="34" charset="0"/>
+                <a:cs typeface="Helvetica" panose="020B0604020202020204" pitchFamily="34" charset="0"/>
+              </a:rPr>
+            </a:br>
+            <a:r>
+              <a:rPr lang="pt-BR" sz="2000" kern="100" dirty="0">
+                <a:solidFill>
+                  <a:schemeClr val="tx1">
+                    <a:lumMod val="65000"/>
+                    <a:lumOff val="35000"/>
+                  </a:schemeClr>
+                </a:solidFill>
+                <a:effectLst/>
+                <a:ea typeface="Calibri" panose="020F0502020204030204" pitchFamily="34" charset="0"/>
+                <a:cs typeface="Helvetica" panose="020B0604020202020204" pitchFamily="34" charset="0"/>
+              </a:rPr>
+              <a:t>de reposição.</a:t>
+            </a:r>
+            <a:endParaRPr lang="pt-BR" sz="2000" kern="100" dirty="0">
+              <a:solidFill>
+                <a:schemeClr val="tx1">
+                  <a:lumMod val="65000"/>
+                  <a:lumOff val="35000"/>
+                </a:schemeClr>
+              </a:solidFill>
+              <a:ea typeface="Calibri" panose="020F0502020204030204" pitchFamily="34" charset="0"/>
+              <a:cs typeface="Helvetica" panose="020B0604020202020204" pitchFamily="34" charset="0"/>
+            </a:endParaRPr>
+          </a:p>
+        </p:txBody>
+      </p:sp>
+      <p:sp>
+        <p:nvSpPr>
+          <p:cNvPr id="11" name="Retângulo 10">
+            <a:extLst>
+              <a:ext uri="{FF2B5EF4-FFF2-40B4-BE49-F238E27FC236}">
+                <a16:creationId xmlns:a16="http://schemas.microsoft.com/office/drawing/2014/main" id="{249AACFE-6A30-C371-6C39-C5F0E2700EB8}"/>
+              </a:ext>
+            </a:extLst>
+          </p:cNvPr>
+          <p:cNvSpPr/>
+          <p:nvPr/>
+        </p:nvSpPr>
+        <p:spPr>
+          <a:xfrm>
+            <a:off x="6892795" y="4436544"/>
+            <a:ext cx="1780162" cy="773349"/>
+          </a:xfrm>
+          <a:prstGeom prst="rect">
+            <a:avLst/>
+          </a:prstGeom>
+          <a:noFill/>
+          <a:ln w="57150">
+            <a:solidFill>
+              <a:srgbClr val="A50000"/>
+            </a:solidFill>
+          </a:ln>
+        </p:spPr>
+        <p:style>
+          <a:lnRef idx="2">
+            <a:schemeClr val="accent1">
+              <a:shade val="15000"/>
+            </a:schemeClr>
+          </a:lnRef>
+          <a:fillRef idx="1">
+            <a:schemeClr val="accent1"/>
+          </a:fillRef>
+          <a:effectRef idx="0">
+            <a:schemeClr val="accent1"/>
+          </a:effectRef>
+          <a:fontRef idx="minor">
+            <a:schemeClr val="lt1"/>
+          </a:fontRef>
+        </p:style>
+        <p:txBody>
+          <a:bodyPr rtlCol="0" anchor="ctr"/>
+          <a:lstStyle/>
+          <a:p>
+            <a:pPr algn="ctr"/>
+            <a:r>
+              <a:rPr lang="pt-BR" sz="2800" b="1" dirty="0">
+                <a:solidFill>
+                  <a:srgbClr val="A50000"/>
+                </a:solidFill>
+              </a:rPr>
+              <a:t>Sprint 4</a:t>
+            </a:r>
+          </a:p>
+        </p:txBody>
+      </p:sp>
+      <p:sp>
+        <p:nvSpPr>
+          <p:cNvPr id="12" name="CaixaDeTexto 11">
+            <a:extLst>
+              <a:ext uri="{FF2B5EF4-FFF2-40B4-BE49-F238E27FC236}">
+                <a16:creationId xmlns:a16="http://schemas.microsoft.com/office/drawing/2014/main" id="{9C3ED831-0514-4C24-D5BA-17C72D887540}"/>
+              </a:ext>
+            </a:extLst>
+          </p:cNvPr>
+          <p:cNvSpPr txBox="1"/>
+          <p:nvPr/>
+        </p:nvSpPr>
+        <p:spPr>
+          <a:xfrm>
+            <a:off x="5905438" y="5348387"/>
+            <a:ext cx="3754876" cy="707886"/>
+          </a:xfrm>
+          <a:prstGeom prst="rect">
+            <a:avLst/>
+          </a:prstGeom>
+          <a:noFill/>
+        </p:spPr>
+        <p:txBody>
+          <a:bodyPr wrap="square" rtlCol="0">
+            <a:spAutoFit/>
+          </a:bodyPr>
+          <a:lstStyle/>
+          <a:p>
+            <a:pPr marL="0" indent="0" algn="ctr" rtl="0" eaLnBrk="1" latinLnBrk="0" hangingPunct="1">
+              <a:spcBef>
+                <a:spcPts val="250"/>
+              </a:spcBef>
+              <a:spcAft>
+                <a:spcPts val="250"/>
+              </a:spcAft>
+              <a:buNone/>
+            </a:pPr>
+            <a:r>
+              <a:rPr lang="pt-BR" sz="2000" kern="100" dirty="0">
+                <a:solidFill>
+                  <a:schemeClr val="tx1">
+                    <a:lumMod val="65000"/>
+                    <a:lumOff val="35000"/>
+                  </a:schemeClr>
+                </a:solidFill>
+                <a:effectLst/>
+                <a:ea typeface="Calibri" panose="020F0502020204030204" pitchFamily="34" charset="0"/>
+                <a:cs typeface="Helvetica" panose="020B0604020202020204" pitchFamily="34" charset="0"/>
+              </a:rPr>
+              <a:t>Autenticação de usuário </a:t>
+            </a:r>
+            <a:br>
+              <a:rPr lang="pt-BR" sz="2000" kern="100" dirty="0">
+                <a:solidFill>
+                  <a:schemeClr val="tx1">
+                    <a:lumMod val="65000"/>
+                    <a:lumOff val="35000"/>
+                  </a:schemeClr>
+                </a:solidFill>
+                <a:effectLst/>
+                <a:ea typeface="Calibri" panose="020F0502020204030204" pitchFamily="34" charset="0"/>
+                <a:cs typeface="Helvetica" panose="020B0604020202020204" pitchFamily="34" charset="0"/>
+              </a:rPr>
+            </a:br>
+            <a:r>
+              <a:rPr lang="pt-BR" sz="2000" kern="100" dirty="0">
+                <a:solidFill>
+                  <a:schemeClr val="tx1">
+                    <a:lumMod val="65000"/>
+                    <a:lumOff val="35000"/>
+                  </a:schemeClr>
+                </a:solidFill>
+                <a:effectLst/>
+                <a:ea typeface="Calibri" panose="020F0502020204030204" pitchFamily="34" charset="0"/>
+                <a:cs typeface="Helvetica" panose="020B0604020202020204" pitchFamily="34" charset="0"/>
+              </a:rPr>
+              <a:t>e geração de PDF</a:t>
+            </a:r>
+            <a:endParaRPr lang="pt-BR" sz="2000" dirty="0">
+              <a:solidFill>
+                <a:schemeClr val="tx1">
+                  <a:lumMod val="65000"/>
+                  <a:lumOff val="35000"/>
+                </a:schemeClr>
+              </a:solidFill>
+              <a:effectLst/>
+              <a:cs typeface="Helvetica" panose="020B0604020202020204" pitchFamily="34" charset="0"/>
+            </a:endParaRPr>
+          </a:p>
+        </p:txBody>
+      </p:sp>
+      <p:sp>
+        <p:nvSpPr>
+          <p:cNvPr id="13" name="Retângulo 12">
+            <a:extLst>
+              <a:ext uri="{FF2B5EF4-FFF2-40B4-BE49-F238E27FC236}">
+                <a16:creationId xmlns:a16="http://schemas.microsoft.com/office/drawing/2014/main" id="{68F4028B-6928-866E-4DB0-F93E5A914B0A}"/>
+              </a:ext>
+            </a:extLst>
+          </p:cNvPr>
+          <p:cNvSpPr/>
+          <p:nvPr/>
+        </p:nvSpPr>
+        <p:spPr>
+          <a:xfrm>
+            <a:off x="3473088" y="4431680"/>
+            <a:ext cx="1780162" cy="773349"/>
+          </a:xfrm>
+          <a:prstGeom prst="rect">
+            <a:avLst/>
+          </a:prstGeom>
+          <a:noFill/>
+          <a:ln w="57150">
+            <a:solidFill>
+              <a:srgbClr val="A50000"/>
+            </a:solidFill>
+          </a:ln>
+        </p:spPr>
+        <p:style>
+          <a:lnRef idx="2">
+            <a:schemeClr val="accent1">
+              <a:shade val="15000"/>
+            </a:schemeClr>
+          </a:lnRef>
+          <a:fillRef idx="1">
+            <a:schemeClr val="accent1"/>
+          </a:fillRef>
+          <a:effectRef idx="0">
+            <a:schemeClr val="accent1"/>
+          </a:effectRef>
+          <a:fontRef idx="minor">
+            <a:schemeClr val="lt1"/>
+          </a:fontRef>
+        </p:style>
+        <p:txBody>
+          <a:bodyPr rtlCol="0" anchor="ctr"/>
+          <a:lstStyle/>
+          <a:p>
+            <a:pPr algn="ctr"/>
+            <a:r>
+              <a:rPr lang="pt-BR" sz="2800" b="1" dirty="0">
+                <a:solidFill>
+                  <a:srgbClr val="A50000"/>
+                </a:solidFill>
+              </a:rPr>
+              <a:t>Sprint 3</a:t>
+            </a:r>
+          </a:p>
+        </p:txBody>
+      </p:sp>
+      <p:sp>
+        <p:nvSpPr>
+          <p:cNvPr id="14" name="CaixaDeTexto 13">
+            <a:extLst>
+              <a:ext uri="{FF2B5EF4-FFF2-40B4-BE49-F238E27FC236}">
+                <a16:creationId xmlns:a16="http://schemas.microsoft.com/office/drawing/2014/main" id="{D325D3F2-3ABC-9A9E-AD32-F002424CAF48}"/>
+              </a:ext>
+            </a:extLst>
+          </p:cNvPr>
+          <p:cNvSpPr txBox="1"/>
+          <p:nvPr/>
+        </p:nvSpPr>
+        <p:spPr>
+          <a:xfrm>
+            <a:off x="2496766" y="5373290"/>
+            <a:ext cx="3754876" cy="707886"/>
+          </a:xfrm>
+          <a:prstGeom prst="rect">
+            <a:avLst/>
+          </a:prstGeom>
+          <a:noFill/>
+        </p:spPr>
+        <p:txBody>
+          <a:bodyPr wrap="square" rtlCol="0">
+            <a:spAutoFit/>
+          </a:bodyPr>
+          <a:lstStyle/>
+          <a:p>
+            <a:pPr marL="0" indent="0" algn="ctr" rtl="0" eaLnBrk="1" latinLnBrk="0" hangingPunct="1">
+              <a:spcBef>
+                <a:spcPts val="250"/>
+              </a:spcBef>
+              <a:spcAft>
+                <a:spcPts val="250"/>
+              </a:spcAft>
+              <a:buNone/>
+            </a:pPr>
+            <a:r>
+              <a:rPr lang="pt-BR" sz="2000" kern="100" dirty="0">
+                <a:solidFill>
+                  <a:schemeClr val="tx1">
+                    <a:lumMod val="65000"/>
+                    <a:lumOff val="35000"/>
+                  </a:schemeClr>
+                </a:solidFill>
+                <a:effectLst/>
+                <a:ea typeface="Calibri" panose="020F0502020204030204" pitchFamily="34" charset="0"/>
+                <a:cs typeface="Helvetica" panose="020B0604020202020204" pitchFamily="34" charset="0"/>
+              </a:rPr>
+              <a:t>Visualização e aprovação </a:t>
+            </a:r>
+            <a:br>
+              <a:rPr lang="pt-BR" sz="2000" kern="100" dirty="0">
+                <a:solidFill>
+                  <a:schemeClr val="tx1">
+                    <a:lumMod val="65000"/>
+                    <a:lumOff val="35000"/>
+                  </a:schemeClr>
+                </a:solidFill>
+                <a:effectLst/>
+                <a:ea typeface="Calibri" panose="020F0502020204030204" pitchFamily="34" charset="0"/>
+                <a:cs typeface="Helvetica" panose="020B0604020202020204" pitchFamily="34" charset="0"/>
+              </a:rPr>
+            </a:br>
+            <a:r>
+              <a:rPr lang="pt-BR" sz="2000" kern="100" dirty="0">
+                <a:solidFill>
+                  <a:schemeClr val="tx1">
+                    <a:lumMod val="65000"/>
+                    <a:lumOff val="35000"/>
+                  </a:schemeClr>
+                </a:solidFill>
+                <a:effectLst/>
+                <a:ea typeface="Calibri" panose="020F0502020204030204" pitchFamily="34" charset="0"/>
+                <a:cs typeface="Helvetica" panose="020B0604020202020204" pitchFamily="34" charset="0"/>
+              </a:rPr>
+              <a:t>dos formulários.</a:t>
+            </a:r>
+          </a:p>
+        </p:txBody>
+      </p:sp>
+      <p:cxnSp>
+        <p:nvCxnSpPr>
+          <p:cNvPr id="16" name="Conector reto 15">
+            <a:extLst>
+              <a:ext uri="{FF2B5EF4-FFF2-40B4-BE49-F238E27FC236}">
+                <a16:creationId xmlns:a16="http://schemas.microsoft.com/office/drawing/2014/main" id="{DDA0F973-6C9D-23B0-09FD-607614873CD7}"/>
+              </a:ext>
+            </a:extLst>
+          </p:cNvPr>
+          <p:cNvCxnSpPr/>
+          <p:nvPr/>
+        </p:nvCxnSpPr>
+        <p:spPr>
+          <a:xfrm>
+            <a:off x="530942" y="324465"/>
+            <a:ext cx="0" cy="6164825"/>
+          </a:xfrm>
+          <a:prstGeom prst="line">
+            <a:avLst/>
+          </a:prstGeom>
+          <a:ln w="57150">
+            <a:solidFill>
+              <a:srgbClr val="A50000"/>
+            </a:solidFill>
+          </a:ln>
+        </p:spPr>
+        <p:style>
+          <a:lnRef idx="1">
+            <a:schemeClr val="accent1"/>
+          </a:lnRef>
+          <a:fillRef idx="0">
+            <a:schemeClr val="accent1"/>
+          </a:fillRef>
+          <a:effectRef idx="0">
+            <a:schemeClr val="accent1"/>
+          </a:effectRef>
+          <a:fontRef idx="minor">
+            <a:schemeClr val="tx1"/>
+          </a:fontRef>
+        </p:style>
+      </p:cxnSp>
+      <p:cxnSp>
+        <p:nvCxnSpPr>
+          <p:cNvPr id="17" name="Conector reto 16">
+            <a:extLst>
+              <a:ext uri="{FF2B5EF4-FFF2-40B4-BE49-F238E27FC236}">
+                <a16:creationId xmlns:a16="http://schemas.microsoft.com/office/drawing/2014/main" id="{F549B772-E89F-8B65-B99F-F6D7F43A5E5C}"/>
+              </a:ext>
+            </a:extLst>
+          </p:cNvPr>
+          <p:cNvCxnSpPr/>
+          <p:nvPr/>
+        </p:nvCxnSpPr>
+        <p:spPr>
+          <a:xfrm>
+            <a:off x="11675597" y="324465"/>
+            <a:ext cx="0" cy="6164825"/>
+          </a:xfrm>
+          <a:prstGeom prst="line">
+            <a:avLst/>
+          </a:prstGeom>
+          <a:ln w="57150">
+            <a:solidFill>
+              <a:srgbClr val="A50000"/>
+            </a:solidFill>
+          </a:ln>
+        </p:spPr>
+        <p:style>
+          <a:lnRef idx="1">
+            <a:schemeClr val="accent1"/>
+          </a:lnRef>
+          <a:fillRef idx="0">
+            <a:schemeClr val="accent1"/>
+          </a:fillRef>
+          <a:effectRef idx="0">
+            <a:schemeClr val="accent1"/>
+          </a:effectRef>
+          <a:fontRef idx="minor">
+            <a:schemeClr val="tx1"/>
+          </a:fontRef>
+        </p:style>
+      </p:cxnSp>
+    </p:spTree>
+    <p:extLst>
+      <p:ext uri="{BB962C8B-B14F-4D97-AF65-F5344CB8AC3E}">
+        <p14:creationId xmlns:p14="http://schemas.microsoft.com/office/powerpoint/2010/main" val="1694765811"/>
+      </p:ext>
+    </p:extLst>
+  </p:cSld>
+  <p:clrMapOvr>
+    <a:masterClrMapping/>
+  </p:clrMapOvr>
+</p:sld>
+</file>
+
+<file path=ppt/slides/slide12.xml><?xml version="1.0" encoding="utf-8"?>
+<p:sld xmlns:a="http://schemas.openxmlformats.org/drawingml/2006/main" xmlns:r="http://schemas.openxmlformats.org/officeDocument/2006/relationships" xmlns:p="http://schemas.openxmlformats.org/presentationml/2006/main">
+  <p:cSld>
+    <p:bg>
+      <p:bgPr>
+        <a:solidFill>
+          <a:schemeClr val="bg1"/>
+        </a:solidFill>
+        <a:effectLst/>
+      </p:bgPr>
+    </p:bg>
+    <p:spTree>
+      <p:nvGrpSpPr>
+        <p:cNvPr id="1" name=""/>
+        <p:cNvGrpSpPr/>
+        <p:nvPr/>
+      </p:nvGrpSpPr>
+      <p:grpSpPr>
+        <a:xfrm>
+          <a:off x="0" y="0"/>
+          <a:ext cx="0" cy="0"/>
+          <a:chOff x="0" y="0"/>
+          <a:chExt cx="0" cy="0"/>
+        </a:xfrm>
+      </p:grpSpPr>
+      <p:sp useBgFill="1">
+        <p:nvSpPr>
+          <p:cNvPr id="53" name="Rectangle 52">
+            <a:extLst>
+              <a:ext uri="{FF2B5EF4-FFF2-40B4-BE49-F238E27FC236}">
+                <a16:creationId xmlns:a16="http://schemas.microsoft.com/office/drawing/2014/main" id="{2C61293E-6EBE-43EF-A52C-9BEBFD7679D4}"/>
+              </a:ext>
+              <a:ext uri="{C183D7F6-B498-43B3-948B-1728B52AA6E4}">
+                <adec:decorative xmlns:adec="http://schemas.microsoft.com/office/drawing/2017/decorative" val="1"/>
+              </a:ext>
+            </a:extLst>
+          </p:cNvPr>
+          <p:cNvSpPr>
+            <a:spLocks noGrp="1" noRot="1" noChangeAspect="1" noMove="1" noResize="1" noEditPoints="1" noAdjustHandles="1" noChangeArrowheads="1" noChangeShapeType="1" noTextEdit="1"/>
+          </p:cNvSpPr>
+          <p:nvPr>
+            <p:extLst>
+              <p:ext uri="{386F3935-93C4-4BCD-93E2-E3B085C9AB24}">
+                <p16:designElem xmlns:p16="http://schemas.microsoft.com/office/powerpoint/2015/main" val="1"/>
+              </p:ext>
+            </p:extLst>
+          </p:nvPr>
+        </p:nvSpPr>
+        <p:spPr>
+          <a:xfrm>
+            <a:off x="0" y="0"/>
+            <a:ext cx="12188952" cy="6858000"/>
+          </a:xfrm>
+          <a:prstGeom prst="rect">
+            <a:avLst/>
+          </a:prstGeom>
+          <a:ln>
+            <a:noFill/>
+          </a:ln>
+        </p:spPr>
+        <p:style>
+          <a:lnRef idx="2">
+            <a:schemeClr val="accent1">
+              <a:shade val="50000"/>
+            </a:schemeClr>
+          </a:lnRef>
+          <a:fillRef idx="1">
+            <a:schemeClr val="accent1"/>
+          </a:fillRef>
+          <a:effectRef idx="0">
+            <a:schemeClr val="accent1"/>
+          </a:effectRef>
+          <a:fontRef idx="minor">
+            <a:schemeClr val="lt1"/>
+          </a:fontRef>
+        </p:style>
+        <p:txBody>
+          <a:bodyPr rtlCol="0" anchor="ctr"/>
+          <a:lstStyle/>
+          <a:p>
+            <a:pPr algn="ctr"/>
+            <a:endParaRPr lang="en-US"/>
+          </a:p>
+        </p:txBody>
+      </p:sp>
+      <p:sp>
+        <p:nvSpPr>
+          <p:cNvPr id="2" name="Título 1">
+            <a:extLst>
+              <a:ext uri="{FF2B5EF4-FFF2-40B4-BE49-F238E27FC236}">
+                <a16:creationId xmlns:a16="http://schemas.microsoft.com/office/drawing/2014/main" id="{B5F29AA7-0676-B8E5-256F-B8257A37A4EB}"/>
+              </a:ext>
+            </a:extLst>
+          </p:cNvPr>
+          <p:cNvSpPr>
+            <a:spLocks noGrp="1"/>
+          </p:cNvSpPr>
+          <p:nvPr>
+            <p:ph type="title"/>
+          </p:nvPr>
+        </p:nvSpPr>
+        <p:spPr>
+          <a:xfrm>
+            <a:off x="5297762" y="329184"/>
+            <a:ext cx="6251110" cy="1783080"/>
+          </a:xfrm>
+        </p:spPr>
+        <p:txBody>
+          <a:bodyPr anchor="b">
+            <a:normAutofit/>
+          </a:bodyPr>
+          <a:lstStyle/>
+          <a:p>
+            <a:r>
+              <a:rPr lang="pt-BR" sz="5400" b="1">
+                <a:effectLst/>
+                <a:latin typeface="Calibri" panose="020F0502020204030204" pitchFamily="34" charset="0"/>
+                <a:ea typeface="Calibri" panose="020F0502020204030204" pitchFamily="34" charset="0"/>
+                <a:cs typeface="Times New Roman" panose="02020603050405020304" pitchFamily="18" charset="0"/>
+              </a:rPr>
+              <a:t>Tecnologias Utilizadas</a:t>
+            </a:r>
+            <a:endParaRPr lang="pt-BR" sz="5400" b="1"/>
+          </a:p>
+        </p:txBody>
+      </p:sp>
+      <p:pic>
+        <p:nvPicPr>
+          <p:cNvPr id="16" name="Picture 15" descr="Script de computador em uma tela">
+            <a:extLst>
+              <a:ext uri="{FF2B5EF4-FFF2-40B4-BE49-F238E27FC236}">
+                <a16:creationId xmlns:a16="http://schemas.microsoft.com/office/drawing/2014/main" id="{09038183-57B3-D49D-BDCA-1909565EAAF1}"/>
+              </a:ext>
+            </a:extLst>
+          </p:cNvPr>
+          <p:cNvPicPr>
+            <a:picLocks noChangeAspect="1"/>
+          </p:cNvPicPr>
+          <p:nvPr/>
+        </p:nvPicPr>
+        <p:blipFill rotWithShape="1">
+          <a:blip r:embed="rId2"/>
+          <a:srcRect l="7122" r="47547" b="-1"/>
+          <a:stretch/>
+        </p:blipFill>
+        <p:spPr>
+          <a:xfrm>
+            <a:off x="1" y="10"/>
+            <a:ext cx="4657344" cy="6857990"/>
+          </a:xfrm>
+          <a:custGeom>
+            <a:avLst/>
+            <a:gdLst/>
+            <a:ahLst/>
+            <a:cxnLst/>
+            <a:rect l="l" t="t" r="r" b="b"/>
+            <a:pathLst>
+              <a:path w="4657344" h="6858000">
+                <a:moveTo>
+                  <a:pt x="0" y="0"/>
+                </a:moveTo>
+                <a:lnTo>
+                  <a:pt x="3429755" y="0"/>
+                </a:lnTo>
+                <a:lnTo>
+                  <a:pt x="3526016" y="148742"/>
+                </a:lnTo>
+                <a:cubicBezTo>
+                  <a:pt x="3657740" y="365513"/>
+                  <a:pt x="3777402" y="589569"/>
+                  <a:pt x="3886489" y="819975"/>
+                </a:cubicBezTo>
+                <a:cubicBezTo>
+                  <a:pt x="3891856" y="833492"/>
+                  <a:pt x="3900663" y="845393"/>
+                  <a:pt x="3912049" y="854514"/>
+                </a:cubicBezTo>
+                <a:cubicBezTo>
+                  <a:pt x="3897352" y="819849"/>
+                  <a:pt x="3883037" y="784928"/>
+                  <a:pt x="3868083" y="750263"/>
+                </a:cubicBezTo>
+                <a:cubicBezTo>
+                  <a:pt x="3806989" y="608712"/>
+                  <a:pt x="3742478" y="469145"/>
+                  <a:pt x="3674155" y="331786"/>
+                </a:cubicBezTo>
+                <a:lnTo>
+                  <a:pt x="3496656" y="0"/>
+                </a:lnTo>
+                <a:lnTo>
+                  <a:pt x="3554371" y="0"/>
+                </a:lnTo>
+                <a:lnTo>
+                  <a:pt x="3661621" y="196614"/>
+                </a:lnTo>
+                <a:cubicBezTo>
+                  <a:pt x="3856899" y="573253"/>
+                  <a:pt x="4021071" y="966066"/>
+                  <a:pt x="4161279" y="1371196"/>
+                </a:cubicBezTo>
+                <a:cubicBezTo>
+                  <a:pt x="4379525" y="2007265"/>
+                  <a:pt x="4530141" y="2664286"/>
+                  <a:pt x="4610660" y="3331516"/>
+                </a:cubicBezTo>
+                <a:cubicBezTo>
+                  <a:pt x="4652837" y="3672965"/>
+                  <a:pt x="4671625" y="4013908"/>
+                  <a:pt x="4645040" y="4357388"/>
+                </a:cubicBezTo>
+                <a:cubicBezTo>
+                  <a:pt x="4613599" y="4758899"/>
+                  <a:pt x="4566181" y="5157998"/>
+                  <a:pt x="4485789" y="5552906"/>
+                </a:cubicBezTo>
+                <a:cubicBezTo>
+                  <a:pt x="4397121" y="5988893"/>
+                  <a:pt x="4276748" y="6414594"/>
+                  <a:pt x="4117769" y="6828295"/>
+                </a:cubicBezTo>
+                <a:lnTo>
+                  <a:pt x="4105288" y="6858000"/>
+                </a:lnTo>
+                <a:lnTo>
+                  <a:pt x="4052520" y="6858000"/>
+                </a:lnTo>
+                <a:lnTo>
+                  <a:pt x="4059369" y="6841549"/>
+                </a:lnTo>
+                <a:cubicBezTo>
+                  <a:pt x="4147276" y="6614016"/>
+                  <a:pt x="4224193" y="6380817"/>
+                  <a:pt x="4291518" y="6142729"/>
+                </a:cubicBezTo>
+                <a:cubicBezTo>
+                  <a:pt x="4350055" y="5935370"/>
+                  <a:pt x="4393256" y="5723695"/>
+                  <a:pt x="4443357" y="5513923"/>
+                </a:cubicBezTo>
+                <a:cubicBezTo>
+                  <a:pt x="4444541" y="5502788"/>
+                  <a:pt x="4445137" y="5491601"/>
+                  <a:pt x="4445146" y="5480401"/>
+                </a:cubicBezTo>
+                <a:cubicBezTo>
+                  <a:pt x="4408465" y="5607635"/>
+                  <a:pt x="4379196" y="5719759"/>
+                  <a:pt x="4344559" y="5830359"/>
+                </a:cubicBezTo>
+                <a:cubicBezTo>
+                  <a:pt x="4254261" y="6118381"/>
+                  <a:pt x="4150112" y="6398531"/>
+                  <a:pt x="4031702" y="6670527"/>
+                </a:cubicBezTo>
+                <a:lnTo>
+                  <a:pt x="3943824" y="6858000"/>
+                </a:lnTo>
+                <a:lnTo>
+                  <a:pt x="0" y="6858000"/>
+                </a:lnTo>
+                <a:close/>
+              </a:path>
+            </a:pathLst>
+          </a:custGeom>
+        </p:spPr>
+      </p:pic>
+      <p:sp>
+        <p:nvSpPr>
+          <p:cNvPr id="55" name="sketchy line">
+            <a:extLst>
+              <a:ext uri="{FF2B5EF4-FFF2-40B4-BE49-F238E27FC236}">
+                <a16:creationId xmlns:a16="http://schemas.microsoft.com/office/drawing/2014/main" id="{21540236-BFD5-4A9D-8840-4703E7F76825}"/>
+              </a:ext>
+              <a:ext uri="{C183D7F6-B498-43B3-948B-1728B52AA6E4}">
+                <adec:decorative xmlns:adec="http://schemas.microsoft.com/office/drawing/2017/decorative" val="1"/>
+              </a:ext>
+            </a:extLst>
+          </p:cNvPr>
+          <p:cNvSpPr>
+            <a:spLocks noGrp="1" noRot="1" noChangeAspect="1" noMove="1" noResize="1" noEditPoints="1" noAdjustHandles="1" noChangeArrowheads="1" noChangeShapeType="1" noTextEdit="1"/>
+          </p:cNvSpPr>
+          <p:nvPr>
+            <p:extLst>
+              <p:ext uri="{386F3935-93C4-4BCD-93E2-E3B085C9AB24}">
+                <p16:designElem xmlns:p16="http://schemas.microsoft.com/office/powerpoint/2015/main" val="1"/>
+              </p:ext>
+            </p:extLst>
+          </p:nvPr>
+        </p:nvSpPr>
+        <p:spPr>
+          <a:xfrm>
+            <a:off x="5297762" y="2374947"/>
+            <a:ext cx="4243589" cy="18288"/>
+          </a:xfrm>
+          <a:custGeom>
+            <a:avLst/>
+            <a:gdLst>
+              <a:gd name="connsiteX0" fmla="*/ 0 w 4243589"/>
+              <a:gd name="connsiteY0" fmla="*/ 0 h 18288"/>
+              <a:gd name="connsiteX1" fmla="*/ 478919 w 4243589"/>
+              <a:gd name="connsiteY1" fmla="*/ 0 h 18288"/>
+              <a:gd name="connsiteX2" fmla="*/ 957839 w 4243589"/>
+              <a:gd name="connsiteY2" fmla="*/ 0 h 18288"/>
+              <a:gd name="connsiteX3" fmla="*/ 1521630 w 4243589"/>
+              <a:gd name="connsiteY3" fmla="*/ 0 h 18288"/>
+              <a:gd name="connsiteX4" fmla="*/ 2212729 w 4243589"/>
+              <a:gd name="connsiteY4" fmla="*/ 0 h 18288"/>
+              <a:gd name="connsiteX5" fmla="*/ 2734084 w 4243589"/>
+              <a:gd name="connsiteY5" fmla="*/ 0 h 18288"/>
+              <a:gd name="connsiteX6" fmla="*/ 3255439 w 4243589"/>
+              <a:gd name="connsiteY6" fmla="*/ 0 h 18288"/>
+              <a:gd name="connsiteX7" fmla="*/ 4243589 w 4243589"/>
+              <a:gd name="connsiteY7" fmla="*/ 0 h 18288"/>
+              <a:gd name="connsiteX8" fmla="*/ 4243589 w 4243589"/>
+              <a:gd name="connsiteY8" fmla="*/ 18288 h 18288"/>
+              <a:gd name="connsiteX9" fmla="*/ 3594926 w 4243589"/>
+              <a:gd name="connsiteY9" fmla="*/ 18288 h 18288"/>
+              <a:gd name="connsiteX10" fmla="*/ 3073571 w 4243589"/>
+              <a:gd name="connsiteY10" fmla="*/ 18288 h 18288"/>
+              <a:gd name="connsiteX11" fmla="*/ 2552216 w 4243589"/>
+              <a:gd name="connsiteY11" fmla="*/ 18288 h 18288"/>
+              <a:gd name="connsiteX12" fmla="*/ 1903553 w 4243589"/>
+              <a:gd name="connsiteY12" fmla="*/ 18288 h 18288"/>
+              <a:gd name="connsiteX13" fmla="*/ 1212454 w 4243589"/>
+              <a:gd name="connsiteY13" fmla="*/ 18288 h 18288"/>
+              <a:gd name="connsiteX14" fmla="*/ 733535 w 4243589"/>
+              <a:gd name="connsiteY14" fmla="*/ 18288 h 18288"/>
+              <a:gd name="connsiteX15" fmla="*/ 0 w 4243589"/>
+              <a:gd name="connsiteY15" fmla="*/ 18288 h 18288"/>
+              <a:gd name="connsiteX16" fmla="*/ 0 w 4243589"/>
+              <a:gd name="connsiteY16" fmla="*/ 0 h 18288"/>
+            </a:gdLst>
+            <a:ahLst/>
+            <a:cxnLst>
+              <a:cxn ang="0">
+                <a:pos x="connsiteX0" y="connsiteY0"/>
+              </a:cxn>
+              <a:cxn ang="0">
+                <a:pos x="connsiteX1" y="connsiteY1"/>
+              </a:cxn>
+              <a:cxn ang="0">
+                <a:pos x="connsiteX2" y="connsiteY2"/>
+              </a:cxn>
+              <a:cxn ang="0">
+                <a:pos x="connsiteX3" y="connsiteY3"/>
+              </a:cxn>
+              <a:cxn ang="0">
+                <a:pos x="connsiteX4" y="connsiteY4"/>
+              </a:cxn>
+              <a:cxn ang="0">
+                <a:pos x="connsiteX5" y="connsiteY5"/>
+              </a:cxn>
+              <a:cxn ang="0">
+                <a:pos x="connsiteX6" y="connsiteY6"/>
+              </a:cxn>
+              <a:cxn ang="0">
+                <a:pos x="connsiteX7" y="connsiteY7"/>
+              </a:cxn>
+              <a:cxn ang="0">
+                <a:pos x="connsiteX8" y="connsiteY8"/>
+              </a:cxn>
+              <a:cxn ang="0">
+                <a:pos x="connsiteX9" y="connsiteY9"/>
+              </a:cxn>
+              <a:cxn ang="0">
+                <a:pos x="connsiteX10" y="connsiteY10"/>
+              </a:cxn>
+              <a:cxn ang="0">
+                <a:pos x="connsiteX11" y="connsiteY11"/>
+              </a:cxn>
+              <a:cxn ang="0">
+                <a:pos x="connsiteX12" y="connsiteY12"/>
+              </a:cxn>
+              <a:cxn ang="0">
+                <a:pos x="connsiteX13" y="connsiteY13"/>
+              </a:cxn>
+              <a:cxn ang="0">
+                <a:pos x="connsiteX14" y="connsiteY14"/>
+              </a:cxn>
+              <a:cxn ang="0">
+                <a:pos x="connsiteX15" y="connsiteY15"/>
+              </a:cxn>
+              <a:cxn ang="0">
+                <a:pos x="connsiteX16" y="connsiteY16"/>
+              </a:cxn>
+            </a:cxnLst>
+            <a:rect l="l" t="t" r="r" b="b"/>
+            <a:pathLst>
+              <a:path w="4243589" h="18288" fill="none" extrusionOk="0">
+                <a:moveTo>
+                  <a:pt x="0" y="0"/>
+                </a:moveTo>
+                <a:cubicBezTo>
+                  <a:pt x="213395" y="-21006"/>
+                  <a:pt x="307421" y="-18116"/>
+                  <a:pt x="478919" y="0"/>
+                </a:cubicBezTo>
+                <a:cubicBezTo>
+                  <a:pt x="650417" y="18116"/>
+                  <a:pt x="831092" y="-21237"/>
+                  <a:pt x="957839" y="0"/>
+                </a:cubicBezTo>
+                <a:cubicBezTo>
+                  <a:pt x="1084586" y="21237"/>
+                  <a:pt x="1301682" y="25124"/>
+                  <a:pt x="1521630" y="0"/>
+                </a:cubicBezTo>
+                <a:cubicBezTo>
+                  <a:pt x="1741578" y="-25124"/>
+                  <a:pt x="1970269" y="-29139"/>
+                  <a:pt x="2212729" y="0"/>
+                </a:cubicBezTo>
+                <a:cubicBezTo>
+                  <a:pt x="2455189" y="29139"/>
+                  <a:pt x="2558847" y="-4796"/>
+                  <a:pt x="2734084" y="0"/>
+                </a:cubicBezTo>
+                <a:cubicBezTo>
+                  <a:pt x="2909321" y="4796"/>
+                  <a:pt x="3097217" y="-13409"/>
+                  <a:pt x="3255439" y="0"/>
+                </a:cubicBezTo>
+                <a:cubicBezTo>
+                  <a:pt x="3413662" y="13409"/>
+                  <a:pt x="3979999" y="-10121"/>
+                  <a:pt x="4243589" y="0"/>
+                </a:cubicBezTo>
+                <a:cubicBezTo>
+                  <a:pt x="4244484" y="8974"/>
+                  <a:pt x="4243043" y="9359"/>
+                  <a:pt x="4243589" y="18288"/>
+                </a:cubicBezTo>
+                <a:cubicBezTo>
+                  <a:pt x="4058777" y="31246"/>
+                  <a:pt x="3910348" y="3158"/>
+                  <a:pt x="3594926" y="18288"/>
+                </a:cubicBezTo>
+                <a:cubicBezTo>
+                  <a:pt x="3279504" y="33418"/>
+                  <a:pt x="3319955" y="-3977"/>
+                  <a:pt x="3073571" y="18288"/>
+                </a:cubicBezTo>
+                <a:cubicBezTo>
+                  <a:pt x="2827187" y="40553"/>
+                  <a:pt x="2767387" y="1863"/>
+                  <a:pt x="2552216" y="18288"/>
+                </a:cubicBezTo>
+                <a:cubicBezTo>
+                  <a:pt x="2337046" y="34713"/>
+                  <a:pt x="2181871" y="19527"/>
+                  <a:pt x="1903553" y="18288"/>
+                </a:cubicBezTo>
+                <a:cubicBezTo>
+                  <a:pt x="1625235" y="17049"/>
+                  <a:pt x="1557672" y="24174"/>
+                  <a:pt x="1212454" y="18288"/>
+                </a:cubicBezTo>
+                <a:cubicBezTo>
+                  <a:pt x="867236" y="12402"/>
+                  <a:pt x="874382" y="15627"/>
+                  <a:pt x="733535" y="18288"/>
+                </a:cubicBezTo>
+                <a:cubicBezTo>
+                  <a:pt x="592688" y="20949"/>
+                  <a:pt x="183477" y="14753"/>
+                  <a:pt x="0" y="18288"/>
+                </a:cubicBezTo>
+                <a:cubicBezTo>
+                  <a:pt x="-229" y="14222"/>
+                  <a:pt x="509" y="5816"/>
+                  <a:pt x="0" y="0"/>
+                </a:cubicBezTo>
+                <a:close/>
+              </a:path>
+              <a:path w="4243589" h="18288" stroke="0" extrusionOk="0">
+                <a:moveTo>
+                  <a:pt x="0" y="0"/>
+                </a:moveTo>
+                <a:cubicBezTo>
+                  <a:pt x="143690" y="16630"/>
+                  <a:pt x="266667" y="14847"/>
+                  <a:pt x="521355" y="0"/>
+                </a:cubicBezTo>
+                <a:cubicBezTo>
+                  <a:pt x="776043" y="-14847"/>
+                  <a:pt x="814491" y="-17363"/>
+                  <a:pt x="1000275" y="0"/>
+                </a:cubicBezTo>
+                <a:cubicBezTo>
+                  <a:pt x="1186059" y="17363"/>
+                  <a:pt x="1352504" y="-23507"/>
+                  <a:pt x="1521630" y="0"/>
+                </a:cubicBezTo>
+                <a:cubicBezTo>
+                  <a:pt x="1690756" y="23507"/>
+                  <a:pt x="1889525" y="5871"/>
+                  <a:pt x="2127857" y="0"/>
+                </a:cubicBezTo>
+                <a:cubicBezTo>
+                  <a:pt x="2366189" y="-5871"/>
+                  <a:pt x="2620628" y="-27997"/>
+                  <a:pt x="2776520" y="0"/>
+                </a:cubicBezTo>
+                <a:cubicBezTo>
+                  <a:pt x="2932412" y="27997"/>
+                  <a:pt x="3131683" y="-25073"/>
+                  <a:pt x="3467618" y="0"/>
+                </a:cubicBezTo>
+                <a:cubicBezTo>
+                  <a:pt x="3803553" y="25073"/>
+                  <a:pt x="4017371" y="3071"/>
+                  <a:pt x="4243589" y="0"/>
+                </a:cubicBezTo>
+                <a:cubicBezTo>
+                  <a:pt x="4243134" y="6162"/>
+                  <a:pt x="4243492" y="11775"/>
+                  <a:pt x="4243589" y="18288"/>
+                </a:cubicBezTo>
+                <a:cubicBezTo>
+                  <a:pt x="4017834" y="-5779"/>
+                  <a:pt x="3834586" y="13376"/>
+                  <a:pt x="3594926" y="18288"/>
+                </a:cubicBezTo>
+                <a:cubicBezTo>
+                  <a:pt x="3355266" y="23200"/>
+                  <a:pt x="3204179" y="2869"/>
+                  <a:pt x="2903827" y="18288"/>
+                </a:cubicBezTo>
+                <a:cubicBezTo>
+                  <a:pt x="2603475" y="33707"/>
+                  <a:pt x="2526187" y="46187"/>
+                  <a:pt x="2212729" y="18288"/>
+                </a:cubicBezTo>
+                <a:cubicBezTo>
+                  <a:pt x="1899271" y="-9611"/>
+                  <a:pt x="1966289" y="29692"/>
+                  <a:pt x="1733809" y="18288"/>
+                </a:cubicBezTo>
+                <a:cubicBezTo>
+                  <a:pt x="1501329" y="6884"/>
+                  <a:pt x="1343612" y="12492"/>
+                  <a:pt x="1085146" y="18288"/>
+                </a:cubicBezTo>
+                <a:cubicBezTo>
+                  <a:pt x="826680" y="24084"/>
+                  <a:pt x="778184" y="35607"/>
+                  <a:pt x="521355" y="18288"/>
+                </a:cubicBezTo>
+                <a:cubicBezTo>
+                  <a:pt x="264526" y="969"/>
+                  <a:pt x="120277" y="4268"/>
+                  <a:pt x="0" y="18288"/>
+                </a:cubicBezTo>
+                <a:cubicBezTo>
+                  <a:pt x="766" y="10800"/>
+                  <a:pt x="-457" y="8180"/>
+                  <a:pt x="0" y="0"/>
+                </a:cubicBezTo>
+                <a:close/>
+              </a:path>
+            </a:pathLst>
+          </a:custGeom>
+          <a:solidFill>
+            <a:schemeClr val="accent2"/>
+          </a:solidFill>
+          <a:ln w="44450" cap="rnd">
+            <a:solidFill>
+              <a:schemeClr val="accent2"/>
+            </a:solidFill>
+            <a:round/>
+            <a:extLst>
+              <a:ext uri="{C807C97D-BFC1-408E-A445-0C87EB9F89A2}">
+                <ask:lineSketchStyleProps xmlns:ask="http://schemas.microsoft.com/office/drawing/2018/sketchyshapes" sd="2727557108">
+                  <a:prstGeom prst="rect">
+                    <a:avLst/>
+                  </a:prstGeom>
+                  <ask:type>
+                    <ask:lineSketchFreehand/>
+                  </ask:type>
+                </ask:lineSketchStyleProps>
+              </a:ext>
+            </a:extLst>
+          </a:ln>
+        </p:spPr>
+        <p:style>
+          <a:lnRef idx="2">
+            <a:schemeClr val="accent1">
+              <a:shade val="50000"/>
+            </a:schemeClr>
+          </a:lnRef>
+          <a:fillRef idx="1">
+            <a:schemeClr val="accent1"/>
+          </a:fillRef>
+          <a:effectRef idx="0">
+            <a:schemeClr val="accent1"/>
+          </a:effectRef>
+          <a:fontRef idx="minor">
+            <a:schemeClr val="lt1"/>
+          </a:fontRef>
+        </p:style>
+        <p:txBody>
+          <a:bodyPr rtlCol="0" anchor="ctr"/>
+          <a:lstStyle/>
+          <a:p>
+            <a:pPr algn="ctr"/>
+            <a:endParaRPr lang="en-US"/>
+          </a:p>
+        </p:txBody>
+      </p:sp>
+      <p:sp>
+        <p:nvSpPr>
+          <p:cNvPr id="3" name="Espaço Reservado para Conteúdo 2">
+            <a:extLst>
+              <a:ext uri="{FF2B5EF4-FFF2-40B4-BE49-F238E27FC236}">
+                <a16:creationId xmlns:a16="http://schemas.microsoft.com/office/drawing/2014/main" id="{6CABA167-B8D6-462E-7521-4C348BB01F36}"/>
+              </a:ext>
+            </a:extLst>
+          </p:cNvPr>
+          <p:cNvSpPr>
+            <a:spLocks noGrp="1"/>
+          </p:cNvSpPr>
+          <p:nvPr>
+            <p:ph idx="1"/>
+          </p:nvPr>
+        </p:nvSpPr>
+        <p:spPr>
+          <a:xfrm>
+            <a:off x="5297762" y="2706623"/>
+            <a:ext cx="6251110" cy="4018641"/>
+          </a:xfrm>
+        </p:spPr>
+        <p:txBody>
+          <a:bodyPr>
+            <a:normAutofit/>
+          </a:bodyPr>
+          <a:lstStyle/>
+          <a:p>
+            <a:pPr marL="0" indent="0">
+              <a:spcBef>
+                <a:spcPts val="1200"/>
+              </a:spcBef>
+              <a:spcAft>
+                <a:spcPts val="1200"/>
+              </a:spcAft>
+              <a:buNone/>
+            </a:pPr>
+            <a:r>
+              <a:rPr lang="pt-BR" sz="2200" kern="100" dirty="0">
+                <a:solidFill>
+                  <a:srgbClr val="A50000"/>
+                </a:solidFill>
+                <a:effectLst/>
+                <a:latin typeface="Calibri" panose="020F0502020204030204" pitchFamily="34" charset="0"/>
+                <a:ea typeface="Calibri" panose="020F0502020204030204" pitchFamily="34" charset="0"/>
+                <a:cs typeface="Times New Roman" panose="02020603050405020304" pitchFamily="18" charset="0"/>
+              </a:rPr>
+              <a:t>Ferramentas:</a:t>
+            </a:r>
+            <a:r>
+              <a:rPr lang="pt-BR" sz="2200" kern="100" dirty="0">
+                <a:effectLst/>
+                <a:latin typeface="Calibri" panose="020F0502020204030204" pitchFamily="34" charset="0"/>
+                <a:ea typeface="Calibri" panose="020F0502020204030204" pitchFamily="34" charset="0"/>
+                <a:cs typeface="Times New Roman" panose="02020603050405020304" pitchFamily="18" charset="0"/>
+              </a:rPr>
+              <a:t> Figma para design de interface.</a:t>
+            </a:r>
+            <a:endParaRPr lang="pt-BR" sz="2200" kern="100" dirty="0">
+              <a:solidFill>
+                <a:srgbClr val="A50000"/>
+              </a:solidFill>
+              <a:effectLst/>
+              <a:latin typeface="Calibri" panose="020F0502020204030204" pitchFamily="34" charset="0"/>
+              <a:ea typeface="Calibri" panose="020F0502020204030204" pitchFamily="34" charset="0"/>
+              <a:cs typeface="Times New Roman" panose="02020603050405020304" pitchFamily="18" charset="0"/>
+            </a:endParaRPr>
+          </a:p>
+          <a:p>
+            <a:pPr marL="0" indent="0">
+              <a:spcBef>
+                <a:spcPts val="1200"/>
+              </a:spcBef>
+              <a:spcAft>
+                <a:spcPts val="1200"/>
+              </a:spcAft>
+              <a:buNone/>
+            </a:pPr>
+            <a:r>
+              <a:rPr lang="pt-BR" sz="2200" kern="100" dirty="0">
+                <a:solidFill>
+                  <a:srgbClr val="A50000"/>
+                </a:solidFill>
+                <a:effectLst/>
+                <a:latin typeface="Calibri" panose="020F0502020204030204" pitchFamily="34" charset="0"/>
+                <a:ea typeface="Calibri" panose="020F0502020204030204" pitchFamily="34" charset="0"/>
+                <a:cs typeface="Times New Roman" panose="02020603050405020304" pitchFamily="18" charset="0"/>
+              </a:rPr>
+              <a:t>Linguagens: </a:t>
+            </a:r>
+            <a:r>
+              <a:rPr lang="pt-BR" sz="2200" kern="100" dirty="0">
+                <a:effectLst/>
+                <a:latin typeface="Calibri" panose="020F0502020204030204" pitchFamily="34" charset="0"/>
+                <a:ea typeface="Calibri" panose="020F0502020204030204" pitchFamily="34" charset="0"/>
+                <a:cs typeface="Times New Roman" panose="02020603050405020304" pitchFamily="18" charset="0"/>
+              </a:rPr>
+              <a:t>HTML, CSS, </a:t>
+            </a:r>
+            <a:r>
+              <a:rPr lang="pt-BR" sz="2200" kern="100" dirty="0" err="1">
+                <a:effectLst/>
+                <a:latin typeface="Calibri" panose="020F0502020204030204" pitchFamily="34" charset="0"/>
+                <a:ea typeface="Calibri" panose="020F0502020204030204" pitchFamily="34" charset="0"/>
+                <a:cs typeface="Times New Roman" panose="02020603050405020304" pitchFamily="18" charset="0"/>
+              </a:rPr>
+              <a:t>JavaScript</a:t>
+            </a:r>
+            <a:r>
+              <a:rPr lang="pt-BR" sz="2200" kern="100" dirty="0">
+                <a:latin typeface="Calibri" panose="020F0502020204030204" pitchFamily="34" charset="0"/>
+                <a:ea typeface="Calibri" panose="020F0502020204030204" pitchFamily="34" charset="0"/>
+                <a:cs typeface="Times New Roman" panose="02020603050405020304" pitchFamily="18" charset="0"/>
+              </a:rPr>
+              <a:t> e PHP.</a:t>
+            </a:r>
+            <a:endParaRPr lang="pt-BR" sz="2200" kern="100" dirty="0">
+              <a:effectLst/>
+              <a:latin typeface="Calibri" panose="020F0502020204030204" pitchFamily="34" charset="0"/>
+              <a:ea typeface="Calibri" panose="020F0502020204030204" pitchFamily="34" charset="0"/>
+              <a:cs typeface="Times New Roman" panose="02020603050405020304" pitchFamily="18" charset="0"/>
+            </a:endParaRPr>
+          </a:p>
+          <a:p>
+            <a:pPr marL="0" indent="0">
+              <a:spcBef>
+                <a:spcPts val="1200"/>
+              </a:spcBef>
+              <a:spcAft>
+                <a:spcPts val="1200"/>
+              </a:spcAft>
+              <a:buNone/>
+            </a:pPr>
+            <a:r>
+              <a:rPr lang="pt-BR" sz="2200" kern="100" dirty="0">
+                <a:solidFill>
+                  <a:srgbClr val="A50000"/>
+                </a:solidFill>
+                <a:effectLst/>
+                <a:latin typeface="Calibri" panose="020F0502020204030204" pitchFamily="34" charset="0"/>
+                <a:ea typeface="Calibri" panose="020F0502020204030204" pitchFamily="34" charset="0"/>
+                <a:cs typeface="Times New Roman" panose="02020603050405020304" pitchFamily="18" charset="0"/>
+              </a:rPr>
+              <a:t>Metodologias:</a:t>
+            </a:r>
+            <a:r>
+              <a:rPr lang="pt-BR" sz="2200" kern="100" dirty="0">
+                <a:effectLst/>
+                <a:latin typeface="Calibri" panose="020F0502020204030204" pitchFamily="34" charset="0"/>
+                <a:ea typeface="Calibri" panose="020F0502020204030204" pitchFamily="34" charset="0"/>
+                <a:cs typeface="Times New Roman" panose="02020603050405020304" pitchFamily="18" charset="0"/>
+              </a:rPr>
+              <a:t> Scrum para gestão ágil do projeto.</a:t>
+            </a:r>
+          </a:p>
+          <a:p>
+            <a:pPr marL="0" indent="0">
+              <a:spcBef>
+                <a:spcPts val="1200"/>
+              </a:spcBef>
+              <a:spcAft>
+                <a:spcPts val="1200"/>
+              </a:spcAft>
+              <a:buNone/>
+            </a:pPr>
+            <a:r>
+              <a:rPr lang="pt-BR" sz="2200" kern="100" dirty="0">
+                <a:solidFill>
+                  <a:srgbClr val="A50000"/>
+                </a:solidFill>
+                <a:effectLst/>
+                <a:latin typeface="Calibri" panose="020F0502020204030204" pitchFamily="34" charset="0"/>
+                <a:ea typeface="Calibri" panose="020F0502020204030204" pitchFamily="34" charset="0"/>
+                <a:cs typeface="Times New Roman" panose="02020603050405020304" pitchFamily="18" charset="0"/>
+              </a:rPr>
+              <a:t>Modelagem:</a:t>
+            </a:r>
+            <a:r>
+              <a:rPr lang="pt-BR" sz="2200" kern="100" dirty="0">
+                <a:effectLst/>
+                <a:latin typeface="Calibri" panose="020F0502020204030204" pitchFamily="34" charset="0"/>
+                <a:ea typeface="Calibri" panose="020F0502020204030204" pitchFamily="34" charset="0"/>
+                <a:cs typeface="Times New Roman" panose="02020603050405020304" pitchFamily="18" charset="0"/>
+              </a:rPr>
+              <a:t> </a:t>
+            </a:r>
+          </a:p>
+          <a:p>
+            <a:pPr marL="0" indent="0">
+              <a:spcBef>
+                <a:spcPts val="1200"/>
+              </a:spcBef>
+              <a:spcAft>
+                <a:spcPts val="1200"/>
+              </a:spcAft>
+              <a:buNone/>
+            </a:pPr>
+            <a:r>
+              <a:rPr lang="pt-BR" sz="2200" kern="100" dirty="0">
+                <a:effectLst/>
+                <a:latin typeface="Calibri" panose="020F0502020204030204" pitchFamily="34" charset="0"/>
+                <a:ea typeface="Calibri" panose="020F0502020204030204" pitchFamily="34" charset="0"/>
+                <a:cs typeface="Times New Roman" panose="02020603050405020304" pitchFamily="18" charset="0"/>
+              </a:rPr>
+              <a:t>UML para casos de uso e atividades.</a:t>
+            </a:r>
+          </a:p>
+          <a:p>
+            <a:pPr marL="0" indent="0">
+              <a:spcBef>
+                <a:spcPts val="1200"/>
+              </a:spcBef>
+              <a:spcAft>
+                <a:spcPts val="1200"/>
+              </a:spcAft>
+              <a:buNone/>
+            </a:pPr>
+            <a:r>
+              <a:rPr lang="pt-BR" sz="2200" kern="100" dirty="0">
+                <a:effectLst/>
+                <a:latin typeface="Calibri" panose="020F0502020204030204" pitchFamily="34" charset="0"/>
+                <a:ea typeface="Calibri" panose="020F0502020204030204" pitchFamily="34" charset="0"/>
+                <a:cs typeface="Times New Roman" panose="02020603050405020304" pitchFamily="18" charset="0"/>
+              </a:rPr>
+              <a:t>Modelos Entidade-Relacionamento e </a:t>
+            </a:r>
+            <a:br>
+              <a:rPr lang="pt-BR" sz="2200" kern="100" dirty="0">
+                <a:effectLst/>
+                <a:latin typeface="Calibri" panose="020F0502020204030204" pitchFamily="34" charset="0"/>
+                <a:ea typeface="Calibri" panose="020F0502020204030204" pitchFamily="34" charset="0"/>
+                <a:cs typeface="Times New Roman" panose="02020603050405020304" pitchFamily="18" charset="0"/>
+              </a:rPr>
+            </a:br>
+            <a:r>
+              <a:rPr lang="pt-BR" sz="2200" kern="100" dirty="0">
+                <a:effectLst/>
+                <a:latin typeface="Calibri" panose="020F0502020204030204" pitchFamily="34" charset="0"/>
+                <a:ea typeface="Calibri" panose="020F0502020204030204" pitchFamily="34" charset="0"/>
+                <a:cs typeface="Times New Roman" panose="02020603050405020304" pitchFamily="18" charset="0"/>
+              </a:rPr>
+              <a:t>Lógico para banco de dados.</a:t>
+            </a:r>
+          </a:p>
+          <a:p>
+            <a:pPr>
+              <a:spcBef>
+                <a:spcPts val="0"/>
+              </a:spcBef>
+            </a:pPr>
+            <a:endParaRPr lang="pt-BR" sz="1700" dirty="0"/>
+          </a:p>
+        </p:txBody>
+      </p:sp>
+    </p:spTree>
+    <p:extLst>
+      <p:ext uri="{BB962C8B-B14F-4D97-AF65-F5344CB8AC3E}">
+        <p14:creationId xmlns:p14="http://schemas.microsoft.com/office/powerpoint/2010/main" val="4239718710"/>
+      </p:ext>
+    </p:extLst>
+  </p:cSld>
+  <p:clrMapOvr>
+    <a:masterClrMapping/>
+  </p:clrMapOvr>
+</p:sld>
+</file>
+
+<file path=ppt/slides/slide13.xml><?xml version="1.0" encoding="utf-8"?>
+<p:sld xmlns:a="http://schemas.openxmlformats.org/drawingml/2006/main" xmlns:r="http://schemas.openxmlformats.org/officeDocument/2006/relationships" xmlns:p="http://schemas.openxmlformats.org/presentationml/2006/main">
+  <p:cSld>
     <p:bg>
       <p:bgPr>
         <a:solidFill>
@@ -10272,7 +12375,7 @@
 </p:sld>
 </file>
 
-<file path=ppt/slides/slide11.xml><?xml version="1.0" encoding="utf-8"?>
+<file path=ppt/slides/slide14.xml><?xml version="1.0" encoding="utf-8"?>
 <p:sld xmlns:a="http://schemas.openxmlformats.org/drawingml/2006/main" xmlns:r="http://schemas.openxmlformats.org/officeDocument/2006/relationships" xmlns:p="http://schemas.openxmlformats.org/presentationml/2006/main">
   <p:cSld>
     <p:bg>
@@ -10972,7 +13075,7 @@
 </p:sld>
 </file>
 
-<file path=ppt/slides/slide12.xml><?xml version="1.0" encoding="utf-8"?>
+<file path=ppt/slides/slide15.xml><?xml version="1.0" encoding="utf-8"?>
 <p:sld xmlns:a="http://schemas.openxmlformats.org/drawingml/2006/main" xmlns:r="http://schemas.openxmlformats.org/officeDocument/2006/relationships" xmlns:p="http://schemas.openxmlformats.org/presentationml/2006/main">
   <p:cSld>
     <p:bg>
@@ -11075,13 +13178,13 @@
         </p:nvSpPr>
         <p:spPr>
           <a:xfrm>
-            <a:off x="970908" y="1735480"/>
-            <a:ext cx="5425781" cy="2387600"/>
+            <a:off x="970908" y="1968944"/>
+            <a:ext cx="5741177" cy="2778154"/>
           </a:xfrm>
         </p:spPr>
         <p:txBody>
           <a:bodyPr vert="horz" lIns="91440" tIns="45720" rIns="91440" bIns="45720" rtlCol="0" anchor="b">
-            <a:normAutofit/>
+            <a:normAutofit fontScale="90000"/>
           </a:bodyPr>
           <a:lstStyle/>
           <a:p>
@@ -11105,7 +13208,29 @@
                 <a:ea typeface="Calibri" panose="020F0502020204030204" pitchFamily="34" charset="0"/>
                 <a:cs typeface="Times New Roman" panose="02020603050405020304" pitchFamily="18" charset="0"/>
               </a:rPr>
-              <a:t>Conclusão</a:t>
+              <a:t>Considerações</a:t>
+            </a:r>
+            <a:r>
+              <a:rPr lang="en-US" sz="6000" b="1" dirty="0">
+                <a:solidFill>
+                  <a:schemeClr val="accent1"/>
+                </a:solidFill>
+                <a:latin typeface="+mn-lt"/>
+                <a:ea typeface="Calibri" panose="020F0502020204030204" pitchFamily="34" charset="0"/>
+                <a:cs typeface="Times New Roman" panose="02020603050405020304" pitchFamily="18" charset="0"/>
+              </a:rPr>
+              <a:t> </a:t>
+            </a:r>
+            <a:r>
+              <a:rPr lang="en-US" sz="6000" b="1" dirty="0" err="1">
+                <a:solidFill>
+                  <a:schemeClr val="accent1"/>
+                </a:solidFill>
+                <a:latin typeface="+mn-lt"/>
+                <a:ea typeface="Calibri" panose="020F0502020204030204" pitchFamily="34" charset="0"/>
+                <a:cs typeface="Times New Roman" panose="02020603050405020304" pitchFamily="18" charset="0"/>
+              </a:rPr>
+              <a:t>Finais</a:t>
             </a:r>
             <a:br>
               <a:rPr lang="en-US" sz="5100" kern="1200" dirty="0">
@@ -11966,7 +14091,7 @@
 </p:sld>
 </file>
 
-<file path=ppt/slides/slide13.xml><?xml version="1.0" encoding="utf-8"?>
+<file path=ppt/slides/slide16.xml><?xml version="1.0" encoding="utf-8"?>
 <p:sld xmlns:a="http://schemas.openxmlformats.org/drawingml/2006/main" xmlns:r="http://schemas.openxmlformats.org/officeDocument/2006/relationships" xmlns:p="http://schemas.openxmlformats.org/presentationml/2006/main">
   <p:cSld>
     <p:bg>
@@ -13529,7 +15654,7 @@
         </p:spPr>
         <p:txBody>
           <a:bodyPr>
-            <a:normAutofit/>
+            <a:normAutofit fontScale="92500"/>
           </a:bodyPr>
           <a:lstStyle/>
           <a:p>
@@ -13561,7 +15686,7 @@
                 <a:ea typeface="Calibri" panose="020F0502020204030204" pitchFamily="34" charset="0"/>
                 <a:cs typeface="Times New Roman" panose="02020603050405020304" pitchFamily="18" charset="0"/>
               </a:rPr>
-              <a:t>Automatizar o processo de justificativas de faltas e reposição de aulas na Fatec Itapira.</a:t>
+              <a:t>Automatizar parcialmente o processo de justificativas de faltas e reposição de aulas na Fatec Itapira.</a:t>
             </a:r>
           </a:p>
           <a:p>
@@ -14838,7 +16963,7 @@
             <p:ph idx="1"/>
             <p:extLst>
               <p:ext uri="{D42A27DB-BD31-4B8C-83A1-F6EECF244321}">
-                <p14:modId xmlns:p14="http://schemas.microsoft.com/office/powerpoint/2010/main" val="2650807201"/>
+                <p14:modId xmlns:p14="http://schemas.microsoft.com/office/powerpoint/2010/main" val="1968605883"/>
               </p:ext>
             </p:extLst>
           </p:nvPr>
@@ -16250,7 +18375,7 @@
         </p:nvSpPr>
         <p:spPr>
           <a:xfrm>
-            <a:off x="1027205" y="-165407"/>
+            <a:off x="1027205" y="91576"/>
             <a:ext cx="10515600" cy="1325563"/>
           </a:xfrm>
         </p:spPr>
@@ -16262,7 +18387,7 @@
           <a:p>
             <a:pPr algn="ctr"/>
             <a:r>
-              <a:rPr lang="pt-BR" sz="3600" b="1" dirty="0">
+              <a:rPr lang="pt-BR" sz="4000" b="1" dirty="0">
                 <a:solidFill>
                   <a:srgbClr val="A50000"/>
                 </a:solidFill>
@@ -16271,9 +18396,9 @@
                 <a:ea typeface="Calibri" panose="020F0502020204030204" pitchFamily="34" charset="0"/>
                 <a:cs typeface="Times New Roman" panose="02020603050405020304" pitchFamily="18" charset="0"/>
               </a:rPr>
-              <a:t>Design da Interface - Figma</a:t>
+              <a:t>Diagramas de Casos de Uso</a:t>
             </a:r>
-            <a:endParaRPr lang="pt-BR" sz="3600" b="1" dirty="0">
+            <a:endParaRPr lang="pt-BR" sz="4000" b="1" dirty="0">
               <a:solidFill>
                 <a:srgbClr val="A50000"/>
               </a:solidFill>
@@ -16283,44 +18408,10 @@
       </p:sp>
       <p:pic>
         <p:nvPicPr>
-          <p:cNvPr id="7" name="Imagem 6">
+          <p:cNvPr id="9" name="Imagem 8" descr="Diagrama&#10;&#10;Descrição gerada automaticamente">
             <a:extLst>
               <a:ext uri="{FF2B5EF4-FFF2-40B4-BE49-F238E27FC236}">
-                <a16:creationId xmlns:a16="http://schemas.microsoft.com/office/drawing/2014/main" id="{993AC1D4-110B-9FB7-C0D7-6279F2924D4A}"/>
-              </a:ext>
-            </a:extLst>
-          </p:cNvPr>
-          <p:cNvPicPr>
-            <a:picLocks noChangeAspect="1"/>
-          </p:cNvPicPr>
-          <p:nvPr/>
-        </p:nvPicPr>
-        <p:blipFill rotWithShape="1">
-          <a:blip r:embed="rId2"/>
-          <a:srcRect l="1643" t="1422" r="1083" b="3424"/>
-          <a:stretch/>
-        </p:blipFill>
-        <p:spPr>
-          <a:xfrm>
-            <a:off x="6750358" y="985520"/>
-            <a:ext cx="4680000" cy="2609486"/>
-          </a:xfrm>
-          <a:prstGeom prst="rect">
-            <a:avLst/>
-          </a:prstGeom>
-          <a:ln w="12700">
-            <a:solidFill>
-              <a:schemeClr val="tx1"/>
-            </a:solidFill>
-          </a:ln>
-        </p:spPr>
-      </p:pic>
-      <p:pic>
-        <p:nvPicPr>
-          <p:cNvPr id="5" name="Imagem 4">
-            <a:extLst>
-              <a:ext uri="{FF2B5EF4-FFF2-40B4-BE49-F238E27FC236}">
-                <a16:creationId xmlns:a16="http://schemas.microsoft.com/office/drawing/2014/main" id="{7FF613F8-5FDE-7191-2EE9-F5E4A8F38DB0}"/>
+                <a16:creationId xmlns:a16="http://schemas.microsoft.com/office/drawing/2014/main" id="{2BD9761C-665C-999D-EE93-9B4B08C7B6BA}"/>
               </a:ext>
             </a:extLst>
           </p:cNvPr>
@@ -16330,67 +18421,40 @@
           <p:nvPr/>
         </p:nvPicPr>
         <p:blipFill>
-          <a:blip r:embed="rId3"/>
+          <a:blip r:embed="rId3">
+            <a:extLst>
+              <a:ext uri="{28A0092B-C50C-407E-A947-70E740481C1C}">
+                <a14:useLocalDpi xmlns:a14="http://schemas.microsoft.com/office/drawing/2010/main" val="0"/>
+              </a:ext>
+            </a:extLst>
+          </a:blip>
           <a:stretch>
             <a:fillRect/>
           </a:stretch>
         </p:blipFill>
         <p:spPr>
           <a:xfrm>
-            <a:off x="899158" y="3975602"/>
-            <a:ext cx="4680000" cy="2626068"/>
+            <a:off x="5834745" y="1687882"/>
+            <a:ext cx="5330050" cy="4343570"/>
           </a:xfrm>
           <a:prstGeom prst="rect">
             <a:avLst/>
           </a:prstGeom>
-          <a:noFill/>
-          <a:ln w="12700">
+          <a:ln w="19050">
             <a:solidFill>
-              <a:schemeClr val="tx1"/>
+              <a:schemeClr val="accent3">
+                <a:lumMod val="50000"/>
+              </a:schemeClr>
             </a:solidFill>
           </a:ln>
         </p:spPr>
       </p:pic>
       <p:pic>
         <p:nvPicPr>
-          <p:cNvPr id="6" name="Imagem 5">
+          <p:cNvPr id="12" name="Imagem 11" descr="Diagrama&#10;&#10;Descrição gerada automaticamente">
             <a:extLst>
               <a:ext uri="{FF2B5EF4-FFF2-40B4-BE49-F238E27FC236}">
-                <a16:creationId xmlns:a16="http://schemas.microsoft.com/office/drawing/2014/main" id="{1599C508-FA34-C4AD-1DB8-5D8F247DEF86}"/>
-              </a:ext>
-            </a:extLst>
-          </p:cNvPr>
-          <p:cNvPicPr>
-            <a:picLocks noChangeAspect="1"/>
-          </p:cNvPicPr>
-          <p:nvPr/>
-        </p:nvPicPr>
-        <p:blipFill rotWithShape="1">
-          <a:blip r:embed="rId4"/>
-          <a:srcRect l="1801" t="1623" r="1957" b="1838"/>
-          <a:stretch/>
-        </p:blipFill>
-        <p:spPr>
-          <a:xfrm>
-            <a:off x="899158" y="985520"/>
-            <a:ext cx="4680000" cy="2647421"/>
-          </a:xfrm>
-          <a:prstGeom prst="rect">
-            <a:avLst/>
-          </a:prstGeom>
-          <a:ln w="19050">
-            <a:solidFill>
-              <a:schemeClr val="tx1"/>
-            </a:solidFill>
-          </a:ln>
-        </p:spPr>
-      </p:pic>
-      <p:pic>
-        <p:nvPicPr>
-          <p:cNvPr id="11" name="Imagem 10">
-            <a:extLst>
-              <a:ext uri="{FF2B5EF4-FFF2-40B4-BE49-F238E27FC236}">
-                <a16:creationId xmlns:a16="http://schemas.microsoft.com/office/drawing/2014/main" id="{64EAD1C1-A3C3-2A61-4491-46ACD9523790}"/>
+                <a16:creationId xmlns:a16="http://schemas.microsoft.com/office/drawing/2014/main" id="{B5C4EBAF-8B35-172D-826E-DC47FCC782D2}"/>
               </a:ext>
             </a:extLst>
           </p:cNvPr>
@@ -16400,30 +18464,246 @@
           <p:nvPr/>
         </p:nvPicPr>
         <p:blipFill>
-          <a:blip r:embed="rId5"/>
+          <a:blip r:embed="rId4">
+            <a:extLst>
+              <a:ext uri="{28A0092B-C50C-407E-A947-70E740481C1C}">
+                <a14:useLocalDpi xmlns:a14="http://schemas.microsoft.com/office/drawing/2010/main" val="0"/>
+              </a:ext>
+            </a:extLst>
+          </a:blip>
           <a:stretch>
             <a:fillRect/>
           </a:stretch>
         </p:blipFill>
         <p:spPr>
           <a:xfrm>
-            <a:off x="6750358" y="3878158"/>
-            <a:ext cx="4680000" cy="2723512"/>
+            <a:off x="1027205" y="1417139"/>
+            <a:ext cx="4028844" cy="4885057"/>
           </a:xfrm>
           <a:prstGeom prst="rect">
             <a:avLst/>
           </a:prstGeom>
-          <a:ln w="12700">
+          <a:ln w="19050">
             <a:solidFill>
-              <a:schemeClr val="tx1"/>
+              <a:schemeClr val="accent3">
+                <a:lumMod val="50000"/>
+              </a:schemeClr>
             </a:solidFill>
           </a:ln>
         </p:spPr>
       </p:pic>
+      <p:sp>
+        <p:nvSpPr>
+          <p:cNvPr id="7" name="Elipse 6">
+            <a:extLst>
+              <a:ext uri="{FF2B5EF4-FFF2-40B4-BE49-F238E27FC236}">
+                <a16:creationId xmlns:a16="http://schemas.microsoft.com/office/drawing/2014/main" id="{BF0E2109-898F-B3CF-0F07-3095810393EF}"/>
+              </a:ext>
+            </a:extLst>
+          </p:cNvPr>
+          <p:cNvSpPr/>
+          <p:nvPr/>
+        </p:nvSpPr>
+        <p:spPr>
+          <a:xfrm>
+            <a:off x="10903974" y="-376087"/>
+            <a:ext cx="1130444" cy="1130444"/>
+          </a:xfrm>
+          <a:prstGeom prst="ellipse">
+            <a:avLst/>
+          </a:prstGeom>
+        </p:spPr>
+        <p:style>
+          <a:lnRef idx="2">
+            <a:schemeClr val="accent1">
+              <a:shade val="15000"/>
+            </a:schemeClr>
+          </a:lnRef>
+          <a:fillRef idx="1">
+            <a:schemeClr val="accent1"/>
+          </a:fillRef>
+          <a:effectRef idx="0">
+            <a:schemeClr val="accent1"/>
+          </a:effectRef>
+          <a:fontRef idx="minor">
+            <a:schemeClr val="lt1"/>
+          </a:fontRef>
+        </p:style>
+        <p:txBody>
+          <a:bodyPr rtlCol="0" anchor="ctr"/>
+          <a:lstStyle/>
+          <a:p>
+            <a:pPr algn="ctr"/>
+            <a:endParaRPr lang="pt-BR"/>
+          </a:p>
+        </p:txBody>
+      </p:sp>
+      <p:sp>
+        <p:nvSpPr>
+          <p:cNvPr id="8" name="Arco 7">
+            <a:extLst>
+              <a:ext uri="{FF2B5EF4-FFF2-40B4-BE49-F238E27FC236}">
+                <a16:creationId xmlns:a16="http://schemas.microsoft.com/office/drawing/2014/main" id="{E209809A-978B-C48B-5AEB-EBB585BA0513}"/>
+              </a:ext>
+            </a:extLst>
+          </p:cNvPr>
+          <p:cNvSpPr/>
+          <p:nvPr/>
+        </p:nvSpPr>
+        <p:spPr>
+          <a:xfrm rot="11188937">
+            <a:off x="10692314" y="-661355"/>
+            <a:ext cx="1700981" cy="1700981"/>
+          </a:xfrm>
+          <a:prstGeom prst="arc">
+            <a:avLst/>
+          </a:prstGeom>
+          <a:ln w="57150" cap="flat" cmpd="sng" algn="ctr">
+            <a:solidFill>
+              <a:schemeClr val="accent1"/>
+            </a:solidFill>
+            <a:prstDash val="dash"/>
+            <a:round/>
+            <a:headEnd type="none" w="med" len="med"/>
+            <a:tailEnd type="none" w="med" len="med"/>
+          </a:ln>
+        </p:spPr>
+        <p:style>
+          <a:lnRef idx="0">
+            <a:scrgbClr r="0" g="0" b="0"/>
+          </a:lnRef>
+          <a:fillRef idx="0">
+            <a:scrgbClr r="0" g="0" b="0"/>
+          </a:fillRef>
+          <a:effectRef idx="0">
+            <a:scrgbClr r="0" g="0" b="0"/>
+          </a:effectRef>
+          <a:fontRef idx="minor">
+            <a:schemeClr val="tx1"/>
+          </a:fontRef>
+        </p:style>
+        <p:txBody>
+          <a:bodyPr rtlCol="0" anchor="ctr"/>
+          <a:lstStyle/>
+          <a:p>
+            <a:pPr algn="ctr"/>
+            <a:endParaRPr lang="pt-BR"/>
+          </a:p>
+        </p:txBody>
+      </p:sp>
+      <p:sp>
+        <p:nvSpPr>
+          <p:cNvPr id="10" name="Elipse 9">
+            <a:extLst>
+              <a:ext uri="{FF2B5EF4-FFF2-40B4-BE49-F238E27FC236}">
+                <a16:creationId xmlns:a16="http://schemas.microsoft.com/office/drawing/2014/main" id="{56E5AFE8-9EC3-5CD3-2E16-711BE4525D03}"/>
+              </a:ext>
+            </a:extLst>
+          </p:cNvPr>
+          <p:cNvSpPr/>
+          <p:nvPr/>
+        </p:nvSpPr>
+        <p:spPr>
+          <a:xfrm rot="5400000">
+            <a:off x="-455920" y="6186286"/>
+            <a:ext cx="1130444" cy="1130444"/>
+          </a:xfrm>
+          <a:prstGeom prst="ellipse">
+            <a:avLst/>
+          </a:prstGeom>
+          <a:solidFill>
+            <a:schemeClr val="accent2">
+              <a:lumMod val="75000"/>
+            </a:schemeClr>
+          </a:solidFill>
+          <a:ln>
+            <a:noFill/>
+          </a:ln>
+        </p:spPr>
+        <p:style>
+          <a:lnRef idx="2">
+            <a:schemeClr val="accent1">
+              <a:shade val="15000"/>
+            </a:schemeClr>
+          </a:lnRef>
+          <a:fillRef idx="1">
+            <a:schemeClr val="accent1"/>
+          </a:fillRef>
+          <a:effectRef idx="0">
+            <a:schemeClr val="accent1"/>
+          </a:effectRef>
+          <a:fontRef idx="minor">
+            <a:schemeClr val="lt1"/>
+          </a:fontRef>
+        </p:style>
+        <p:txBody>
+          <a:bodyPr rtlCol="0" anchor="ctr"/>
+          <a:lstStyle/>
+          <a:p>
+            <a:pPr algn="ctr"/>
+            <a:endParaRPr lang="pt-BR" dirty="0"/>
+          </a:p>
+        </p:txBody>
+      </p:sp>
+      <p:sp>
+        <p:nvSpPr>
+          <p:cNvPr id="11" name="Arco 10">
+            <a:extLst>
+              <a:ext uri="{FF2B5EF4-FFF2-40B4-BE49-F238E27FC236}">
+                <a16:creationId xmlns:a16="http://schemas.microsoft.com/office/drawing/2014/main" id="{E6CB848A-AC0F-ECD0-0821-A5DC689F2DF3}"/>
+              </a:ext>
+            </a:extLst>
+          </p:cNvPr>
+          <p:cNvSpPr/>
+          <p:nvPr/>
+        </p:nvSpPr>
+        <p:spPr>
+          <a:xfrm rot="19125911">
+            <a:off x="-741189" y="6007509"/>
+            <a:ext cx="1700981" cy="1700981"/>
+          </a:xfrm>
+          <a:prstGeom prst="arc">
+            <a:avLst/>
+          </a:prstGeom>
+          <a:ln w="57150" cap="flat" cmpd="sng" algn="ctr">
+            <a:solidFill>
+              <a:schemeClr val="accent2">
+                <a:lumMod val="75000"/>
+              </a:schemeClr>
+            </a:solidFill>
+            <a:prstDash val="dash"/>
+            <a:round/>
+            <a:headEnd type="none" w="med" len="med"/>
+            <a:tailEnd type="none" w="med" len="med"/>
+          </a:ln>
+        </p:spPr>
+        <p:style>
+          <a:lnRef idx="0">
+            <a:scrgbClr r="0" g="0" b="0"/>
+          </a:lnRef>
+          <a:fillRef idx="0">
+            <a:scrgbClr r="0" g="0" b="0"/>
+          </a:fillRef>
+          <a:effectRef idx="0">
+            <a:scrgbClr r="0" g="0" b="0"/>
+          </a:effectRef>
+          <a:fontRef idx="minor">
+            <a:schemeClr val="tx1"/>
+          </a:fontRef>
+        </p:style>
+        <p:txBody>
+          <a:bodyPr rtlCol="0" anchor="ctr"/>
+          <a:lstStyle/>
+          <a:p>
+            <a:pPr algn="ctr"/>
+            <a:endParaRPr lang="pt-BR" dirty="0"/>
+          </a:p>
+        </p:txBody>
+      </p:sp>
     </p:spTree>
     <p:extLst>
       <p:ext uri="{BB962C8B-B14F-4D97-AF65-F5344CB8AC3E}">
-        <p14:creationId xmlns:p14="http://schemas.microsoft.com/office/powerpoint/2010/main" val="2440801674"/>
+        <p14:creationId xmlns:p14="http://schemas.microsoft.com/office/powerpoint/2010/main" val="1014727723"/>
       </p:ext>
     </p:extLst>
   </p:cSld>
@@ -16455,68 +18735,108 @@
           <p:cNvPr id="2" name="Título 1">
             <a:extLst>
               <a:ext uri="{FF2B5EF4-FFF2-40B4-BE49-F238E27FC236}">
-                <a16:creationId xmlns:a16="http://schemas.microsoft.com/office/drawing/2014/main" id="{C200E95A-ADEB-1167-FF6A-C5B7A47F60EC}"/>
+                <a16:creationId xmlns:a16="http://schemas.microsoft.com/office/drawing/2014/main" id="{8526413E-CC99-95EF-0BB7-BB595C1845DF}"/>
               </a:ext>
             </a:extLst>
           </p:cNvPr>
-          <p:cNvSpPr txBox="1">
-            <a:spLocks/>
+          <p:cNvSpPr>
+            <a:spLocks noGrp="1"/>
           </p:cNvSpPr>
-          <p:nvPr/>
+          <p:nvPr>
+            <p:ph type="title"/>
+          </p:nvPr>
         </p:nvSpPr>
         <p:spPr>
           <a:xfrm>
-            <a:off x="2970445" y="230116"/>
-            <a:ext cx="6251110" cy="1093416"/>
+            <a:off x="1027205" y="0"/>
+            <a:ext cx="10515600" cy="1325563"/>
+          </a:xfrm>
+        </p:spPr>
+        <p:txBody>
+          <a:bodyPr>
+            <a:normAutofit/>
+          </a:bodyPr>
+          <a:lstStyle/>
+          <a:p>
+            <a:pPr algn="ctr"/>
+            <a:r>
+              <a:rPr lang="pt-BR" sz="4000" b="1" dirty="0">
+                <a:solidFill>
+                  <a:srgbClr val="A50000"/>
+                </a:solidFill>
+                <a:effectLst/>
+                <a:latin typeface="Calibri" panose="020F0502020204030204" pitchFamily="34" charset="0"/>
+                <a:ea typeface="Calibri" panose="020F0502020204030204" pitchFamily="34" charset="0"/>
+                <a:cs typeface="Times New Roman" panose="02020603050405020304" pitchFamily="18" charset="0"/>
+              </a:rPr>
+              <a:t>Diagramas </a:t>
+            </a:r>
+            <a:r>
+              <a:rPr lang="pt-BR" sz="4000" b="1" dirty="0">
+                <a:solidFill>
+                  <a:srgbClr val="A50000"/>
+                </a:solidFill>
+                <a:latin typeface="Calibri" panose="020F0502020204030204" pitchFamily="34" charset="0"/>
+                <a:ea typeface="Calibri" panose="020F0502020204030204" pitchFamily="34" charset="0"/>
+                <a:cs typeface="Times New Roman" panose="02020603050405020304" pitchFamily="18" charset="0"/>
+              </a:rPr>
+              <a:t>de Atividades</a:t>
+            </a:r>
+            <a:endParaRPr lang="pt-BR" sz="4000" b="1" dirty="0">
+              <a:solidFill>
+                <a:srgbClr val="A50000"/>
+              </a:solidFill>
+            </a:endParaRPr>
+          </a:p>
+        </p:txBody>
+      </p:sp>
+      <p:pic>
+        <p:nvPicPr>
+          <p:cNvPr id="4" name="Imagem 3" descr="Diagrama&#10;&#10;Descrição gerada automaticamente">
+            <a:extLst>
+              <a:ext uri="{FF2B5EF4-FFF2-40B4-BE49-F238E27FC236}">
+                <a16:creationId xmlns:a16="http://schemas.microsoft.com/office/drawing/2014/main" id="{391E5211-505C-1689-3F0F-D4B070F6E81A}"/>
+              </a:ext>
+            </a:extLst>
+          </p:cNvPr>
+          <p:cNvPicPr>
+            <a:picLocks noChangeAspect="1"/>
+          </p:cNvPicPr>
+          <p:nvPr/>
+        </p:nvPicPr>
+        <p:blipFill>
+          <a:blip r:embed="rId3">
+            <a:extLst>
+              <a:ext uri="{28A0092B-C50C-407E-A947-70E740481C1C}">
+                <a14:useLocalDpi xmlns:a14="http://schemas.microsoft.com/office/drawing/2010/main" val="0"/>
+              </a:ext>
+            </a:extLst>
+          </a:blip>
+          <a:stretch>
+            <a:fillRect/>
+          </a:stretch>
+        </p:blipFill>
+        <p:spPr>
+          <a:xfrm>
+            <a:off x="584834" y="1219149"/>
+            <a:ext cx="10957971" cy="4994449"/>
           </a:xfrm>
           <a:prstGeom prst="rect">
             <a:avLst/>
           </a:prstGeom>
+          <a:ln w="3175">
+            <a:solidFill>
+              <a:schemeClr val="tx1"/>
+            </a:solidFill>
+          </a:ln>
         </p:spPr>
-        <p:txBody>
-          <a:bodyPr anchor="b">
-            <a:normAutofit/>
-          </a:bodyPr>
-          <a:lstStyle>
-            <a:lvl1pPr algn="l" defTabSz="914400" rtl="0" eaLnBrk="1" latinLnBrk="0" hangingPunct="1">
-              <a:lnSpc>
-                <a:spcPct val="90000"/>
-              </a:lnSpc>
-              <a:spcBef>
-                <a:spcPct val="0"/>
-              </a:spcBef>
-              <a:buNone/>
-              <a:defRPr sz="4400" kern="1200">
-                <a:solidFill>
-                  <a:schemeClr val="tx1"/>
-                </a:solidFill>
-                <a:latin typeface="+mj-lt"/>
-                <a:ea typeface="+mj-ea"/>
-                <a:cs typeface="+mj-cs"/>
-              </a:defRPr>
-            </a:lvl1pPr>
-          </a:lstStyle>
-          <a:p>
-            <a:pPr algn="ctr">
-              <a:spcAft>
-                <a:spcPts val="800"/>
-              </a:spcAft>
-            </a:pPr>
-            <a:r>
-              <a:rPr lang="pt-BR" sz="5400" b="1" dirty="0">
-                <a:latin typeface="+mn-lt"/>
-              </a:rPr>
-              <a:t>Implementação</a:t>
-            </a:r>
-          </a:p>
-        </p:txBody>
-      </p:sp>
+      </p:pic>
       <p:sp>
         <p:nvSpPr>
-          <p:cNvPr id="5" name="Retângulo 4">
+          <p:cNvPr id="7" name="Elipse 6">
             <a:extLst>
               <a:ext uri="{FF2B5EF4-FFF2-40B4-BE49-F238E27FC236}">
-                <a16:creationId xmlns:a16="http://schemas.microsoft.com/office/drawing/2014/main" id="{AB3E3207-79FD-8BA6-2C3C-C688AC8BC4CE}"/>
+                <a16:creationId xmlns:a16="http://schemas.microsoft.com/office/drawing/2014/main" id="{25F35762-BC92-8912-EDC2-B4097EE5BDF5}"/>
               </a:ext>
             </a:extLst>
           </p:cNvPr>
@@ -16525,16 +18845,68 @@
         </p:nvSpPr>
         <p:spPr>
           <a:xfrm>
-            <a:off x="3473088" y="2076308"/>
-            <a:ext cx="1780162" cy="773349"/>
+            <a:off x="-422787" y="239994"/>
+            <a:ext cx="845574" cy="845574"/>
           </a:xfrm>
-          <a:prstGeom prst="rect">
+          <a:prstGeom prst="ellipse">
             <a:avLst/>
           </a:prstGeom>
           <a:noFill/>
-          <a:ln w="57150">
+          <a:ln w="76200">
             <a:solidFill>
-              <a:srgbClr val="A50000"/>
+              <a:schemeClr val="accent4"/>
+            </a:solidFill>
+          </a:ln>
+        </p:spPr>
+        <p:style>
+          <a:lnRef idx="2">
+            <a:schemeClr val="accent4">
+              <a:shade val="15000"/>
+            </a:schemeClr>
+          </a:lnRef>
+          <a:fillRef idx="1">
+            <a:schemeClr val="accent4"/>
+          </a:fillRef>
+          <a:effectRef idx="0">
+            <a:schemeClr val="accent4"/>
+          </a:effectRef>
+          <a:fontRef idx="minor">
+            <a:schemeClr val="lt1"/>
+          </a:fontRef>
+        </p:style>
+        <p:txBody>
+          <a:bodyPr rtlCol="0" anchor="ctr"/>
+          <a:lstStyle/>
+          <a:p>
+            <a:pPr algn="ctr"/>
+            <a:endParaRPr lang="pt-BR"/>
+          </a:p>
+        </p:txBody>
+      </p:sp>
+      <p:sp>
+        <p:nvSpPr>
+          <p:cNvPr id="8" name="Triângulo isósceles 7">
+            <a:extLst>
+              <a:ext uri="{FF2B5EF4-FFF2-40B4-BE49-F238E27FC236}">
+                <a16:creationId xmlns:a16="http://schemas.microsoft.com/office/drawing/2014/main" id="{80CD4423-E112-20AC-4292-E98F91F3D968}"/>
+              </a:ext>
+            </a:extLst>
+          </p:cNvPr>
+          <p:cNvSpPr/>
+          <p:nvPr/>
+        </p:nvSpPr>
+        <p:spPr>
+          <a:xfrm rot="5400000">
+            <a:off x="10970577" y="-253629"/>
+            <a:ext cx="1041953" cy="987245"/>
+          </a:xfrm>
+          <a:prstGeom prst="triangle">
+            <a:avLst/>
+          </a:prstGeom>
+          <a:noFill/>
+          <a:ln w="76200">
+            <a:solidFill>
+              <a:schemeClr val="accent1"/>
             </a:solidFill>
           </a:ln>
         </p:spPr>
@@ -16559,624 +18931,14 @@
           <a:lstStyle/>
           <a:p>
             <a:pPr algn="ctr"/>
-            <a:r>
-              <a:rPr lang="pt-BR" sz="2800" b="1" dirty="0">
-                <a:solidFill>
-                  <a:srgbClr val="A50000"/>
-                </a:solidFill>
-              </a:rPr>
-              <a:t>Sprint 1</a:t>
-            </a:r>
+            <a:endParaRPr lang="pt-BR"/>
           </a:p>
         </p:txBody>
       </p:sp>
-      <p:sp>
-        <p:nvSpPr>
-          <p:cNvPr id="6" name="CaixaDeTexto 5">
-            <a:extLst>
-              <a:ext uri="{FF2B5EF4-FFF2-40B4-BE49-F238E27FC236}">
-                <a16:creationId xmlns:a16="http://schemas.microsoft.com/office/drawing/2014/main" id="{1CECF080-DE46-E448-7E7F-D5E9BFA797AE}"/>
-              </a:ext>
-            </a:extLst>
-          </p:cNvPr>
-          <p:cNvSpPr txBox="1"/>
-          <p:nvPr/>
-        </p:nvSpPr>
-        <p:spPr>
-          <a:xfrm>
-            <a:off x="2979409" y="2988151"/>
-            <a:ext cx="2767519" cy="707886"/>
-          </a:xfrm>
-          <a:prstGeom prst="rect">
-            <a:avLst/>
-          </a:prstGeom>
-          <a:noFill/>
-        </p:spPr>
-        <p:txBody>
-          <a:bodyPr wrap="square" rtlCol="0">
-            <a:spAutoFit/>
-          </a:bodyPr>
-          <a:lstStyle/>
-          <a:p>
-            <a:pPr marL="0" indent="0" algn="ctr" rtl="0" eaLnBrk="1" latinLnBrk="0" hangingPunct="1">
-              <a:spcBef>
-                <a:spcPts val="250"/>
-              </a:spcBef>
-              <a:spcAft>
-                <a:spcPts val="250"/>
-              </a:spcAft>
-              <a:buNone/>
-            </a:pPr>
-            <a:r>
-              <a:rPr lang="pt-BR" sz="2000" kern="100" dirty="0">
-                <a:solidFill>
-                  <a:schemeClr val="tx1">
-                    <a:lumMod val="65000"/>
-                    <a:lumOff val="35000"/>
-                  </a:schemeClr>
-                </a:solidFill>
-                <a:effectLst/>
-                <a:ea typeface="Calibri" panose="020F0502020204030204" pitchFamily="34" charset="0"/>
-                <a:cs typeface="Helvetica" panose="020B0604020202020204" pitchFamily="34" charset="0"/>
-              </a:rPr>
-              <a:t>Formulário de </a:t>
-            </a:r>
-            <a:br>
-              <a:rPr lang="pt-BR" sz="2000" kern="100" dirty="0">
-                <a:solidFill>
-                  <a:schemeClr val="tx1">
-                    <a:lumMod val="65000"/>
-                    <a:lumOff val="35000"/>
-                  </a:schemeClr>
-                </a:solidFill>
-                <a:effectLst/>
-                <a:ea typeface="Calibri" panose="020F0502020204030204" pitchFamily="34" charset="0"/>
-                <a:cs typeface="Helvetica" panose="020B0604020202020204" pitchFamily="34" charset="0"/>
-              </a:rPr>
-            </a:br>
-            <a:r>
-              <a:rPr lang="pt-BR" sz="2000" kern="100" dirty="0">
-                <a:solidFill>
-                  <a:schemeClr val="tx1">
-                    <a:lumMod val="65000"/>
-                    <a:lumOff val="35000"/>
-                  </a:schemeClr>
-                </a:solidFill>
-                <a:effectLst/>
-                <a:ea typeface="Calibri" panose="020F0502020204030204" pitchFamily="34" charset="0"/>
-                <a:cs typeface="Helvetica" panose="020B0604020202020204" pitchFamily="34" charset="0"/>
-              </a:rPr>
-              <a:t>justificativa de faltas.</a:t>
-            </a:r>
-          </a:p>
-        </p:txBody>
-      </p:sp>
-      <p:sp>
-        <p:nvSpPr>
-          <p:cNvPr id="9" name="Retângulo 8">
-            <a:extLst>
-              <a:ext uri="{FF2B5EF4-FFF2-40B4-BE49-F238E27FC236}">
-                <a16:creationId xmlns:a16="http://schemas.microsoft.com/office/drawing/2014/main" id="{860A6339-B913-4734-66AF-B1E4E6F3C29A}"/>
-              </a:ext>
-            </a:extLst>
-          </p:cNvPr>
-          <p:cNvSpPr/>
-          <p:nvPr/>
-        </p:nvSpPr>
-        <p:spPr>
-          <a:xfrm>
-            <a:off x="6854973" y="2076308"/>
-            <a:ext cx="1780162" cy="773349"/>
-          </a:xfrm>
-          <a:prstGeom prst="rect">
-            <a:avLst/>
-          </a:prstGeom>
-          <a:noFill/>
-          <a:ln w="57150">
-            <a:solidFill>
-              <a:srgbClr val="A50000"/>
-            </a:solidFill>
-          </a:ln>
-        </p:spPr>
-        <p:style>
-          <a:lnRef idx="2">
-            <a:schemeClr val="accent1">
-              <a:shade val="15000"/>
-            </a:schemeClr>
-          </a:lnRef>
-          <a:fillRef idx="1">
-            <a:schemeClr val="accent1"/>
-          </a:fillRef>
-          <a:effectRef idx="0">
-            <a:schemeClr val="accent1"/>
-          </a:effectRef>
-          <a:fontRef idx="minor">
-            <a:schemeClr val="lt1"/>
-          </a:fontRef>
-        </p:style>
-        <p:txBody>
-          <a:bodyPr rtlCol="0" anchor="ctr"/>
-          <a:lstStyle/>
-          <a:p>
-            <a:pPr algn="ctr"/>
-            <a:r>
-              <a:rPr lang="pt-BR" sz="2800" b="1" dirty="0">
-                <a:solidFill>
-                  <a:srgbClr val="A50000"/>
-                </a:solidFill>
-              </a:rPr>
-              <a:t>Sprint 2</a:t>
-            </a:r>
-          </a:p>
-        </p:txBody>
-      </p:sp>
-      <p:sp>
-        <p:nvSpPr>
-          <p:cNvPr id="10" name="CaixaDeTexto 9">
-            <a:extLst>
-              <a:ext uri="{FF2B5EF4-FFF2-40B4-BE49-F238E27FC236}">
-                <a16:creationId xmlns:a16="http://schemas.microsoft.com/office/drawing/2014/main" id="{59B880C7-055C-25BA-4F7A-845743B697EE}"/>
-              </a:ext>
-            </a:extLst>
-          </p:cNvPr>
-          <p:cNvSpPr txBox="1"/>
-          <p:nvPr/>
-        </p:nvSpPr>
-        <p:spPr>
-          <a:xfrm>
-            <a:off x="5889685" y="2988151"/>
-            <a:ext cx="3754876" cy="707886"/>
-          </a:xfrm>
-          <a:prstGeom prst="rect">
-            <a:avLst/>
-          </a:prstGeom>
-          <a:noFill/>
-        </p:spPr>
-        <p:txBody>
-          <a:bodyPr wrap="square" rtlCol="0">
-            <a:spAutoFit/>
-          </a:bodyPr>
-          <a:lstStyle/>
-          <a:p>
-            <a:pPr marL="0" indent="0" algn="ctr" rtl="0" eaLnBrk="1" latinLnBrk="0" hangingPunct="1">
-              <a:spcBef>
-                <a:spcPts val="250"/>
-              </a:spcBef>
-              <a:spcAft>
-                <a:spcPts val="250"/>
-              </a:spcAft>
-              <a:buNone/>
-            </a:pPr>
-            <a:r>
-              <a:rPr lang="pt-BR" sz="2000" kern="100" dirty="0">
-                <a:solidFill>
-                  <a:schemeClr val="tx1">
-                    <a:lumMod val="65000"/>
-                    <a:lumOff val="35000"/>
-                  </a:schemeClr>
-                </a:solidFill>
-                <a:effectLst/>
-                <a:ea typeface="Calibri" panose="020F0502020204030204" pitchFamily="34" charset="0"/>
-                <a:cs typeface="Helvetica" panose="020B0604020202020204" pitchFamily="34" charset="0"/>
-              </a:rPr>
-              <a:t>Formulário de plano </a:t>
-            </a:r>
-            <a:br>
-              <a:rPr lang="pt-BR" sz="2000" kern="100" dirty="0">
-                <a:solidFill>
-                  <a:schemeClr val="tx1">
-                    <a:lumMod val="65000"/>
-                    <a:lumOff val="35000"/>
-                  </a:schemeClr>
-                </a:solidFill>
-                <a:effectLst/>
-                <a:ea typeface="Calibri" panose="020F0502020204030204" pitchFamily="34" charset="0"/>
-                <a:cs typeface="Helvetica" panose="020B0604020202020204" pitchFamily="34" charset="0"/>
-              </a:rPr>
-            </a:br>
-            <a:r>
-              <a:rPr lang="pt-BR" sz="2000" kern="100" dirty="0">
-                <a:solidFill>
-                  <a:schemeClr val="tx1">
-                    <a:lumMod val="65000"/>
-                    <a:lumOff val="35000"/>
-                  </a:schemeClr>
-                </a:solidFill>
-                <a:effectLst/>
-                <a:ea typeface="Calibri" panose="020F0502020204030204" pitchFamily="34" charset="0"/>
-                <a:cs typeface="Helvetica" panose="020B0604020202020204" pitchFamily="34" charset="0"/>
-              </a:rPr>
-              <a:t>de reposição.</a:t>
-            </a:r>
-            <a:endParaRPr lang="pt-BR" sz="2000" kern="100" dirty="0">
-              <a:solidFill>
-                <a:schemeClr val="tx1">
-                  <a:lumMod val="65000"/>
-                  <a:lumOff val="35000"/>
-                </a:schemeClr>
-              </a:solidFill>
-              <a:ea typeface="Calibri" panose="020F0502020204030204" pitchFamily="34" charset="0"/>
-              <a:cs typeface="Helvetica" panose="020B0604020202020204" pitchFamily="34" charset="0"/>
-            </a:endParaRPr>
-          </a:p>
-        </p:txBody>
-      </p:sp>
-      <p:sp>
-        <p:nvSpPr>
-          <p:cNvPr id="11" name="Retângulo 10">
-            <a:extLst>
-              <a:ext uri="{FF2B5EF4-FFF2-40B4-BE49-F238E27FC236}">
-                <a16:creationId xmlns:a16="http://schemas.microsoft.com/office/drawing/2014/main" id="{249AACFE-6A30-C371-6C39-C5F0E2700EB8}"/>
-              </a:ext>
-            </a:extLst>
-          </p:cNvPr>
-          <p:cNvSpPr/>
-          <p:nvPr/>
-        </p:nvSpPr>
-        <p:spPr>
-          <a:xfrm>
-            <a:off x="6892795" y="4436544"/>
-            <a:ext cx="1780162" cy="773349"/>
-          </a:xfrm>
-          <a:prstGeom prst="rect">
-            <a:avLst/>
-          </a:prstGeom>
-          <a:noFill/>
-          <a:ln w="57150">
-            <a:solidFill>
-              <a:srgbClr val="A50000"/>
-            </a:solidFill>
-          </a:ln>
-        </p:spPr>
-        <p:style>
-          <a:lnRef idx="2">
-            <a:schemeClr val="accent1">
-              <a:shade val="15000"/>
-            </a:schemeClr>
-          </a:lnRef>
-          <a:fillRef idx="1">
-            <a:schemeClr val="accent1"/>
-          </a:fillRef>
-          <a:effectRef idx="0">
-            <a:schemeClr val="accent1"/>
-          </a:effectRef>
-          <a:fontRef idx="minor">
-            <a:schemeClr val="lt1"/>
-          </a:fontRef>
-        </p:style>
-        <p:txBody>
-          <a:bodyPr rtlCol="0" anchor="ctr"/>
-          <a:lstStyle/>
-          <a:p>
-            <a:pPr algn="ctr"/>
-            <a:r>
-              <a:rPr lang="pt-BR" sz="2800" b="1" dirty="0">
-                <a:solidFill>
-                  <a:srgbClr val="A50000"/>
-                </a:solidFill>
-              </a:rPr>
-              <a:t>Sprint 4</a:t>
-            </a:r>
-          </a:p>
-        </p:txBody>
-      </p:sp>
-      <p:sp>
-        <p:nvSpPr>
-          <p:cNvPr id="12" name="CaixaDeTexto 11">
-            <a:extLst>
-              <a:ext uri="{FF2B5EF4-FFF2-40B4-BE49-F238E27FC236}">
-                <a16:creationId xmlns:a16="http://schemas.microsoft.com/office/drawing/2014/main" id="{9C3ED831-0514-4C24-D5BA-17C72D887540}"/>
-              </a:ext>
-            </a:extLst>
-          </p:cNvPr>
-          <p:cNvSpPr txBox="1"/>
-          <p:nvPr/>
-        </p:nvSpPr>
-        <p:spPr>
-          <a:xfrm>
-            <a:off x="5905438" y="5348387"/>
-            <a:ext cx="3754876" cy="707886"/>
-          </a:xfrm>
-          <a:prstGeom prst="rect">
-            <a:avLst/>
-          </a:prstGeom>
-          <a:noFill/>
-        </p:spPr>
-        <p:txBody>
-          <a:bodyPr wrap="square" rtlCol="0">
-            <a:spAutoFit/>
-          </a:bodyPr>
-          <a:lstStyle/>
-          <a:p>
-            <a:pPr marL="0" indent="0" algn="ctr" rtl="0" eaLnBrk="1" latinLnBrk="0" hangingPunct="1">
-              <a:spcBef>
-                <a:spcPts val="250"/>
-              </a:spcBef>
-              <a:spcAft>
-                <a:spcPts val="250"/>
-              </a:spcAft>
-              <a:buNone/>
-            </a:pPr>
-            <a:r>
-              <a:rPr lang="pt-BR" sz="2000" kern="100" dirty="0">
-                <a:solidFill>
-                  <a:schemeClr val="tx1">
-                    <a:lumMod val="65000"/>
-                    <a:lumOff val="35000"/>
-                  </a:schemeClr>
-                </a:solidFill>
-                <a:effectLst/>
-                <a:ea typeface="Calibri" panose="020F0502020204030204" pitchFamily="34" charset="0"/>
-                <a:cs typeface="Helvetica" panose="020B0604020202020204" pitchFamily="34" charset="0"/>
-              </a:rPr>
-              <a:t>Autenticação de usuário </a:t>
-            </a:r>
-            <a:br>
-              <a:rPr lang="pt-BR" sz="2000" kern="100" dirty="0">
-                <a:solidFill>
-                  <a:schemeClr val="tx1">
-                    <a:lumMod val="65000"/>
-                    <a:lumOff val="35000"/>
-                  </a:schemeClr>
-                </a:solidFill>
-                <a:effectLst/>
-                <a:ea typeface="Calibri" panose="020F0502020204030204" pitchFamily="34" charset="0"/>
-                <a:cs typeface="Helvetica" panose="020B0604020202020204" pitchFamily="34" charset="0"/>
-              </a:rPr>
-            </a:br>
-            <a:r>
-              <a:rPr lang="pt-BR" sz="2000" kern="100" dirty="0">
-                <a:solidFill>
-                  <a:schemeClr val="tx1">
-                    <a:lumMod val="65000"/>
-                    <a:lumOff val="35000"/>
-                  </a:schemeClr>
-                </a:solidFill>
-                <a:effectLst/>
-                <a:ea typeface="Calibri" panose="020F0502020204030204" pitchFamily="34" charset="0"/>
-                <a:cs typeface="Helvetica" panose="020B0604020202020204" pitchFamily="34" charset="0"/>
-              </a:rPr>
-              <a:t>e geração de PDF</a:t>
-            </a:r>
-            <a:endParaRPr lang="pt-BR" sz="2000" dirty="0">
-              <a:solidFill>
-                <a:schemeClr val="tx1">
-                  <a:lumMod val="65000"/>
-                  <a:lumOff val="35000"/>
-                </a:schemeClr>
-              </a:solidFill>
-              <a:effectLst/>
-              <a:cs typeface="Helvetica" panose="020B0604020202020204" pitchFamily="34" charset="0"/>
-            </a:endParaRPr>
-          </a:p>
-        </p:txBody>
-      </p:sp>
-      <p:sp>
-        <p:nvSpPr>
-          <p:cNvPr id="13" name="Retângulo 12">
-            <a:extLst>
-              <a:ext uri="{FF2B5EF4-FFF2-40B4-BE49-F238E27FC236}">
-                <a16:creationId xmlns:a16="http://schemas.microsoft.com/office/drawing/2014/main" id="{68F4028B-6928-866E-4DB0-F93E5A914B0A}"/>
-              </a:ext>
-            </a:extLst>
-          </p:cNvPr>
-          <p:cNvSpPr/>
-          <p:nvPr/>
-        </p:nvSpPr>
-        <p:spPr>
-          <a:xfrm>
-            <a:off x="3473088" y="4431680"/>
-            <a:ext cx="1780162" cy="773349"/>
-          </a:xfrm>
-          <a:prstGeom prst="rect">
-            <a:avLst/>
-          </a:prstGeom>
-          <a:noFill/>
-          <a:ln w="57150">
-            <a:solidFill>
-              <a:srgbClr val="A50000"/>
-            </a:solidFill>
-          </a:ln>
-        </p:spPr>
-        <p:style>
-          <a:lnRef idx="2">
-            <a:schemeClr val="accent1">
-              <a:shade val="15000"/>
-            </a:schemeClr>
-          </a:lnRef>
-          <a:fillRef idx="1">
-            <a:schemeClr val="accent1"/>
-          </a:fillRef>
-          <a:effectRef idx="0">
-            <a:schemeClr val="accent1"/>
-          </a:effectRef>
-          <a:fontRef idx="minor">
-            <a:schemeClr val="lt1"/>
-          </a:fontRef>
-        </p:style>
-        <p:txBody>
-          <a:bodyPr rtlCol="0" anchor="ctr"/>
-          <a:lstStyle/>
-          <a:p>
-            <a:pPr algn="ctr"/>
-            <a:r>
-              <a:rPr lang="pt-BR" sz="2800" b="1" dirty="0">
-                <a:solidFill>
-                  <a:srgbClr val="A50000"/>
-                </a:solidFill>
-              </a:rPr>
-              <a:t>Sprint 3</a:t>
-            </a:r>
-          </a:p>
-        </p:txBody>
-      </p:sp>
-      <p:sp>
-        <p:nvSpPr>
-          <p:cNvPr id="14" name="CaixaDeTexto 13">
-            <a:extLst>
-              <a:ext uri="{FF2B5EF4-FFF2-40B4-BE49-F238E27FC236}">
-                <a16:creationId xmlns:a16="http://schemas.microsoft.com/office/drawing/2014/main" id="{D325D3F2-3ABC-9A9E-AD32-F002424CAF48}"/>
-              </a:ext>
-            </a:extLst>
-          </p:cNvPr>
-          <p:cNvSpPr txBox="1"/>
-          <p:nvPr/>
-        </p:nvSpPr>
-        <p:spPr>
-          <a:xfrm>
-            <a:off x="2496766" y="5373290"/>
-            <a:ext cx="3754876" cy="707886"/>
-          </a:xfrm>
-          <a:prstGeom prst="rect">
-            <a:avLst/>
-          </a:prstGeom>
-          <a:noFill/>
-        </p:spPr>
-        <p:txBody>
-          <a:bodyPr wrap="square" rtlCol="0">
-            <a:spAutoFit/>
-          </a:bodyPr>
-          <a:lstStyle/>
-          <a:p>
-            <a:pPr marL="0" indent="0" algn="ctr" rtl="0" eaLnBrk="1" latinLnBrk="0" hangingPunct="1">
-              <a:spcBef>
-                <a:spcPts val="250"/>
-              </a:spcBef>
-              <a:spcAft>
-                <a:spcPts val="250"/>
-              </a:spcAft>
-              <a:buNone/>
-            </a:pPr>
-            <a:r>
-              <a:rPr lang="pt-BR" sz="2000" kern="100" dirty="0">
-                <a:solidFill>
-                  <a:schemeClr val="tx1">
-                    <a:lumMod val="65000"/>
-                    <a:lumOff val="35000"/>
-                  </a:schemeClr>
-                </a:solidFill>
-                <a:effectLst/>
-                <a:ea typeface="Calibri" panose="020F0502020204030204" pitchFamily="34" charset="0"/>
-                <a:cs typeface="Helvetica" panose="020B0604020202020204" pitchFamily="34" charset="0"/>
-              </a:rPr>
-              <a:t>Visualização e aprovação </a:t>
-            </a:r>
-            <a:br>
-              <a:rPr lang="pt-BR" sz="2000" kern="100" dirty="0">
-                <a:solidFill>
-                  <a:schemeClr val="tx1">
-                    <a:lumMod val="65000"/>
-                    <a:lumOff val="35000"/>
-                  </a:schemeClr>
-                </a:solidFill>
-                <a:effectLst/>
-                <a:ea typeface="Calibri" panose="020F0502020204030204" pitchFamily="34" charset="0"/>
-                <a:cs typeface="Helvetica" panose="020B0604020202020204" pitchFamily="34" charset="0"/>
-              </a:rPr>
-            </a:br>
-            <a:r>
-              <a:rPr lang="pt-BR" sz="2000" kern="100" dirty="0">
-                <a:solidFill>
-                  <a:schemeClr val="tx1">
-                    <a:lumMod val="65000"/>
-                    <a:lumOff val="35000"/>
-                  </a:schemeClr>
-                </a:solidFill>
-                <a:effectLst/>
-                <a:ea typeface="Calibri" panose="020F0502020204030204" pitchFamily="34" charset="0"/>
-                <a:cs typeface="Helvetica" panose="020B0604020202020204" pitchFamily="34" charset="0"/>
-              </a:rPr>
-              <a:t>dos formulários.</a:t>
-            </a:r>
-          </a:p>
-        </p:txBody>
-      </p:sp>
-      <p:cxnSp>
-        <p:nvCxnSpPr>
-          <p:cNvPr id="16" name="Conector reto 15">
-            <a:extLst>
-              <a:ext uri="{FF2B5EF4-FFF2-40B4-BE49-F238E27FC236}">
-                <a16:creationId xmlns:a16="http://schemas.microsoft.com/office/drawing/2014/main" id="{DDA0F973-6C9D-23B0-09FD-607614873CD7}"/>
-              </a:ext>
-            </a:extLst>
-          </p:cNvPr>
-          <p:cNvCxnSpPr/>
-          <p:nvPr/>
-        </p:nvCxnSpPr>
-        <p:spPr>
-          <a:xfrm>
-            <a:off x="530942" y="324465"/>
-            <a:ext cx="0" cy="6164825"/>
-          </a:xfrm>
-          <a:prstGeom prst="line">
-            <a:avLst/>
-          </a:prstGeom>
-          <a:ln w="57150">
-            <a:solidFill>
-              <a:srgbClr val="A50000"/>
-            </a:solidFill>
-          </a:ln>
-        </p:spPr>
-        <p:style>
-          <a:lnRef idx="1">
-            <a:schemeClr val="accent1"/>
-          </a:lnRef>
-          <a:fillRef idx="0">
-            <a:schemeClr val="accent1"/>
-          </a:fillRef>
-          <a:effectRef idx="0">
-            <a:schemeClr val="accent1"/>
-          </a:effectRef>
-          <a:fontRef idx="minor">
-            <a:schemeClr val="tx1"/>
-          </a:fontRef>
-        </p:style>
-      </p:cxnSp>
-      <p:cxnSp>
-        <p:nvCxnSpPr>
-          <p:cNvPr id="17" name="Conector reto 16">
-            <a:extLst>
-              <a:ext uri="{FF2B5EF4-FFF2-40B4-BE49-F238E27FC236}">
-                <a16:creationId xmlns:a16="http://schemas.microsoft.com/office/drawing/2014/main" id="{F549B772-E89F-8B65-B99F-F6D7F43A5E5C}"/>
-              </a:ext>
-            </a:extLst>
-          </p:cNvPr>
-          <p:cNvCxnSpPr/>
-          <p:nvPr/>
-        </p:nvCxnSpPr>
-        <p:spPr>
-          <a:xfrm>
-            <a:off x="11675597" y="324465"/>
-            <a:ext cx="0" cy="6164825"/>
-          </a:xfrm>
-          <a:prstGeom prst="line">
-            <a:avLst/>
-          </a:prstGeom>
-          <a:ln w="57150">
-            <a:solidFill>
-              <a:srgbClr val="A50000"/>
-            </a:solidFill>
-          </a:ln>
-        </p:spPr>
-        <p:style>
-          <a:lnRef idx="1">
-            <a:schemeClr val="accent1"/>
-          </a:lnRef>
-          <a:fillRef idx="0">
-            <a:schemeClr val="accent1"/>
-          </a:fillRef>
-          <a:effectRef idx="0">
-            <a:schemeClr val="accent1"/>
-          </a:effectRef>
-          <a:fontRef idx="minor">
-            <a:schemeClr val="tx1"/>
-          </a:fontRef>
-        </p:style>
-      </p:cxnSp>
     </p:spTree>
     <p:extLst>
       <p:ext uri="{BB962C8B-B14F-4D97-AF65-F5344CB8AC3E}">
-        <p14:creationId xmlns:p14="http://schemas.microsoft.com/office/powerpoint/2010/main" val="1694765811"/>
+        <p14:creationId xmlns:p14="http://schemas.microsoft.com/office/powerpoint/2010/main" val="1063294302"/>
       </p:ext>
     </p:extLst>
   </p:cSld>
@@ -17189,14 +18951,6 @@
 <file path=ppt/slides/slide9.xml><?xml version="1.0" encoding="utf-8"?>
 <p:sld xmlns:a="http://schemas.openxmlformats.org/drawingml/2006/main" xmlns:r="http://schemas.openxmlformats.org/officeDocument/2006/relationships" xmlns:p="http://schemas.openxmlformats.org/presentationml/2006/main">
   <p:cSld>
-    <p:bg>
-      <p:bgPr>
-        <a:solidFill>
-          <a:schemeClr val="bg1"/>
-        </a:solidFill>
-        <a:effectLst/>
-      </p:bgPr>
-    </p:bg>
     <p:spTree>
       <p:nvGrpSpPr>
         <p:cNvPr id="1" name=""/>
@@ -17211,72 +18965,12 @@
           <a:chExt cx="0" cy="0"/>
         </a:xfrm>
       </p:grpSpPr>
-      <p:sp useBgFill="1">
-        <p:nvSpPr>
-          <p:cNvPr id="53" name="Rectangle 52">
-            <a:extLst>
-              <a:ext uri="{FF2B5EF4-FFF2-40B4-BE49-F238E27FC236}">
-                <a16:creationId xmlns:a16="http://schemas.microsoft.com/office/drawing/2014/main" id="{2C61293E-6EBE-43EF-A52C-9BEBFD7679D4}"/>
-              </a:ext>
-              <a:ext uri="{C183D7F6-B498-43B3-948B-1728B52AA6E4}">
-                <adec:decorative xmlns:adec="http://schemas.microsoft.com/office/drawing/2017/decorative" val="1"/>
-              </a:ext>
-            </a:extLst>
-          </p:cNvPr>
-          <p:cNvSpPr>
-            <a:spLocks noGrp="1" noRot="1" noChangeAspect="1" noMove="1" noResize="1" noEditPoints="1" noAdjustHandles="1" noChangeArrowheads="1" noChangeShapeType="1" noTextEdit="1"/>
-          </p:cNvSpPr>
-          <p:nvPr>
-            <p:extLst>
-              <p:ext uri="{386F3935-93C4-4BCD-93E2-E3B085C9AB24}">
-                <p16:designElem xmlns:p16="http://schemas.microsoft.com/office/powerpoint/2015/main" val="1"/>
-              </p:ext>
-            </p:extLst>
-          </p:nvPr>
-        </p:nvSpPr>
-        <p:spPr>
-          <a:xfrm>
-            <a:off x="0" y="0"/>
-            <a:ext cx="12188952" cy="6858000"/>
-          </a:xfrm>
-          <a:prstGeom prst="rect">
-            <a:avLst/>
-          </a:prstGeom>
-          <a:ln>
-            <a:noFill/>
-          </a:ln>
-        </p:spPr>
-        <p:style>
-          <a:lnRef idx="2">
-            <a:schemeClr val="accent1">
-              <a:shade val="50000"/>
-            </a:schemeClr>
-          </a:lnRef>
-          <a:fillRef idx="1">
-            <a:schemeClr val="accent1"/>
-          </a:fillRef>
-          <a:effectRef idx="0">
-            <a:schemeClr val="accent1"/>
-          </a:effectRef>
-          <a:fontRef idx="minor">
-            <a:schemeClr val="lt1"/>
-          </a:fontRef>
-        </p:style>
-        <p:txBody>
-          <a:bodyPr rtlCol="0" anchor="ctr"/>
-          <a:lstStyle/>
-          <a:p>
-            <a:pPr algn="ctr"/>
-            <a:endParaRPr lang="en-US"/>
-          </a:p>
-        </p:txBody>
-      </p:sp>
       <p:sp>
         <p:nvSpPr>
           <p:cNvPr id="2" name="Título 1">
             <a:extLst>
               <a:ext uri="{FF2B5EF4-FFF2-40B4-BE49-F238E27FC236}">
-                <a16:creationId xmlns:a16="http://schemas.microsoft.com/office/drawing/2014/main" id="{B5F29AA7-0676-B8E5-256F-B8257A37A4EB}"/>
+                <a16:creationId xmlns:a16="http://schemas.microsoft.com/office/drawing/2014/main" id="{8526413E-CC99-95EF-0BB7-BB595C1845DF}"/>
               </a:ext>
             </a:extLst>
           </p:cNvPr>
@@ -17289,35 +18983,275 @@
         </p:nvSpPr>
         <p:spPr>
           <a:xfrm>
-            <a:off x="5297762" y="329184"/>
-            <a:ext cx="6251110" cy="1783080"/>
+            <a:off x="630936" y="502920"/>
+            <a:ext cx="3419856" cy="1463040"/>
           </a:xfrm>
         </p:spPr>
         <p:txBody>
-          <a:bodyPr anchor="b">
+          <a:bodyPr vert="horz" lIns="91440" tIns="45720" rIns="91440" bIns="45720" rtlCol="0" anchor="ctr">
             <a:normAutofit/>
           </a:bodyPr>
           <a:lstStyle/>
           <a:p>
             <a:r>
-              <a:rPr lang="pt-BR" sz="5400" b="1">
+              <a:rPr lang="en-US" sz="3700" b="1" kern="1200" dirty="0" err="1">
+                <a:solidFill>
+                  <a:srgbClr val="A50000"/>
+                </a:solidFill>
                 <a:effectLst/>
-                <a:latin typeface="Calibri" panose="020F0502020204030204" pitchFamily="34" charset="0"/>
-                <a:ea typeface="Calibri" panose="020F0502020204030204" pitchFamily="34" charset="0"/>
-                <a:cs typeface="Times New Roman" panose="02020603050405020304" pitchFamily="18" charset="0"/>
+                <a:latin typeface="+mn-lt"/>
+                <a:ea typeface="+mj-ea"/>
+                <a:cs typeface="+mj-cs"/>
               </a:rPr>
-              <a:t>Tecnologias Utilizadas</a:t>
+              <a:t>Modelagem</a:t>
             </a:r>
-            <a:endParaRPr lang="pt-BR" sz="5400" b="1"/>
+            <a:r>
+              <a:rPr lang="en-US" sz="3700" b="1" kern="1200" dirty="0">
+                <a:solidFill>
+                  <a:srgbClr val="A50000"/>
+                </a:solidFill>
+                <a:effectLst/>
+                <a:latin typeface="+mn-lt"/>
+                <a:ea typeface="+mj-ea"/>
+                <a:cs typeface="+mj-cs"/>
+              </a:rPr>
+              <a:t> do Banco de Dados</a:t>
+            </a:r>
+            <a:endParaRPr lang="en-US" sz="3700" b="1" kern="1200" dirty="0">
+              <a:solidFill>
+                <a:srgbClr val="A50000"/>
+              </a:solidFill>
+              <a:latin typeface="+mn-lt"/>
+              <a:ea typeface="+mj-ea"/>
+              <a:cs typeface="+mj-cs"/>
+            </a:endParaRPr>
+          </a:p>
+        </p:txBody>
+      </p:sp>
+      <p:sp>
+        <p:nvSpPr>
+          <p:cNvPr id="9" name="Espaço Reservado para Conteúdo 2">
+            <a:extLst>
+              <a:ext uri="{FF2B5EF4-FFF2-40B4-BE49-F238E27FC236}">
+                <a16:creationId xmlns:a16="http://schemas.microsoft.com/office/drawing/2014/main" id="{A5C6B6B0-1787-4948-2699-EDFD3E8B9933}"/>
+              </a:ext>
+            </a:extLst>
+          </p:cNvPr>
+          <p:cNvSpPr txBox="1">
+            <a:spLocks/>
+          </p:cNvSpPr>
+          <p:nvPr/>
+        </p:nvSpPr>
+        <p:spPr>
+          <a:xfrm>
+            <a:off x="4654295" y="502920"/>
+            <a:ext cx="6894576" cy="1463040"/>
+          </a:xfrm>
+          <a:prstGeom prst="rect">
+            <a:avLst/>
+          </a:prstGeom>
+        </p:spPr>
+        <p:txBody>
+          <a:bodyPr vert="horz" lIns="91440" tIns="45720" rIns="91440" bIns="45720" rtlCol="0" anchor="ctr">
+            <a:normAutofit/>
+          </a:bodyPr>
+          <a:lstStyle>
+            <a:lvl1pPr marL="228600" indent="-228600" algn="l" defTabSz="914400" rtl="0" eaLnBrk="1" latinLnBrk="0" hangingPunct="1">
+              <a:lnSpc>
+                <a:spcPct val="90000"/>
+              </a:lnSpc>
+              <a:spcBef>
+                <a:spcPts val="1000"/>
+              </a:spcBef>
+              <a:buFont typeface="Arial" panose="020B0604020202020204" pitchFamily="34" charset="0"/>
+              <a:buChar char="•"/>
+              <a:defRPr sz="2800" kern="1200">
+                <a:solidFill>
+                  <a:schemeClr val="tx1"/>
+                </a:solidFill>
+                <a:latin typeface="+mn-lt"/>
+                <a:ea typeface="+mn-ea"/>
+                <a:cs typeface="+mn-cs"/>
+              </a:defRPr>
+            </a:lvl1pPr>
+            <a:lvl2pPr marL="685800" indent="-228600" algn="l" defTabSz="914400" rtl="0" eaLnBrk="1" latinLnBrk="0" hangingPunct="1">
+              <a:lnSpc>
+                <a:spcPct val="90000"/>
+              </a:lnSpc>
+              <a:spcBef>
+                <a:spcPts val="500"/>
+              </a:spcBef>
+              <a:buFont typeface="Arial" panose="020B0604020202020204" pitchFamily="34" charset="0"/>
+              <a:buChar char="•"/>
+              <a:defRPr sz="2400" kern="1200">
+                <a:solidFill>
+                  <a:schemeClr val="tx1"/>
+                </a:solidFill>
+                <a:latin typeface="+mn-lt"/>
+                <a:ea typeface="+mn-ea"/>
+                <a:cs typeface="+mn-cs"/>
+              </a:defRPr>
+            </a:lvl2pPr>
+            <a:lvl3pPr marL="1143000" indent="-228600" algn="l" defTabSz="914400" rtl="0" eaLnBrk="1" latinLnBrk="0" hangingPunct="1">
+              <a:lnSpc>
+                <a:spcPct val="90000"/>
+              </a:lnSpc>
+              <a:spcBef>
+                <a:spcPts val="500"/>
+              </a:spcBef>
+              <a:buFont typeface="Arial" panose="020B0604020202020204" pitchFamily="34" charset="0"/>
+              <a:buChar char="•"/>
+              <a:defRPr sz="2000" kern="1200">
+                <a:solidFill>
+                  <a:schemeClr val="tx1"/>
+                </a:solidFill>
+                <a:latin typeface="+mn-lt"/>
+                <a:ea typeface="+mn-ea"/>
+                <a:cs typeface="+mn-cs"/>
+              </a:defRPr>
+            </a:lvl3pPr>
+            <a:lvl4pPr marL="1600200" indent="-228600" algn="l" defTabSz="914400" rtl="0" eaLnBrk="1" latinLnBrk="0" hangingPunct="1">
+              <a:lnSpc>
+                <a:spcPct val="90000"/>
+              </a:lnSpc>
+              <a:spcBef>
+                <a:spcPts val="500"/>
+              </a:spcBef>
+              <a:buFont typeface="Arial" panose="020B0604020202020204" pitchFamily="34" charset="0"/>
+              <a:buChar char="•"/>
+              <a:defRPr sz="1800" kern="1200">
+                <a:solidFill>
+                  <a:schemeClr val="tx1"/>
+                </a:solidFill>
+                <a:latin typeface="+mn-lt"/>
+                <a:ea typeface="+mn-ea"/>
+                <a:cs typeface="+mn-cs"/>
+              </a:defRPr>
+            </a:lvl4pPr>
+            <a:lvl5pPr marL="2057400" indent="-228600" algn="l" defTabSz="914400" rtl="0" eaLnBrk="1" latinLnBrk="0" hangingPunct="1">
+              <a:lnSpc>
+                <a:spcPct val="90000"/>
+              </a:lnSpc>
+              <a:spcBef>
+                <a:spcPts val="500"/>
+              </a:spcBef>
+              <a:buFont typeface="Arial" panose="020B0604020202020204" pitchFamily="34" charset="0"/>
+              <a:buChar char="•"/>
+              <a:defRPr sz="1800" kern="1200">
+                <a:solidFill>
+                  <a:schemeClr val="tx1"/>
+                </a:solidFill>
+                <a:latin typeface="+mn-lt"/>
+                <a:ea typeface="+mn-ea"/>
+                <a:cs typeface="+mn-cs"/>
+              </a:defRPr>
+            </a:lvl5pPr>
+            <a:lvl6pPr marL="2514600" indent="-228600" algn="l" defTabSz="914400" rtl="0" eaLnBrk="1" latinLnBrk="0" hangingPunct="1">
+              <a:lnSpc>
+                <a:spcPct val="90000"/>
+              </a:lnSpc>
+              <a:spcBef>
+                <a:spcPts val="500"/>
+              </a:spcBef>
+              <a:buFont typeface="Arial" panose="020B0604020202020204" pitchFamily="34" charset="0"/>
+              <a:buChar char="•"/>
+              <a:defRPr sz="1800" kern="1200">
+                <a:solidFill>
+                  <a:schemeClr val="tx1"/>
+                </a:solidFill>
+                <a:latin typeface="+mn-lt"/>
+                <a:ea typeface="+mn-ea"/>
+                <a:cs typeface="+mn-cs"/>
+              </a:defRPr>
+            </a:lvl6pPr>
+            <a:lvl7pPr marL="2971800" indent="-228600" algn="l" defTabSz="914400" rtl="0" eaLnBrk="1" latinLnBrk="0" hangingPunct="1">
+              <a:lnSpc>
+                <a:spcPct val="90000"/>
+              </a:lnSpc>
+              <a:spcBef>
+                <a:spcPts val="500"/>
+              </a:spcBef>
+              <a:buFont typeface="Arial" panose="020B0604020202020204" pitchFamily="34" charset="0"/>
+              <a:buChar char="•"/>
+              <a:defRPr sz="1800" kern="1200">
+                <a:solidFill>
+                  <a:schemeClr val="tx1"/>
+                </a:solidFill>
+                <a:latin typeface="+mn-lt"/>
+                <a:ea typeface="+mn-ea"/>
+                <a:cs typeface="+mn-cs"/>
+              </a:defRPr>
+            </a:lvl7pPr>
+            <a:lvl8pPr marL="3429000" indent="-228600" algn="l" defTabSz="914400" rtl="0" eaLnBrk="1" latinLnBrk="0" hangingPunct="1">
+              <a:lnSpc>
+                <a:spcPct val="90000"/>
+              </a:lnSpc>
+              <a:spcBef>
+                <a:spcPts val="500"/>
+              </a:spcBef>
+              <a:buFont typeface="Arial" panose="020B0604020202020204" pitchFamily="34" charset="0"/>
+              <a:buChar char="•"/>
+              <a:defRPr sz="1800" kern="1200">
+                <a:solidFill>
+                  <a:schemeClr val="tx1"/>
+                </a:solidFill>
+                <a:latin typeface="+mn-lt"/>
+                <a:ea typeface="+mn-ea"/>
+                <a:cs typeface="+mn-cs"/>
+              </a:defRPr>
+            </a:lvl8pPr>
+            <a:lvl9pPr marL="3886200" indent="-228600" algn="l" defTabSz="914400" rtl="0" eaLnBrk="1" latinLnBrk="0" hangingPunct="1">
+              <a:lnSpc>
+                <a:spcPct val="90000"/>
+              </a:lnSpc>
+              <a:spcBef>
+                <a:spcPts val="500"/>
+              </a:spcBef>
+              <a:buFont typeface="Arial" panose="020B0604020202020204" pitchFamily="34" charset="0"/>
+              <a:buChar char="•"/>
+              <a:defRPr sz="1800" kern="1200">
+                <a:solidFill>
+                  <a:schemeClr val="tx1"/>
+                </a:solidFill>
+                <a:latin typeface="+mn-lt"/>
+                <a:ea typeface="+mn-ea"/>
+                <a:cs typeface="+mn-cs"/>
+              </a:defRPr>
+            </a:lvl9pPr>
+          </a:lstStyle>
+          <a:p>
+            <a:pPr marL="0">
+              <a:spcBef>
+                <a:spcPts val="250"/>
+              </a:spcBef>
+              <a:spcAft>
+                <a:spcPts val="250"/>
+              </a:spcAft>
+            </a:pPr>
+            <a:r>
+              <a:rPr lang="en-US" sz="2200"/>
+              <a:t>Diagrama Entidade-Relacionamento</a:t>
+            </a:r>
+          </a:p>
+          <a:p>
+            <a:pPr marL="0">
+              <a:spcBef>
+                <a:spcPts val="250"/>
+              </a:spcBef>
+              <a:spcAft>
+                <a:spcPts val="250"/>
+              </a:spcAft>
+            </a:pPr>
+            <a:endParaRPr lang="en-US" sz="2200"/>
           </a:p>
         </p:txBody>
       </p:sp>
       <p:pic>
         <p:nvPicPr>
-          <p:cNvPr id="16" name="Picture 15" descr="Script de computador em uma tela">
+          <p:cNvPr id="8" name="Imagem 7" descr="Diagrama&#10;&#10;Descrição gerada automaticamente">
             <a:extLst>
               <a:ext uri="{FF2B5EF4-FFF2-40B4-BE49-F238E27FC236}">
-                <a16:creationId xmlns:a16="http://schemas.microsoft.com/office/drawing/2014/main" id="{09038183-57B3-D49D-BDCA-1909565EAAF1}"/>
+                <a16:creationId xmlns:a16="http://schemas.microsoft.com/office/drawing/2014/main" id="{7F790C46-B381-7A54-EB0C-E594283FED1A}"/>
               </a:ext>
             </a:extLst>
           </p:cNvPr>
@@ -17326,734 +19260,32 @@
           </p:cNvPicPr>
           <p:nvPr/>
         </p:nvPicPr>
-        <p:blipFill rotWithShape="1">
-          <a:blip r:embed="rId2"/>
-          <a:srcRect l="7122" r="47547" b="-1"/>
-          <a:stretch/>
+        <p:blipFill>
+          <a:blip r:embed="rId3">
+            <a:extLst>
+              <a:ext uri="{28A0092B-C50C-407E-A947-70E740481C1C}">
+                <a14:useLocalDpi xmlns:a14="http://schemas.microsoft.com/office/drawing/2010/main" val="0"/>
+              </a:ext>
+            </a:extLst>
+          </a:blip>
+          <a:stretch>
+            <a:fillRect/>
+          </a:stretch>
         </p:blipFill>
         <p:spPr>
           <a:xfrm>
-            <a:off x="1" y="10"/>
-            <a:ext cx="4657344" cy="6857990"/>
+            <a:off x="9832" y="2265007"/>
+            <a:ext cx="12043691" cy="4215290"/>
           </a:xfrm>
-          <a:custGeom>
+          <a:prstGeom prst="rect">
             <a:avLst/>
-            <a:gdLst/>
-            <a:ahLst/>
-            <a:cxnLst/>
-            <a:rect l="l" t="t" r="r" b="b"/>
-            <a:pathLst>
-              <a:path w="4657344" h="6858000">
-                <a:moveTo>
-                  <a:pt x="0" y="0"/>
-                </a:moveTo>
-                <a:lnTo>
-                  <a:pt x="3429755" y="0"/>
-                </a:lnTo>
-                <a:lnTo>
-                  <a:pt x="3526016" y="148742"/>
-                </a:lnTo>
-                <a:cubicBezTo>
-                  <a:pt x="3657740" y="365513"/>
-                  <a:pt x="3777402" y="589569"/>
-                  <a:pt x="3886489" y="819975"/>
-                </a:cubicBezTo>
-                <a:cubicBezTo>
-                  <a:pt x="3891856" y="833492"/>
-                  <a:pt x="3900663" y="845393"/>
-                  <a:pt x="3912049" y="854514"/>
-                </a:cubicBezTo>
-                <a:cubicBezTo>
-                  <a:pt x="3897352" y="819849"/>
-                  <a:pt x="3883037" y="784928"/>
-                  <a:pt x="3868083" y="750263"/>
-                </a:cubicBezTo>
-                <a:cubicBezTo>
-                  <a:pt x="3806989" y="608712"/>
-                  <a:pt x="3742478" y="469145"/>
-                  <a:pt x="3674155" y="331786"/>
-                </a:cubicBezTo>
-                <a:lnTo>
-                  <a:pt x="3496656" y="0"/>
-                </a:lnTo>
-                <a:lnTo>
-                  <a:pt x="3554371" y="0"/>
-                </a:lnTo>
-                <a:lnTo>
-                  <a:pt x="3661621" y="196614"/>
-                </a:lnTo>
-                <a:cubicBezTo>
-                  <a:pt x="3856899" y="573253"/>
-                  <a:pt x="4021071" y="966066"/>
-                  <a:pt x="4161279" y="1371196"/>
-                </a:cubicBezTo>
-                <a:cubicBezTo>
-                  <a:pt x="4379525" y="2007265"/>
-                  <a:pt x="4530141" y="2664286"/>
-                  <a:pt x="4610660" y="3331516"/>
-                </a:cubicBezTo>
-                <a:cubicBezTo>
-                  <a:pt x="4652837" y="3672965"/>
-                  <a:pt x="4671625" y="4013908"/>
-                  <a:pt x="4645040" y="4357388"/>
-                </a:cubicBezTo>
-                <a:cubicBezTo>
-                  <a:pt x="4613599" y="4758899"/>
-                  <a:pt x="4566181" y="5157998"/>
-                  <a:pt x="4485789" y="5552906"/>
-                </a:cubicBezTo>
-                <a:cubicBezTo>
-                  <a:pt x="4397121" y="5988893"/>
-                  <a:pt x="4276748" y="6414594"/>
-                  <a:pt x="4117769" y="6828295"/>
-                </a:cubicBezTo>
-                <a:lnTo>
-                  <a:pt x="4105288" y="6858000"/>
-                </a:lnTo>
-                <a:lnTo>
-                  <a:pt x="4052520" y="6858000"/>
-                </a:lnTo>
-                <a:lnTo>
-                  <a:pt x="4059369" y="6841549"/>
-                </a:lnTo>
-                <a:cubicBezTo>
-                  <a:pt x="4147276" y="6614016"/>
-                  <a:pt x="4224193" y="6380817"/>
-                  <a:pt x="4291518" y="6142729"/>
-                </a:cubicBezTo>
-                <a:cubicBezTo>
-                  <a:pt x="4350055" y="5935370"/>
-                  <a:pt x="4393256" y="5723695"/>
-                  <a:pt x="4443357" y="5513923"/>
-                </a:cubicBezTo>
-                <a:cubicBezTo>
-                  <a:pt x="4444541" y="5502788"/>
-                  <a:pt x="4445137" y="5491601"/>
-                  <a:pt x="4445146" y="5480401"/>
-                </a:cubicBezTo>
-                <a:cubicBezTo>
-                  <a:pt x="4408465" y="5607635"/>
-                  <a:pt x="4379196" y="5719759"/>
-                  <a:pt x="4344559" y="5830359"/>
-                </a:cubicBezTo>
-                <a:cubicBezTo>
-                  <a:pt x="4254261" y="6118381"/>
-                  <a:pt x="4150112" y="6398531"/>
-                  <a:pt x="4031702" y="6670527"/>
-                </a:cubicBezTo>
-                <a:lnTo>
-                  <a:pt x="3943824" y="6858000"/>
-                </a:lnTo>
-                <a:lnTo>
-                  <a:pt x="0" y="6858000"/>
-                </a:lnTo>
-                <a:close/>
-              </a:path>
-            </a:pathLst>
-          </a:custGeom>
+          </a:prstGeom>
         </p:spPr>
       </p:pic>
-      <p:sp>
-        <p:nvSpPr>
-          <p:cNvPr id="55" name="sketchy line">
-            <a:extLst>
-              <a:ext uri="{FF2B5EF4-FFF2-40B4-BE49-F238E27FC236}">
-                <a16:creationId xmlns:a16="http://schemas.microsoft.com/office/drawing/2014/main" id="{21540236-BFD5-4A9D-8840-4703E7F76825}"/>
-              </a:ext>
-              <a:ext uri="{C183D7F6-B498-43B3-948B-1728B52AA6E4}">
-                <adec:decorative xmlns:adec="http://schemas.microsoft.com/office/drawing/2017/decorative" val="1"/>
-              </a:ext>
-            </a:extLst>
-          </p:cNvPr>
-          <p:cNvSpPr>
-            <a:spLocks noGrp="1" noRot="1" noChangeAspect="1" noMove="1" noResize="1" noEditPoints="1" noAdjustHandles="1" noChangeArrowheads="1" noChangeShapeType="1" noTextEdit="1"/>
-          </p:cNvSpPr>
-          <p:nvPr>
-            <p:extLst>
-              <p:ext uri="{386F3935-93C4-4BCD-93E2-E3B085C9AB24}">
-                <p16:designElem xmlns:p16="http://schemas.microsoft.com/office/powerpoint/2015/main" val="1"/>
-              </p:ext>
-            </p:extLst>
-          </p:nvPr>
-        </p:nvSpPr>
-        <p:spPr>
-          <a:xfrm>
-            <a:off x="5297762" y="2374947"/>
-            <a:ext cx="4243589" cy="18288"/>
-          </a:xfrm>
-          <a:custGeom>
-            <a:avLst/>
-            <a:gdLst>
-              <a:gd name="connsiteX0" fmla="*/ 0 w 4243589"/>
-              <a:gd name="connsiteY0" fmla="*/ 0 h 18288"/>
-              <a:gd name="connsiteX1" fmla="*/ 478919 w 4243589"/>
-              <a:gd name="connsiteY1" fmla="*/ 0 h 18288"/>
-              <a:gd name="connsiteX2" fmla="*/ 957839 w 4243589"/>
-              <a:gd name="connsiteY2" fmla="*/ 0 h 18288"/>
-              <a:gd name="connsiteX3" fmla="*/ 1521630 w 4243589"/>
-              <a:gd name="connsiteY3" fmla="*/ 0 h 18288"/>
-              <a:gd name="connsiteX4" fmla="*/ 2212729 w 4243589"/>
-              <a:gd name="connsiteY4" fmla="*/ 0 h 18288"/>
-              <a:gd name="connsiteX5" fmla="*/ 2734084 w 4243589"/>
-              <a:gd name="connsiteY5" fmla="*/ 0 h 18288"/>
-              <a:gd name="connsiteX6" fmla="*/ 3255439 w 4243589"/>
-              <a:gd name="connsiteY6" fmla="*/ 0 h 18288"/>
-              <a:gd name="connsiteX7" fmla="*/ 4243589 w 4243589"/>
-              <a:gd name="connsiteY7" fmla="*/ 0 h 18288"/>
-              <a:gd name="connsiteX8" fmla="*/ 4243589 w 4243589"/>
-              <a:gd name="connsiteY8" fmla="*/ 18288 h 18288"/>
-              <a:gd name="connsiteX9" fmla="*/ 3594926 w 4243589"/>
-              <a:gd name="connsiteY9" fmla="*/ 18288 h 18288"/>
-              <a:gd name="connsiteX10" fmla="*/ 3073571 w 4243589"/>
-              <a:gd name="connsiteY10" fmla="*/ 18288 h 18288"/>
-              <a:gd name="connsiteX11" fmla="*/ 2552216 w 4243589"/>
-              <a:gd name="connsiteY11" fmla="*/ 18288 h 18288"/>
-              <a:gd name="connsiteX12" fmla="*/ 1903553 w 4243589"/>
-              <a:gd name="connsiteY12" fmla="*/ 18288 h 18288"/>
-              <a:gd name="connsiteX13" fmla="*/ 1212454 w 4243589"/>
-              <a:gd name="connsiteY13" fmla="*/ 18288 h 18288"/>
-              <a:gd name="connsiteX14" fmla="*/ 733535 w 4243589"/>
-              <a:gd name="connsiteY14" fmla="*/ 18288 h 18288"/>
-              <a:gd name="connsiteX15" fmla="*/ 0 w 4243589"/>
-              <a:gd name="connsiteY15" fmla="*/ 18288 h 18288"/>
-              <a:gd name="connsiteX16" fmla="*/ 0 w 4243589"/>
-              <a:gd name="connsiteY16" fmla="*/ 0 h 18288"/>
-            </a:gdLst>
-            <a:ahLst/>
-            <a:cxnLst>
-              <a:cxn ang="0">
-                <a:pos x="connsiteX0" y="connsiteY0"/>
-              </a:cxn>
-              <a:cxn ang="0">
-                <a:pos x="connsiteX1" y="connsiteY1"/>
-              </a:cxn>
-              <a:cxn ang="0">
-                <a:pos x="connsiteX2" y="connsiteY2"/>
-              </a:cxn>
-              <a:cxn ang="0">
-                <a:pos x="connsiteX3" y="connsiteY3"/>
-              </a:cxn>
-              <a:cxn ang="0">
-                <a:pos x="connsiteX4" y="connsiteY4"/>
-              </a:cxn>
-              <a:cxn ang="0">
-                <a:pos x="connsiteX5" y="connsiteY5"/>
-              </a:cxn>
-              <a:cxn ang="0">
-                <a:pos x="connsiteX6" y="connsiteY6"/>
-              </a:cxn>
-              <a:cxn ang="0">
-                <a:pos x="connsiteX7" y="connsiteY7"/>
-              </a:cxn>
-              <a:cxn ang="0">
-                <a:pos x="connsiteX8" y="connsiteY8"/>
-              </a:cxn>
-              <a:cxn ang="0">
-                <a:pos x="connsiteX9" y="connsiteY9"/>
-              </a:cxn>
-              <a:cxn ang="0">
-                <a:pos x="connsiteX10" y="connsiteY10"/>
-              </a:cxn>
-              <a:cxn ang="0">
-                <a:pos x="connsiteX11" y="connsiteY11"/>
-              </a:cxn>
-              <a:cxn ang="0">
-                <a:pos x="connsiteX12" y="connsiteY12"/>
-              </a:cxn>
-              <a:cxn ang="0">
-                <a:pos x="connsiteX13" y="connsiteY13"/>
-              </a:cxn>
-              <a:cxn ang="0">
-                <a:pos x="connsiteX14" y="connsiteY14"/>
-              </a:cxn>
-              <a:cxn ang="0">
-                <a:pos x="connsiteX15" y="connsiteY15"/>
-              </a:cxn>
-              <a:cxn ang="0">
-                <a:pos x="connsiteX16" y="connsiteY16"/>
-              </a:cxn>
-            </a:cxnLst>
-            <a:rect l="l" t="t" r="r" b="b"/>
-            <a:pathLst>
-              <a:path w="4243589" h="18288" fill="none" extrusionOk="0">
-                <a:moveTo>
-                  <a:pt x="0" y="0"/>
-                </a:moveTo>
-                <a:cubicBezTo>
-                  <a:pt x="213395" y="-21006"/>
-                  <a:pt x="307421" y="-18116"/>
-                  <a:pt x="478919" y="0"/>
-                </a:cubicBezTo>
-                <a:cubicBezTo>
-                  <a:pt x="650417" y="18116"/>
-                  <a:pt x="831092" y="-21237"/>
-                  <a:pt x="957839" y="0"/>
-                </a:cubicBezTo>
-                <a:cubicBezTo>
-                  <a:pt x="1084586" y="21237"/>
-                  <a:pt x="1301682" y="25124"/>
-                  <a:pt x="1521630" y="0"/>
-                </a:cubicBezTo>
-                <a:cubicBezTo>
-                  <a:pt x="1741578" y="-25124"/>
-                  <a:pt x="1970269" y="-29139"/>
-                  <a:pt x="2212729" y="0"/>
-                </a:cubicBezTo>
-                <a:cubicBezTo>
-                  <a:pt x="2455189" y="29139"/>
-                  <a:pt x="2558847" y="-4796"/>
-                  <a:pt x="2734084" y="0"/>
-                </a:cubicBezTo>
-                <a:cubicBezTo>
-                  <a:pt x="2909321" y="4796"/>
-                  <a:pt x="3097217" y="-13409"/>
-                  <a:pt x="3255439" y="0"/>
-                </a:cubicBezTo>
-                <a:cubicBezTo>
-                  <a:pt x="3413662" y="13409"/>
-                  <a:pt x="3979999" y="-10121"/>
-                  <a:pt x="4243589" y="0"/>
-                </a:cubicBezTo>
-                <a:cubicBezTo>
-                  <a:pt x="4244484" y="8974"/>
-                  <a:pt x="4243043" y="9359"/>
-                  <a:pt x="4243589" y="18288"/>
-                </a:cubicBezTo>
-                <a:cubicBezTo>
-                  <a:pt x="4058777" y="31246"/>
-                  <a:pt x="3910348" y="3158"/>
-                  <a:pt x="3594926" y="18288"/>
-                </a:cubicBezTo>
-                <a:cubicBezTo>
-                  <a:pt x="3279504" y="33418"/>
-                  <a:pt x="3319955" y="-3977"/>
-                  <a:pt x="3073571" y="18288"/>
-                </a:cubicBezTo>
-                <a:cubicBezTo>
-                  <a:pt x="2827187" y="40553"/>
-                  <a:pt x="2767387" y="1863"/>
-                  <a:pt x="2552216" y="18288"/>
-                </a:cubicBezTo>
-                <a:cubicBezTo>
-                  <a:pt x="2337046" y="34713"/>
-                  <a:pt x="2181871" y="19527"/>
-                  <a:pt x="1903553" y="18288"/>
-                </a:cubicBezTo>
-                <a:cubicBezTo>
-                  <a:pt x="1625235" y="17049"/>
-                  <a:pt x="1557672" y="24174"/>
-                  <a:pt x="1212454" y="18288"/>
-                </a:cubicBezTo>
-                <a:cubicBezTo>
-                  <a:pt x="867236" y="12402"/>
-                  <a:pt x="874382" y="15627"/>
-                  <a:pt x="733535" y="18288"/>
-                </a:cubicBezTo>
-                <a:cubicBezTo>
-                  <a:pt x="592688" y="20949"/>
-                  <a:pt x="183477" y="14753"/>
-                  <a:pt x="0" y="18288"/>
-                </a:cubicBezTo>
-                <a:cubicBezTo>
-                  <a:pt x="-229" y="14222"/>
-                  <a:pt x="509" y="5816"/>
-                  <a:pt x="0" y="0"/>
-                </a:cubicBezTo>
-                <a:close/>
-              </a:path>
-              <a:path w="4243589" h="18288" stroke="0" extrusionOk="0">
-                <a:moveTo>
-                  <a:pt x="0" y="0"/>
-                </a:moveTo>
-                <a:cubicBezTo>
-                  <a:pt x="143690" y="16630"/>
-                  <a:pt x="266667" y="14847"/>
-                  <a:pt x="521355" y="0"/>
-                </a:cubicBezTo>
-                <a:cubicBezTo>
-                  <a:pt x="776043" y="-14847"/>
-                  <a:pt x="814491" y="-17363"/>
-                  <a:pt x="1000275" y="0"/>
-                </a:cubicBezTo>
-                <a:cubicBezTo>
-                  <a:pt x="1186059" y="17363"/>
-                  <a:pt x="1352504" y="-23507"/>
-                  <a:pt x="1521630" y="0"/>
-                </a:cubicBezTo>
-                <a:cubicBezTo>
-                  <a:pt x="1690756" y="23507"/>
-                  <a:pt x="1889525" y="5871"/>
-                  <a:pt x="2127857" y="0"/>
-                </a:cubicBezTo>
-                <a:cubicBezTo>
-                  <a:pt x="2366189" y="-5871"/>
-                  <a:pt x="2620628" y="-27997"/>
-                  <a:pt x="2776520" y="0"/>
-                </a:cubicBezTo>
-                <a:cubicBezTo>
-                  <a:pt x="2932412" y="27997"/>
-                  <a:pt x="3131683" y="-25073"/>
-                  <a:pt x="3467618" y="0"/>
-                </a:cubicBezTo>
-                <a:cubicBezTo>
-                  <a:pt x="3803553" y="25073"/>
-                  <a:pt x="4017371" y="3071"/>
-                  <a:pt x="4243589" y="0"/>
-                </a:cubicBezTo>
-                <a:cubicBezTo>
-                  <a:pt x="4243134" y="6162"/>
-                  <a:pt x="4243492" y="11775"/>
-                  <a:pt x="4243589" y="18288"/>
-                </a:cubicBezTo>
-                <a:cubicBezTo>
-                  <a:pt x="4017834" y="-5779"/>
-                  <a:pt x="3834586" y="13376"/>
-                  <a:pt x="3594926" y="18288"/>
-                </a:cubicBezTo>
-                <a:cubicBezTo>
-                  <a:pt x="3355266" y="23200"/>
-                  <a:pt x="3204179" y="2869"/>
-                  <a:pt x="2903827" y="18288"/>
-                </a:cubicBezTo>
-                <a:cubicBezTo>
-                  <a:pt x="2603475" y="33707"/>
-                  <a:pt x="2526187" y="46187"/>
-                  <a:pt x="2212729" y="18288"/>
-                </a:cubicBezTo>
-                <a:cubicBezTo>
-                  <a:pt x="1899271" y="-9611"/>
-                  <a:pt x="1966289" y="29692"/>
-                  <a:pt x="1733809" y="18288"/>
-                </a:cubicBezTo>
-                <a:cubicBezTo>
-                  <a:pt x="1501329" y="6884"/>
-                  <a:pt x="1343612" y="12492"/>
-                  <a:pt x="1085146" y="18288"/>
-                </a:cubicBezTo>
-                <a:cubicBezTo>
-                  <a:pt x="826680" y="24084"/>
-                  <a:pt x="778184" y="35607"/>
-                  <a:pt x="521355" y="18288"/>
-                </a:cubicBezTo>
-                <a:cubicBezTo>
-                  <a:pt x="264526" y="969"/>
-                  <a:pt x="120277" y="4268"/>
-                  <a:pt x="0" y="18288"/>
-                </a:cubicBezTo>
-                <a:cubicBezTo>
-                  <a:pt x="766" y="10800"/>
-                  <a:pt x="-457" y="8180"/>
-                  <a:pt x="0" y="0"/>
-                </a:cubicBezTo>
-                <a:close/>
-              </a:path>
-            </a:pathLst>
-          </a:custGeom>
-          <a:solidFill>
-            <a:schemeClr val="accent2"/>
-          </a:solidFill>
-          <a:ln w="44450" cap="rnd">
-            <a:solidFill>
-              <a:schemeClr val="accent2"/>
-            </a:solidFill>
-            <a:round/>
-            <a:extLst>
-              <a:ext uri="{C807C97D-BFC1-408E-A445-0C87EB9F89A2}">
-                <ask:lineSketchStyleProps xmlns:ask="http://schemas.microsoft.com/office/drawing/2018/sketchyshapes" sd="2727557108">
-                  <a:prstGeom prst="rect">
-                    <a:avLst/>
-                  </a:prstGeom>
-                  <ask:type>
-                    <ask:lineSketchFreehand/>
-                  </ask:type>
-                </ask:lineSketchStyleProps>
-              </a:ext>
-            </a:extLst>
-          </a:ln>
-        </p:spPr>
-        <p:style>
-          <a:lnRef idx="2">
-            <a:schemeClr val="accent1">
-              <a:shade val="50000"/>
-            </a:schemeClr>
-          </a:lnRef>
-          <a:fillRef idx="1">
-            <a:schemeClr val="accent1"/>
-          </a:fillRef>
-          <a:effectRef idx="0">
-            <a:schemeClr val="accent1"/>
-          </a:effectRef>
-          <a:fontRef idx="minor">
-            <a:schemeClr val="lt1"/>
-          </a:fontRef>
-        </p:style>
-        <p:txBody>
-          <a:bodyPr rtlCol="0" anchor="ctr"/>
-          <a:lstStyle/>
-          <a:p>
-            <a:pPr algn="ctr"/>
-            <a:endParaRPr lang="en-US"/>
-          </a:p>
-        </p:txBody>
-      </p:sp>
-      <p:sp>
-        <p:nvSpPr>
-          <p:cNvPr id="3" name="Espaço Reservado para Conteúdo 2">
-            <a:extLst>
-              <a:ext uri="{FF2B5EF4-FFF2-40B4-BE49-F238E27FC236}">
-                <a16:creationId xmlns:a16="http://schemas.microsoft.com/office/drawing/2014/main" id="{6CABA167-B8D6-462E-7521-4C348BB01F36}"/>
-              </a:ext>
-            </a:extLst>
-          </p:cNvPr>
-          <p:cNvSpPr>
-            <a:spLocks noGrp="1"/>
-          </p:cNvSpPr>
-          <p:nvPr>
-            <p:ph idx="1"/>
-          </p:nvPr>
-        </p:nvSpPr>
-        <p:spPr>
-          <a:xfrm>
-            <a:off x="5297762" y="2706623"/>
-            <a:ext cx="6251110" cy="4018641"/>
-          </a:xfrm>
-        </p:spPr>
-        <p:txBody>
-          <a:bodyPr>
-            <a:normAutofit/>
-          </a:bodyPr>
-          <a:lstStyle/>
-          <a:p>
-            <a:pPr marL="0" indent="0">
-              <a:spcBef>
-                <a:spcPts val="1200"/>
-              </a:spcBef>
-              <a:spcAft>
-                <a:spcPts val="1200"/>
-              </a:spcAft>
-              <a:buNone/>
-            </a:pPr>
-            <a:r>
-              <a:rPr lang="pt-BR" sz="2200" kern="100" dirty="0">
-                <a:solidFill>
-                  <a:srgbClr val="A50000"/>
-                </a:solidFill>
-                <a:effectLst/>
-                <a:latin typeface="Calibri" panose="020F0502020204030204" pitchFamily="34" charset="0"/>
-                <a:ea typeface="Calibri" panose="020F0502020204030204" pitchFamily="34" charset="0"/>
-                <a:cs typeface="Times New Roman" panose="02020603050405020304" pitchFamily="18" charset="0"/>
-              </a:rPr>
-              <a:t>Ferramentas:</a:t>
-            </a:r>
-            <a:r>
-              <a:rPr lang="pt-BR" sz="2200" kern="100" dirty="0">
-                <a:effectLst/>
-                <a:latin typeface="Calibri" panose="020F0502020204030204" pitchFamily="34" charset="0"/>
-                <a:ea typeface="Calibri" panose="020F0502020204030204" pitchFamily="34" charset="0"/>
-                <a:cs typeface="Times New Roman" panose="02020603050405020304" pitchFamily="18" charset="0"/>
-              </a:rPr>
-              <a:t> Figma para design de interface.</a:t>
-            </a:r>
-            <a:endParaRPr lang="pt-BR" sz="2200" kern="100" dirty="0">
-              <a:solidFill>
-                <a:srgbClr val="A50000"/>
-              </a:solidFill>
-              <a:effectLst/>
-              <a:latin typeface="Calibri" panose="020F0502020204030204" pitchFamily="34" charset="0"/>
-              <a:ea typeface="Calibri" panose="020F0502020204030204" pitchFamily="34" charset="0"/>
-              <a:cs typeface="Times New Roman" panose="02020603050405020304" pitchFamily="18" charset="0"/>
-            </a:endParaRPr>
-          </a:p>
-          <a:p>
-            <a:pPr marL="0" indent="0">
-              <a:spcBef>
-                <a:spcPts val="1200"/>
-              </a:spcBef>
-              <a:spcAft>
-                <a:spcPts val="1200"/>
-              </a:spcAft>
-              <a:buNone/>
-            </a:pPr>
-            <a:r>
-              <a:rPr lang="pt-BR" sz="2200" kern="100" dirty="0">
-                <a:solidFill>
-                  <a:srgbClr val="A50000"/>
-                </a:solidFill>
-                <a:effectLst/>
-                <a:latin typeface="Calibri" panose="020F0502020204030204" pitchFamily="34" charset="0"/>
-                <a:ea typeface="Calibri" panose="020F0502020204030204" pitchFamily="34" charset="0"/>
-                <a:cs typeface="Times New Roman" panose="02020603050405020304" pitchFamily="18" charset="0"/>
-              </a:rPr>
-              <a:t>Linguagens: </a:t>
-            </a:r>
-            <a:r>
-              <a:rPr lang="pt-BR" sz="2200" kern="100" dirty="0">
-                <a:effectLst/>
-                <a:latin typeface="Calibri" panose="020F0502020204030204" pitchFamily="34" charset="0"/>
-                <a:ea typeface="Calibri" panose="020F0502020204030204" pitchFamily="34" charset="0"/>
-                <a:cs typeface="Times New Roman" panose="02020603050405020304" pitchFamily="18" charset="0"/>
-              </a:rPr>
-              <a:t>HTML, CSS, </a:t>
-            </a:r>
-            <a:r>
-              <a:rPr lang="pt-BR" sz="2200" kern="100" dirty="0" err="1">
-                <a:effectLst/>
-                <a:latin typeface="Calibri" panose="020F0502020204030204" pitchFamily="34" charset="0"/>
-                <a:ea typeface="Calibri" panose="020F0502020204030204" pitchFamily="34" charset="0"/>
-                <a:cs typeface="Times New Roman" panose="02020603050405020304" pitchFamily="18" charset="0"/>
-              </a:rPr>
-              <a:t>JavaScript</a:t>
-            </a:r>
-            <a:r>
-              <a:rPr lang="pt-BR" sz="2200" kern="100" dirty="0">
-                <a:latin typeface="Calibri" panose="020F0502020204030204" pitchFamily="34" charset="0"/>
-                <a:ea typeface="Calibri" panose="020F0502020204030204" pitchFamily="34" charset="0"/>
-                <a:cs typeface="Times New Roman" panose="02020603050405020304" pitchFamily="18" charset="0"/>
-              </a:rPr>
-              <a:t> e PHP.</a:t>
-            </a:r>
-            <a:endParaRPr lang="pt-BR" sz="2200" kern="100" dirty="0">
-              <a:effectLst/>
-              <a:latin typeface="Calibri" panose="020F0502020204030204" pitchFamily="34" charset="0"/>
-              <a:ea typeface="Calibri" panose="020F0502020204030204" pitchFamily="34" charset="0"/>
-              <a:cs typeface="Times New Roman" panose="02020603050405020304" pitchFamily="18" charset="0"/>
-            </a:endParaRPr>
-          </a:p>
-          <a:p>
-            <a:pPr marL="0" indent="0">
-              <a:spcBef>
-                <a:spcPts val="1200"/>
-              </a:spcBef>
-              <a:spcAft>
-                <a:spcPts val="1200"/>
-              </a:spcAft>
-              <a:buNone/>
-            </a:pPr>
-            <a:r>
-              <a:rPr lang="pt-BR" sz="2200" kern="100" dirty="0">
-                <a:solidFill>
-                  <a:srgbClr val="A50000"/>
-                </a:solidFill>
-                <a:effectLst/>
-                <a:latin typeface="Calibri" panose="020F0502020204030204" pitchFamily="34" charset="0"/>
-                <a:ea typeface="Calibri" panose="020F0502020204030204" pitchFamily="34" charset="0"/>
-                <a:cs typeface="Times New Roman" panose="02020603050405020304" pitchFamily="18" charset="0"/>
-              </a:rPr>
-              <a:t>Metodologias:</a:t>
-            </a:r>
-            <a:r>
-              <a:rPr lang="pt-BR" sz="2200" kern="100" dirty="0">
-                <a:effectLst/>
-                <a:latin typeface="Calibri" panose="020F0502020204030204" pitchFamily="34" charset="0"/>
-                <a:ea typeface="Calibri" panose="020F0502020204030204" pitchFamily="34" charset="0"/>
-                <a:cs typeface="Times New Roman" panose="02020603050405020304" pitchFamily="18" charset="0"/>
-              </a:rPr>
-              <a:t> Scrum para gestão ágil do projeto.</a:t>
-            </a:r>
-          </a:p>
-          <a:p>
-            <a:pPr marL="0" indent="0">
-              <a:spcBef>
-                <a:spcPts val="1200"/>
-              </a:spcBef>
-              <a:spcAft>
-                <a:spcPts val="1200"/>
-              </a:spcAft>
-              <a:buNone/>
-            </a:pPr>
-            <a:r>
-              <a:rPr lang="pt-BR" sz="2200" kern="100" dirty="0">
-                <a:solidFill>
-                  <a:srgbClr val="A50000"/>
-                </a:solidFill>
-                <a:effectLst/>
-                <a:latin typeface="Calibri" panose="020F0502020204030204" pitchFamily="34" charset="0"/>
-                <a:ea typeface="Calibri" panose="020F0502020204030204" pitchFamily="34" charset="0"/>
-                <a:cs typeface="Times New Roman" panose="02020603050405020304" pitchFamily="18" charset="0"/>
-              </a:rPr>
-              <a:t>Modelagem:</a:t>
-            </a:r>
-            <a:r>
-              <a:rPr lang="pt-BR" sz="2200" kern="100" dirty="0">
-                <a:effectLst/>
-                <a:latin typeface="Calibri" panose="020F0502020204030204" pitchFamily="34" charset="0"/>
-                <a:ea typeface="Calibri" panose="020F0502020204030204" pitchFamily="34" charset="0"/>
-                <a:cs typeface="Times New Roman" panose="02020603050405020304" pitchFamily="18" charset="0"/>
-              </a:rPr>
-              <a:t> </a:t>
-            </a:r>
-          </a:p>
-          <a:p>
-            <a:pPr marL="0" indent="0">
-              <a:spcBef>
-                <a:spcPts val="1200"/>
-              </a:spcBef>
-              <a:spcAft>
-                <a:spcPts val="1200"/>
-              </a:spcAft>
-              <a:buNone/>
-            </a:pPr>
-            <a:r>
-              <a:rPr lang="pt-BR" sz="2200" kern="100" dirty="0">
-                <a:effectLst/>
-                <a:latin typeface="Calibri" panose="020F0502020204030204" pitchFamily="34" charset="0"/>
-                <a:ea typeface="Calibri" panose="020F0502020204030204" pitchFamily="34" charset="0"/>
-                <a:cs typeface="Times New Roman" panose="02020603050405020304" pitchFamily="18" charset="0"/>
-              </a:rPr>
-              <a:t>UML para casos de uso e atividades.</a:t>
-            </a:r>
-          </a:p>
-          <a:p>
-            <a:pPr marL="0" indent="0">
-              <a:spcBef>
-                <a:spcPts val="1200"/>
-              </a:spcBef>
-              <a:spcAft>
-                <a:spcPts val="1200"/>
-              </a:spcAft>
-              <a:buNone/>
-            </a:pPr>
-            <a:r>
-              <a:rPr lang="pt-BR" sz="2200" kern="100" dirty="0">
-                <a:effectLst/>
-                <a:latin typeface="Calibri" panose="020F0502020204030204" pitchFamily="34" charset="0"/>
-                <a:ea typeface="Calibri" panose="020F0502020204030204" pitchFamily="34" charset="0"/>
-                <a:cs typeface="Times New Roman" panose="02020603050405020304" pitchFamily="18" charset="0"/>
-              </a:rPr>
-              <a:t>Modelos Entidade-Relacionamento e </a:t>
-            </a:r>
-            <a:br>
-              <a:rPr lang="pt-BR" sz="2200" kern="100" dirty="0">
-                <a:effectLst/>
-                <a:latin typeface="Calibri" panose="020F0502020204030204" pitchFamily="34" charset="0"/>
-                <a:ea typeface="Calibri" panose="020F0502020204030204" pitchFamily="34" charset="0"/>
-                <a:cs typeface="Times New Roman" panose="02020603050405020304" pitchFamily="18" charset="0"/>
-              </a:rPr>
-            </a:br>
-            <a:r>
-              <a:rPr lang="pt-BR" sz="2200" kern="100" dirty="0">
-                <a:effectLst/>
-                <a:latin typeface="Calibri" panose="020F0502020204030204" pitchFamily="34" charset="0"/>
-                <a:ea typeface="Calibri" panose="020F0502020204030204" pitchFamily="34" charset="0"/>
-                <a:cs typeface="Times New Roman" panose="02020603050405020304" pitchFamily="18" charset="0"/>
-              </a:rPr>
-              <a:t>Lógico para banco de dados.</a:t>
-            </a:r>
-          </a:p>
-          <a:p>
-            <a:pPr>
-              <a:spcBef>
-                <a:spcPts val="0"/>
-              </a:spcBef>
-            </a:pPr>
-            <a:endParaRPr lang="pt-BR" sz="1700" dirty="0"/>
-          </a:p>
-        </p:txBody>
-      </p:sp>
     </p:spTree>
     <p:extLst>
       <p:ext uri="{BB962C8B-B14F-4D97-AF65-F5344CB8AC3E}">
-        <p14:creationId xmlns:p14="http://schemas.microsoft.com/office/powerpoint/2010/main" val="4239718710"/>
+        <p14:creationId xmlns:p14="http://schemas.microsoft.com/office/powerpoint/2010/main" val="1234071128"/>
       </p:ext>
     </p:extLst>
   </p:cSld>

</xml_diff>